<commit_message>
updates to movisualizations and added stuff about number of oy households and whatnot
</commit_message>
<xml_diff>
--- a/create_powerpoint/household_structure_estimates.pptx
+++ b/create_powerpoint/household_structure_estimates.pptx
@@ -22,6 +22,13 @@
     <p:sldId id="270" r:id="rId16"/>
     <p:sldId id="271" r:id="rId17"/>
     <p:sldId id="272" r:id="rId18"/>
+    <p:sldId id="273" r:id="rId19"/>
+    <p:sldId id="274" r:id="rId20"/>
+    <p:sldId id="275" r:id="rId21"/>
+    <p:sldId id="276" r:id="rId22"/>
+    <p:sldId id="277" r:id="rId23"/>
+    <p:sldId id="278" r:id="rId24"/>
+    <p:sldId id="279" r:id="rId25"/>
   </p:sldIdLst>
   <p:sldSz cx="12192000" cy="6858000"/>
   <p:notesSz cx="6858000" cy="9144000"/>
@@ -3483,6 +3490,22 @@
             </a:pPr>
             <a:r>
               <a:rPr/>
+              <a:t>Opportunity</a:t>
+            </a:r>
+            <a:r>
+              <a:rPr/>
+              <a:t> </a:t>
+            </a:r>
+            <a:r>
+              <a:rPr/>
+              <a:t>Youth</a:t>
+            </a:r>
+            <a:r>
+              <a:rPr/>
+              <a:t> </a:t>
+            </a:r>
+            <a:r>
+              <a:rPr/>
               <a:t>Household</a:t>
             </a:r>
             <a:r>
@@ -3545,7 +3568,7 @@
             </a:r>
             <a:r>
               <a:rPr/>
-              <a:t>Campos</a:t>
+              <a:t>Rubi</a:t>
             </a:r>
           </a:p>
         </p:txBody>
@@ -3589,7 +3612,7 @@
             </a:r>
             <a:r>
               <a:rPr/>
-              <a:t>21,</a:t>
+              <a:t>22,</a:t>
             </a:r>
             <a:r>
               <a:rPr/>
@@ -3650,6 +3673,22 @@
             </a:pPr>
             <a:r>
               <a:rPr/>
+              <a:t>Income</a:t>
+            </a:r>
+            <a:r>
+              <a:rPr/>
+              <a:t> </a:t>
+            </a:r>
+            <a:r>
+              <a:rPr/>
+              <a:t>Characteristics:</a:t>
+            </a:r>
+            <a:r>
+              <a:rPr/>
+              <a:t> </a:t>
+            </a:r>
+            <a:r>
+              <a:rPr/>
               <a:t>Household</a:t>
             </a:r>
             <a:r>
@@ -3658,43 +3697,41 @@
             </a:r>
             <a:r>
               <a:rPr/>
-              <a:t>Characteristics:</a:t>
-            </a:r>
-            <a:r>
-              <a:rPr/>
-              <a:t> </a:t>
-            </a:r>
-            <a:r>
-              <a:rPr/>
-              <a:t>Workers</a:t>
-            </a:r>
-            <a:r>
-              <a:rPr/>
-              <a:t> </a:t>
-            </a:r>
-            <a:r>
-              <a:rPr/>
-              <a:t>in</a:t>
-            </a:r>
-            <a:r>
-              <a:rPr/>
-              <a:t> </a:t>
-            </a:r>
-            <a:r>
-              <a:rPr/>
-              <a:t>Family</a:t>
-            </a:r>
-            <a:r>
-              <a:rPr/>
-              <a:t> </a:t>
-            </a:r>
-            <a:r>
-              <a:rPr/>
-              <a:t>(Pending)</a:t>
-            </a:r>
-          </a:p>
-        </p:txBody>
-      </p:sp>
+              <a:t>Income</a:t>
+            </a:r>
+          </a:p>
+        </p:txBody>
+      </p:sp>
+      <p:pic>
+        <p:nvPicPr>
+          <p:cNvPr descr="household_structure_estimates_files/figure-pptx/unnamed-chunk-8-1.png" id="0" name="Picture 1"/>
+          <p:cNvPicPr>
+            <a:picLocks noGrp="1" noChangeAspect="1"/>
+          </p:cNvPicPr>
+          <p:nvPr/>
+        </p:nvPicPr>
+        <p:blipFill>
+          <a:blip r:embed="rId2"/>
+          <a:stretch>
+            <a:fillRect/>
+          </a:stretch>
+        </p:blipFill>
+        <p:spPr bwMode="auto">
+          <a:xfrm>
+            <a:off x="1752600" y="1816100"/>
+            <a:ext cx="8686800" cy="4343400"/>
+          </a:xfrm>
+          <a:prstGeom prst="rect">
+            <a:avLst/>
+          </a:prstGeom>
+          <a:noFill/>
+          <a:ln w="9525">
+            <a:noFill/>
+            <a:headEnd/>
+            <a:tailEnd/>
+          </a:ln>
+        </p:spPr>
+      </p:pic>
     </p:spTree>
   </p:cSld>
 </p:sld>
@@ -3743,7 +3780,7 @@
             </a:pPr>
             <a:r>
               <a:rPr/>
-              <a:t>Marital</a:t>
+              <a:t>Income</a:t>
             </a:r>
             <a:r>
               <a:rPr/>
@@ -3751,7 +3788,7 @@
             </a:r>
             <a:r>
               <a:rPr/>
-              <a:t>Status</a:t>
+              <a:t>Characteristics:</a:t>
             </a:r>
             <a:r>
               <a:rPr/>
@@ -3759,7 +3796,7 @@
             </a:r>
             <a:r>
               <a:rPr/>
-              <a:t>/</a:t>
+              <a:t>Total</a:t>
             </a:r>
             <a:r>
               <a:rPr/>
@@ -3767,14 +3804,22 @@
             </a:r>
             <a:r>
               <a:rPr/>
-              <a:t>Partnered</a:t>
+              <a:t>Personal</a:t>
+            </a:r>
+            <a:r>
+              <a:rPr/>
+              <a:t> </a:t>
+            </a:r>
+            <a:r>
+              <a:rPr/>
+              <a:t>Income</a:t>
             </a:r>
           </a:p>
         </p:txBody>
       </p:sp>
       <p:pic>
         <p:nvPicPr>
-          <p:cNvPr descr="household_structure_estimates_files/figure-pptx/unnamed-chunk-12-1.png" id="0" name="Picture 1"/>
+          <p:cNvPr descr="household_structure_estimates_files/figure-pptx/unnamed-chunk-9-1.png" id="0" name="Picture 1"/>
           <p:cNvPicPr>
             <a:picLocks noGrp="1" noChangeAspect="1"/>
           </p:cNvPicPr>
@@ -3850,6 +3895,30 @@
             </a:pPr>
             <a:r>
               <a:rPr/>
+              <a:t>Marital</a:t>
+            </a:r>
+            <a:r>
+              <a:rPr/>
+              <a:t> </a:t>
+            </a:r>
+            <a:r>
+              <a:rPr/>
+              <a:t>Status</a:t>
+            </a:r>
+            <a:r>
+              <a:rPr/>
+              <a:t> </a:t>
+            </a:r>
+            <a:r>
+              <a:rPr/>
+              <a:t>/</a:t>
+            </a:r>
+            <a:r>
+              <a:rPr/>
+              <a:t> </a:t>
+            </a:r>
+            <a:r>
+              <a:rPr/>
               <a:t>Partnered</a:t>
             </a:r>
           </a:p>
@@ -3857,7 +3926,7 @@
       </p:sp>
       <p:pic>
         <p:nvPicPr>
-          <p:cNvPr descr="household_structure_estimates_files/figure-pptx/unnamed-chunk-13-1.png" id="0" name="Picture 1"/>
+          <p:cNvPr descr="household_structure_estimates_files/figure-pptx/unnamed-chunk-11-1.png" id="0" name="Picture 1"/>
           <p:cNvPicPr>
             <a:picLocks noGrp="1" noChangeAspect="1"/>
           </p:cNvPicPr>
@@ -3933,27 +4002,41 @@
             </a:pPr>
             <a:r>
               <a:rPr/>
-              <a:t>Same-sex</a:t>
-            </a:r>
-            <a:r>
-              <a:rPr/>
-              <a:t> </a:t>
-            </a:r>
-            <a:r>
-              <a:rPr/>
-              <a:t>households</a:t>
-            </a:r>
-            <a:r>
-              <a:rPr/>
-              <a:t> </a:t>
-            </a:r>
-            <a:r>
-              <a:rPr/>
-              <a:t>(Pending)</a:t>
-            </a:r>
-          </a:p>
-        </p:txBody>
-      </p:sp>
+              <a:t>Partnered</a:t>
+            </a:r>
+          </a:p>
+        </p:txBody>
+      </p:sp>
+      <p:pic>
+        <p:nvPicPr>
+          <p:cNvPr descr="household_structure_estimates_files/figure-pptx/unnamed-chunk-12-1.png" id="0" name="Picture 1"/>
+          <p:cNvPicPr>
+            <a:picLocks noGrp="1" noChangeAspect="1"/>
+          </p:cNvPicPr>
+          <p:nvPr/>
+        </p:nvPicPr>
+        <p:blipFill>
+          <a:blip r:embed="rId2"/>
+          <a:stretch>
+            <a:fillRect/>
+          </a:stretch>
+        </p:blipFill>
+        <p:spPr bwMode="auto">
+          <a:xfrm>
+            <a:off x="1752600" y="1816100"/>
+            <a:ext cx="8686800" cy="4343400"/>
+          </a:xfrm>
+          <a:prstGeom prst="rect">
+            <a:avLst/>
+          </a:prstGeom>
+          <a:noFill/>
+          <a:ln w="9525">
+            <a:noFill/>
+            <a:headEnd/>
+            <a:tailEnd/>
+          </a:ln>
+        </p:spPr>
+      </p:pic>
     </p:spTree>
   </p:cSld>
 </p:sld>
@@ -4002,7 +4085,7 @@
             </a:pPr>
             <a:r>
               <a:rPr/>
-              <a:t>Multi-generational</a:t>
+              <a:t>Mobility:</a:t>
             </a:r>
             <a:r>
               <a:rPr/>
@@ -4010,19 +4093,41 @@
             </a:r>
             <a:r>
               <a:rPr/>
-              <a:t>Families</a:t>
-            </a:r>
-            <a:r>
-              <a:rPr/>
-              <a:t> </a:t>
-            </a:r>
-            <a:r>
-              <a:rPr/>
-              <a:t>(Pending)</a:t>
-            </a:r>
-          </a:p>
-        </p:txBody>
-      </p:sp>
+              <a:t>Migration</a:t>
+            </a:r>
+          </a:p>
+        </p:txBody>
+      </p:sp>
+      <p:pic>
+        <p:nvPicPr>
+          <p:cNvPr descr="household_structure_estimates_files/figure-pptx/unnamed-chunk-13-1.png" id="0" name="Picture 1"/>
+          <p:cNvPicPr>
+            <a:picLocks noGrp="1" noChangeAspect="1"/>
+          </p:cNvPicPr>
+          <p:nvPr/>
+        </p:nvPicPr>
+        <p:blipFill>
+          <a:blip r:embed="rId2"/>
+          <a:stretch>
+            <a:fillRect/>
+          </a:stretch>
+        </p:blipFill>
+        <p:spPr bwMode="auto">
+          <a:xfrm>
+            <a:off x="1752600" y="1816100"/>
+            <a:ext cx="8686800" cy="4343400"/>
+          </a:xfrm>
+          <a:prstGeom prst="rect">
+            <a:avLst/>
+          </a:prstGeom>
+          <a:noFill/>
+          <a:ln w="9525">
+            <a:noFill/>
+            <a:headEnd/>
+            <a:tailEnd/>
+          </a:ln>
+        </p:spPr>
+      </p:pic>
     </p:spTree>
   </p:cSld>
 </p:sld>
@@ -4079,14 +4184,30 @@
             </a:r>
             <a:r>
               <a:rPr/>
-              <a:t>Migration</a:t>
+              <a:t>Mode</a:t>
+            </a:r>
+            <a:r>
+              <a:rPr/>
+              <a:t> </a:t>
+            </a:r>
+            <a:r>
+              <a:rPr/>
+              <a:t>of</a:t>
+            </a:r>
+            <a:r>
+              <a:rPr/>
+              <a:t> </a:t>
+            </a:r>
+            <a:r>
+              <a:rPr/>
+              <a:t>Transportation</a:t>
             </a:r>
           </a:p>
         </p:txBody>
       </p:sp>
       <p:pic>
         <p:nvPicPr>
-          <p:cNvPr descr="household_structure_estimates_files/figure-pptx/unnamed-chunk-16-1.png" id="0" name="Picture 1"/>
+          <p:cNvPr descr="household_structure_estimates_files/figure-pptx/unnamed-chunk-14-1.png" id="0" name="Picture 1"/>
           <p:cNvPicPr>
             <a:picLocks noGrp="1" noChangeAspect="1"/>
           </p:cNvPicPr>
@@ -4162,7 +4283,7 @@
             </a:pPr>
             <a:r>
               <a:rPr/>
-              <a:t>Mobility:</a:t>
+              <a:t>Migration:</a:t>
             </a:r>
             <a:r>
               <a:rPr/>
@@ -4170,7 +4291,7 @@
             </a:r>
             <a:r>
               <a:rPr/>
-              <a:t>Mode</a:t>
+              <a:t>Average</a:t>
             </a:r>
             <a:r>
               <a:rPr/>
@@ -4178,7 +4299,7 @@
             </a:r>
             <a:r>
               <a:rPr/>
-              <a:t>of</a:t>
+              <a:t>Commute</a:t>
             </a:r>
             <a:r>
               <a:rPr/>
@@ -4186,14 +4307,14 @@
             </a:r>
             <a:r>
               <a:rPr/>
-              <a:t>Transportation</a:t>
+              <a:t>Time</a:t>
             </a:r>
           </a:p>
         </p:txBody>
       </p:sp>
       <p:pic>
         <p:nvPicPr>
-          <p:cNvPr descr="household_structure_estimates_files/figure-pptx/unnamed-chunk-17-1.png" id="0" name="Picture 1"/>
+          <p:cNvPr descr="household_structure_estimates_files/figure-pptx/unnamed-chunk-15-1.png" id="0" name="Picture 1"/>
           <p:cNvPicPr>
             <a:picLocks noGrp="1" noChangeAspect="1"/>
           </p:cNvPicPr>
@@ -4248,6 +4369,72 @@
           <p:cNvPr id="2" name="Title 1">
             <a:extLst>
               <a:ext uri="{FF2B5EF4-FFF2-40B4-BE49-F238E27FC236}">
+                <a16:creationId xmlns:a16="http://schemas.microsoft.com/office/drawing/2014/main" id="{1CAF8530-DA25-40F0-835B-ABF68B3EB818}"/>
+              </a:ext>
+            </a:extLst>
+          </p:cNvPr>
+          <p:cNvSpPr>
+            <a:spLocks noGrp="1"/>
+          </p:cNvSpPr>
+          <p:nvPr>
+            <p:ph type="title"/>
+          </p:nvPr>
+        </p:nvSpPr>
+        <p:spPr>
+          <a:xfrm>
+            <a:off x="831850" y="1123072"/>
+            <a:ext cx="10515600" cy="2852737"/>
+          </a:xfrm>
+        </p:spPr>
+        <p:txBody>
+          <a:bodyPr/>
+          <a:lstStyle/>
+          <a:p>
+            <a:pPr lvl="0" marL="0" indent="0">
+              <a:buNone/>
+            </a:pPr>
+            <a:r>
+              <a:rPr/>
+              <a:t>Pending</a:t>
+            </a:r>
+            <a:r>
+              <a:rPr/>
+              <a:t> </a:t>
+            </a:r>
+            <a:r>
+              <a:rPr/>
+              <a:t>Analyses</a:t>
+            </a:r>
+          </a:p>
+        </p:txBody>
+      </p:sp>
+    </p:spTree>
+  </p:cSld>
+</p:sld>
+</file>
+
+<file path=ppt/slides/slide18.xml><?xml version="1.0" encoding="utf-8"?>
+<p:sld xmlns:a="http://schemas.openxmlformats.org/drawingml/2006/main" xmlns:r="http://schemas.openxmlformats.org/officeDocument/2006/relationships" xmlns:p="http://schemas.openxmlformats.org/presentationml/2006/main">
+  <p:cSld>
+    <p:spTree>
+      <p:nvGrpSpPr>
+        <p:cNvPr id="1" name=""/>
+        <p:cNvGrpSpPr/>
+        <p:nvPr/>
+      </p:nvGrpSpPr>
+      <p:grpSpPr>
+        <a:xfrm>
+          <a:off x="0" y="0"/>
+          <a:ext cx="0" cy="0"/>
+          <a:chOff x="0" y="0"/>
+          <a:chExt cx="0" cy="0"/>
+        </a:xfrm>
+      </p:grpSpPr>
+      <p:sp>
+        <p:nvSpPr>
+          <p:cNvPr id="2" name="Title 1">
+            <a:extLst>
+              <a:ext uri="{FF2B5EF4-FFF2-40B4-BE49-F238E27FC236}">
                 <a16:creationId xmlns:a16="http://schemas.microsoft.com/office/drawing/2014/main" id="{0D064A50-2A97-421C-813D-6449089693A0}"/>
               </a:ext>
             </a:extLst>
@@ -4269,7 +4456,7 @@
             </a:pPr>
             <a:r>
               <a:rPr/>
-              <a:t>Migration:</a:t>
+              <a:t>Income</a:t>
             </a:r>
             <a:r>
               <a:rPr/>
@@ -4277,7 +4464,7 @@
             </a:r>
             <a:r>
               <a:rPr/>
-              <a:t>Average</a:t>
+              <a:t>Characteristics:</a:t>
             </a:r>
             <a:r>
               <a:rPr/>
@@ -4285,7 +4472,7 @@
             </a:r>
             <a:r>
               <a:rPr/>
-              <a:t>Commute</a:t>
+              <a:t>Food</a:t>
             </a:r>
             <a:r>
               <a:rPr/>
@@ -4293,41 +4480,80 @@
             </a:r>
             <a:r>
               <a:rPr/>
-              <a:t>Time</a:t>
-            </a:r>
-          </a:p>
-        </p:txBody>
-      </p:sp>
-      <p:pic>
-        <p:nvPicPr>
-          <p:cNvPr descr="household_structure_estimates_files/figure-pptx/unnamed-chunk-18-1.png" id="0" name="Picture 1"/>
-          <p:cNvPicPr>
-            <a:picLocks noGrp="1" noChangeAspect="1"/>
-          </p:cNvPicPr>
-          <p:nvPr/>
-        </p:nvPicPr>
-        <p:blipFill>
-          <a:blip r:embed="rId2"/>
-          <a:stretch>
-            <a:fillRect/>
-          </a:stretch>
-        </p:blipFill>
-        <p:spPr bwMode="auto">
-          <a:xfrm>
-            <a:off x="1752600" y="1816100"/>
-            <a:ext cx="8686800" cy="4343400"/>
-          </a:xfrm>
-          <a:prstGeom prst="rect">
-            <a:avLst/>
-          </a:prstGeom>
-          <a:noFill/>
-          <a:ln w="9525">
-            <a:noFill/>
-            <a:headEnd/>
-            <a:tailEnd/>
-          </a:ln>
-        </p:spPr>
-      </p:pic>
+              <a:t>Stamps</a:t>
+            </a:r>
+            <a:r>
+              <a:rPr/>
+              <a:t> </a:t>
+            </a:r>
+            <a:r>
+              <a:rPr/>
+              <a:t>(Pending)</a:t>
+            </a:r>
+          </a:p>
+        </p:txBody>
+      </p:sp>
+    </p:spTree>
+  </p:cSld>
+</p:sld>
+</file>
+
+<file path=ppt/slides/slide19.xml><?xml version="1.0" encoding="utf-8"?>
+<p:sld xmlns:a="http://schemas.openxmlformats.org/drawingml/2006/main" xmlns:r="http://schemas.openxmlformats.org/officeDocument/2006/relationships" xmlns:p="http://schemas.openxmlformats.org/presentationml/2006/main">
+  <p:cSld>
+    <p:spTree>
+      <p:nvGrpSpPr>
+        <p:cNvPr id="1" name=""/>
+        <p:cNvGrpSpPr/>
+        <p:nvPr/>
+      </p:nvGrpSpPr>
+      <p:grpSpPr>
+        <a:xfrm>
+          <a:off x="0" y="0"/>
+          <a:ext cx="0" cy="0"/>
+          <a:chOff x="0" y="0"/>
+          <a:chExt cx="0" cy="0"/>
+        </a:xfrm>
+      </p:grpSpPr>
+      <p:sp>
+        <p:nvSpPr>
+          <p:cNvPr id="2" name="Title 1">
+            <a:extLst>
+              <a:ext uri="{FF2B5EF4-FFF2-40B4-BE49-F238E27FC236}">
+                <a16:creationId xmlns:a16="http://schemas.microsoft.com/office/drawing/2014/main" id="{0D064A50-2A97-421C-813D-6449089693A0}"/>
+              </a:ext>
+            </a:extLst>
+          </p:cNvPr>
+          <p:cNvSpPr>
+            <a:spLocks noGrp="1"/>
+          </p:cNvSpPr>
+          <p:nvPr>
+            <p:ph type="title"/>
+          </p:nvPr>
+        </p:nvSpPr>
+        <p:spPr/>
+        <p:txBody>
+          <a:bodyPr/>
+          <a:lstStyle/>
+          <a:p>
+            <a:pPr lvl="0" marL="0" indent="0">
+              <a:buNone/>
+            </a:pPr>
+            <a:r>
+              <a:rPr/>
+              <a:t>Household</a:t>
+            </a:r>
+            <a:r>
+              <a:rPr/>
+              <a:t> </a:t>
+            </a:r>
+            <a:r>
+              <a:rPr/>
+              <a:t>Type:(Pending)</a:t>
+            </a:r>
+          </a:p>
+        </p:txBody>
+      </p:sp>
     </p:spTree>
   </p:cSld>
 </p:sld>
@@ -4376,7 +4602,7 @@
             </a:pPr>
             <a:r>
               <a:rPr/>
-              <a:t>Research</a:t>
+              <a:t>Data</a:t>
             </a:r>
             <a:r>
               <a:rPr/>
@@ -4384,7 +4610,128 @@
             </a:r>
             <a:r>
               <a:rPr/>
-              <a:t>Questions</a:t>
+              <a:t>Sources:</a:t>
+            </a:r>
+          </a:p>
+        </p:txBody>
+      </p:sp>
+      <p:sp>
+        <p:nvSpPr>
+          <p:cNvPr id="3" name="Content Placeholder 2">
+            <a:extLst>
+              <a:ext uri="{FF2B5EF4-FFF2-40B4-BE49-F238E27FC236}">
+                <a16:creationId xmlns:a16="http://schemas.microsoft.com/office/drawing/2014/main" id="{C0E34547-063B-468C-B841-DB8C0206424E}"/>
+              </a:ext>
+            </a:extLst>
+          </p:cNvPr>
+          <p:cNvSpPr>
+            <a:spLocks noGrp="1"/>
+          </p:cNvSpPr>
+          <p:nvPr>
+            <p:ph idx="1"/>
+          </p:nvPr>
+        </p:nvSpPr>
+        <p:spPr/>
+        <p:txBody>
+          <a:bodyPr/>
+          <a:lstStyle/>
+          <a:p>
+            <a:pPr lvl="1"/>
+            <a:r>
+              <a:rPr>
+                <a:hlinkClick r:id="rId2"/>
+              </a:rPr>
+              <a:t>IPUMS USA</a:t>
+            </a:r>
+          </a:p>
+          <a:p>
+            <a:pPr lvl="2"/>
+            <a:r>
+              <a:rPr/>
+              <a:t>IPUMS at the University of Minnesota</a:t>
+            </a:r>
+          </a:p>
+          <a:p>
+            <a:pPr lvl="2"/>
+            <a:r>
+              <a:rPr/>
+              <a:t>IPUMS pre-processes PUMS files to enable / facilitate research</a:t>
+            </a:r>
+          </a:p>
+          <a:p>
+            <a:pPr lvl="3"/>
+            <a:r>
+              <a:rPr/>
+              <a:t>Example: NOC (U.S. Census) vs. NCHILD (IPUMS) are at household level and individual level respectively</a:t>
+            </a:r>
+          </a:p>
+          <a:p>
+            <a:pPr lvl="1"/>
+            <a:r>
+              <a:rPr>
+                <a:hlinkClick r:id="rId3"/>
+              </a:rPr>
+              <a:t>U.S. Census Bureau</a:t>
+            </a:r>
+          </a:p>
+          <a:p>
+            <a:pPr lvl="2"/>
+            <a:r>
+              <a:rPr/>
+              <a:t>Raw PUMS files directly from the U.S. Census Bureau</a:t>
+            </a:r>
+          </a:p>
+        </p:txBody>
+      </p:sp>
+    </p:spTree>
+  </p:cSld>
+</p:sld>
+</file>
+
+<file path=ppt/slides/slide20.xml><?xml version="1.0" encoding="utf-8"?>
+<p:sld xmlns:a="http://schemas.openxmlformats.org/drawingml/2006/main" xmlns:r="http://schemas.openxmlformats.org/officeDocument/2006/relationships" xmlns:p="http://schemas.openxmlformats.org/presentationml/2006/main">
+  <p:cSld>
+    <p:spTree>
+      <p:nvGrpSpPr>
+        <p:cNvPr id="1" name=""/>
+        <p:cNvGrpSpPr/>
+        <p:nvPr/>
+      </p:nvGrpSpPr>
+      <p:grpSpPr>
+        <a:xfrm>
+          <a:off x="0" y="0"/>
+          <a:ext cx="0" cy="0"/>
+          <a:chOff x="0" y="0"/>
+          <a:chExt cx="0" cy="0"/>
+        </a:xfrm>
+      </p:grpSpPr>
+      <p:sp>
+        <p:nvSpPr>
+          <p:cNvPr id="2" name="Title 1">
+            <a:extLst>
+              <a:ext uri="{FF2B5EF4-FFF2-40B4-BE49-F238E27FC236}">
+                <a16:creationId xmlns:a16="http://schemas.microsoft.com/office/drawing/2014/main" id="{0D064A50-2A97-421C-813D-6449089693A0}"/>
+              </a:ext>
+            </a:extLst>
+          </p:cNvPr>
+          <p:cNvSpPr>
+            <a:spLocks noGrp="1"/>
+          </p:cNvSpPr>
+          <p:nvPr>
+            <p:ph type="title"/>
+          </p:nvPr>
+        </p:nvSpPr>
+        <p:spPr/>
+        <p:txBody>
+          <a:bodyPr/>
+          <a:lstStyle/>
+          <a:p>
+            <a:pPr lvl="0" marL="0" indent="0">
+              <a:buNone/>
+            </a:pPr>
+            <a:r>
+              <a:rPr/>
+              <a:t>Household</a:t>
             </a:r>
             <a:r>
               <a:rPr/>
@@ -4392,7 +4739,7 @@
             </a:r>
             <a:r>
               <a:rPr/>
-              <a:t>of</a:t>
+              <a:t>Characteristics:</a:t>
             </a:r>
             <a:r>
               <a:rPr/>
@@ -4400,25 +4747,71 @@
             </a:r>
             <a:r>
               <a:rPr/>
-              <a:t>Interest</a:t>
-            </a:r>
-          </a:p>
-        </p:txBody>
-      </p:sp>
-      <p:sp>
-        <p:nvSpPr>
-          <p:cNvPr id="3" name="Content Placeholder 2">
-            <a:extLst>
-              <a:ext uri="{FF2B5EF4-FFF2-40B4-BE49-F238E27FC236}">
-                <a16:creationId xmlns:a16="http://schemas.microsoft.com/office/drawing/2014/main" id="{C0E34547-063B-468C-B841-DB8C0206424E}"/>
-              </a:ext>
-            </a:extLst>
-          </p:cNvPr>
-          <p:cNvSpPr>
-            <a:spLocks noGrp="1"/>
-          </p:cNvSpPr>
-          <p:nvPr>
-            <p:ph idx="1"/>
+              <a:t>Workers</a:t>
+            </a:r>
+            <a:r>
+              <a:rPr/>
+              <a:t> </a:t>
+            </a:r>
+            <a:r>
+              <a:rPr/>
+              <a:t>in</a:t>
+            </a:r>
+            <a:r>
+              <a:rPr/>
+              <a:t> </a:t>
+            </a:r>
+            <a:r>
+              <a:rPr/>
+              <a:t>Family</a:t>
+            </a:r>
+            <a:r>
+              <a:rPr/>
+              <a:t> </a:t>
+            </a:r>
+            <a:r>
+              <a:rPr/>
+              <a:t>(Pending)</a:t>
+            </a:r>
+          </a:p>
+        </p:txBody>
+      </p:sp>
+    </p:spTree>
+  </p:cSld>
+</p:sld>
+</file>
+
+<file path=ppt/slides/slide21.xml><?xml version="1.0" encoding="utf-8"?>
+<p:sld xmlns:a="http://schemas.openxmlformats.org/drawingml/2006/main" xmlns:r="http://schemas.openxmlformats.org/officeDocument/2006/relationships" xmlns:p="http://schemas.openxmlformats.org/presentationml/2006/main">
+  <p:cSld>
+    <p:spTree>
+      <p:nvGrpSpPr>
+        <p:cNvPr id="1" name=""/>
+        <p:cNvGrpSpPr/>
+        <p:nvPr/>
+      </p:nvGrpSpPr>
+      <p:grpSpPr>
+        <a:xfrm>
+          <a:off x="0" y="0"/>
+          <a:ext cx="0" cy="0"/>
+          <a:chOff x="0" y="0"/>
+          <a:chExt cx="0" cy="0"/>
+        </a:xfrm>
+      </p:grpSpPr>
+      <p:sp>
+        <p:nvSpPr>
+          <p:cNvPr id="2" name="Title 1">
+            <a:extLst>
+              <a:ext uri="{FF2B5EF4-FFF2-40B4-BE49-F238E27FC236}">
+                <a16:creationId xmlns:a16="http://schemas.microsoft.com/office/drawing/2014/main" id="{0D064A50-2A97-421C-813D-6449089693A0}"/>
+              </a:ext>
+            </a:extLst>
+          </p:cNvPr>
+          <p:cNvSpPr>
+            <a:spLocks noGrp="1"/>
+          </p:cNvSpPr>
+          <p:nvPr>
+            <p:ph type="title"/>
           </p:nvPr>
         </p:nvSpPr>
         <p:spPr/>
@@ -4426,24 +4819,221 @@
           <a:bodyPr/>
           <a:lstStyle/>
           <a:p>
-            <a:pPr lvl="1"/>
-            <a:r>
-              <a:rPr/>
-              <a:t>Are Opportunity Youth caring for children?</a:t>
-            </a:r>
-          </a:p>
-          <a:p>
-            <a:pPr lvl="1"/>
-            <a:r>
-              <a:rPr/>
-              <a:t>What are the household income characteristics of Opportunity Youth?</a:t>
-            </a:r>
-          </a:p>
-          <a:p>
-            <a:pPr lvl="1"/>
-            <a:r>
-              <a:rPr/>
-              <a:t>Mobility Status</a:t>
+            <a:pPr lvl="0" marL="0" indent="0">
+              <a:buNone/>
+            </a:pPr>
+            <a:r>
+              <a:rPr/>
+              <a:t>Same-sex</a:t>
+            </a:r>
+            <a:r>
+              <a:rPr/>
+              <a:t> </a:t>
+            </a:r>
+            <a:r>
+              <a:rPr/>
+              <a:t>households</a:t>
+            </a:r>
+            <a:r>
+              <a:rPr/>
+              <a:t> </a:t>
+            </a:r>
+            <a:r>
+              <a:rPr/>
+              <a:t>(Pending)</a:t>
+            </a:r>
+          </a:p>
+        </p:txBody>
+      </p:sp>
+    </p:spTree>
+  </p:cSld>
+</p:sld>
+</file>
+
+<file path=ppt/slides/slide22.xml><?xml version="1.0" encoding="utf-8"?>
+<p:sld xmlns:a="http://schemas.openxmlformats.org/drawingml/2006/main" xmlns:r="http://schemas.openxmlformats.org/officeDocument/2006/relationships" xmlns:p="http://schemas.openxmlformats.org/presentationml/2006/main">
+  <p:cSld>
+    <p:spTree>
+      <p:nvGrpSpPr>
+        <p:cNvPr id="1" name=""/>
+        <p:cNvGrpSpPr/>
+        <p:nvPr/>
+      </p:nvGrpSpPr>
+      <p:grpSpPr>
+        <a:xfrm>
+          <a:off x="0" y="0"/>
+          <a:ext cx="0" cy="0"/>
+          <a:chOff x="0" y="0"/>
+          <a:chExt cx="0" cy="0"/>
+        </a:xfrm>
+      </p:grpSpPr>
+      <p:sp>
+        <p:nvSpPr>
+          <p:cNvPr id="2" name="Title 1">
+            <a:extLst>
+              <a:ext uri="{FF2B5EF4-FFF2-40B4-BE49-F238E27FC236}">
+                <a16:creationId xmlns:a16="http://schemas.microsoft.com/office/drawing/2014/main" id="{0D064A50-2A97-421C-813D-6449089693A0}"/>
+              </a:ext>
+            </a:extLst>
+          </p:cNvPr>
+          <p:cNvSpPr>
+            <a:spLocks noGrp="1"/>
+          </p:cNvSpPr>
+          <p:nvPr>
+            <p:ph type="title"/>
+          </p:nvPr>
+        </p:nvSpPr>
+        <p:spPr/>
+        <p:txBody>
+          <a:bodyPr/>
+          <a:lstStyle/>
+          <a:p>
+            <a:pPr lvl="0" marL="0" indent="0">
+              <a:buNone/>
+            </a:pPr>
+            <a:r>
+              <a:rPr/>
+              <a:t>Multi-generational</a:t>
+            </a:r>
+            <a:r>
+              <a:rPr/>
+              <a:t> </a:t>
+            </a:r>
+            <a:r>
+              <a:rPr/>
+              <a:t>Families</a:t>
+            </a:r>
+            <a:r>
+              <a:rPr/>
+              <a:t> </a:t>
+            </a:r>
+            <a:r>
+              <a:rPr/>
+              <a:t>(Pending)</a:t>
+            </a:r>
+          </a:p>
+        </p:txBody>
+      </p:sp>
+    </p:spTree>
+  </p:cSld>
+</p:sld>
+</file>
+
+<file path=ppt/slides/slide23.xml><?xml version="1.0" encoding="utf-8"?>
+<p:sld xmlns:a="http://schemas.openxmlformats.org/drawingml/2006/main" xmlns:r="http://schemas.openxmlformats.org/officeDocument/2006/relationships" xmlns:p="http://schemas.openxmlformats.org/presentationml/2006/main">
+  <p:cSld>
+    <p:spTree>
+      <p:nvGrpSpPr>
+        <p:cNvPr id="1" name=""/>
+        <p:cNvGrpSpPr/>
+        <p:nvPr/>
+      </p:nvGrpSpPr>
+      <p:grpSpPr>
+        <a:xfrm>
+          <a:off x="0" y="0"/>
+          <a:ext cx="0" cy="0"/>
+          <a:chOff x="0" y="0"/>
+          <a:chExt cx="0" cy="0"/>
+        </a:xfrm>
+      </p:grpSpPr>
+      <p:sp>
+        <p:nvSpPr>
+          <p:cNvPr id="2" name="Title 1">
+            <a:extLst>
+              <a:ext uri="{FF2B5EF4-FFF2-40B4-BE49-F238E27FC236}">
+                <a16:creationId xmlns:a16="http://schemas.microsoft.com/office/drawing/2014/main" id="{1CAF8530-DA25-40F0-835B-ABF68B3EB818}"/>
+              </a:ext>
+            </a:extLst>
+          </p:cNvPr>
+          <p:cNvSpPr>
+            <a:spLocks noGrp="1"/>
+          </p:cNvSpPr>
+          <p:nvPr>
+            <p:ph type="title"/>
+          </p:nvPr>
+        </p:nvSpPr>
+        <p:spPr>
+          <a:xfrm>
+            <a:off x="831850" y="1123072"/>
+            <a:ext cx="10515600" cy="2852737"/>
+          </a:xfrm>
+        </p:spPr>
+        <p:txBody>
+          <a:bodyPr/>
+          <a:lstStyle/>
+          <a:p>
+            <a:pPr lvl="0" marL="0" indent="0">
+              <a:buNone/>
+            </a:pPr>
+            <a:r>
+              <a:rPr/>
+              <a:t>Questions?</a:t>
+            </a:r>
+          </a:p>
+        </p:txBody>
+      </p:sp>
+    </p:spTree>
+  </p:cSld>
+</p:sld>
+</file>
+
+<file path=ppt/slides/slide24.xml><?xml version="1.0" encoding="utf-8"?>
+<p:sld xmlns:a="http://schemas.openxmlformats.org/drawingml/2006/main" xmlns:r="http://schemas.openxmlformats.org/officeDocument/2006/relationships" xmlns:p="http://schemas.openxmlformats.org/presentationml/2006/main">
+  <p:cSld>
+    <p:spTree>
+      <p:nvGrpSpPr>
+        <p:cNvPr id="1" name=""/>
+        <p:cNvGrpSpPr/>
+        <p:nvPr/>
+      </p:nvGrpSpPr>
+      <p:grpSpPr>
+        <a:xfrm>
+          <a:off x="0" y="0"/>
+          <a:ext cx="0" cy="0"/>
+          <a:chOff x="0" y="0"/>
+          <a:chExt cx="0" cy="0"/>
+        </a:xfrm>
+      </p:grpSpPr>
+      <p:sp>
+        <p:nvSpPr>
+          <p:cNvPr id="2" name="Title 1">
+            <a:extLst>
+              <a:ext uri="{FF2B5EF4-FFF2-40B4-BE49-F238E27FC236}">
+                <a16:creationId xmlns:a16="http://schemas.microsoft.com/office/drawing/2014/main" id="{1CAF8530-DA25-40F0-835B-ABF68B3EB818}"/>
+              </a:ext>
+            </a:extLst>
+          </p:cNvPr>
+          <p:cNvSpPr>
+            <a:spLocks noGrp="1"/>
+          </p:cNvSpPr>
+          <p:nvPr>
+            <p:ph type="title"/>
+          </p:nvPr>
+        </p:nvSpPr>
+        <p:spPr>
+          <a:xfrm>
+            <a:off x="831850" y="1123072"/>
+            <a:ext cx="10515600" cy="2852737"/>
+          </a:xfrm>
+        </p:spPr>
+        <p:txBody>
+          <a:bodyPr/>
+          <a:lstStyle/>
+          <a:p>
+            <a:pPr lvl="0" marL="0" indent="0">
+              <a:buNone/>
+            </a:pPr>
+            <a:r>
+              <a:rPr/>
+              <a:t>Thank</a:t>
+            </a:r>
+            <a:r>
+              <a:rPr/>
+              <a:t> </a:t>
+            </a:r>
+            <a:r>
+              <a:rPr/>
+              <a:t>you!</a:t>
             </a:r>
           </a:p>
         </p:txBody>
@@ -4496,7 +5086,7 @@
             </a:pPr>
             <a:r>
               <a:rPr/>
-              <a:t>Heads</a:t>
+              <a:t>Research</a:t>
             </a:r>
             <a:r>
               <a:rPr/>
@@ -4504,6 +5094,14 @@
             </a:r>
             <a:r>
               <a:rPr/>
+              <a:t>Questions</a:t>
+            </a:r>
+            <a:r>
+              <a:rPr/>
+              <a:t> </a:t>
+            </a:r>
+            <a:r>
+              <a:rPr/>
               <a:t>of</a:t>
             </a:r>
             <a:r>
@@ -4512,41 +5110,103 @@
             </a:r>
             <a:r>
               <a:rPr/>
-              <a:t>Household</a:t>
-            </a:r>
-          </a:p>
-        </p:txBody>
-      </p:sp>
-      <p:pic>
-        <p:nvPicPr>
-          <p:cNvPr descr="household_structure_estimates_files/figure-pptx/unnamed-chunk-3-1.png" id="0" name="Picture 1"/>
-          <p:cNvPicPr>
-            <a:picLocks noGrp="1" noChangeAspect="1"/>
-          </p:cNvPicPr>
-          <p:nvPr/>
-        </p:nvPicPr>
-        <p:blipFill>
-          <a:blip r:embed="rId2"/>
-          <a:stretch>
-            <a:fillRect/>
-          </a:stretch>
-        </p:blipFill>
-        <p:spPr bwMode="auto">
-          <a:xfrm>
-            <a:off x="1752600" y="1816100"/>
-            <a:ext cx="8686800" cy="4343400"/>
-          </a:xfrm>
-          <a:prstGeom prst="rect">
-            <a:avLst/>
-          </a:prstGeom>
-          <a:noFill/>
-          <a:ln w="9525">
-            <a:noFill/>
-            <a:headEnd/>
-            <a:tailEnd/>
-          </a:ln>
-        </p:spPr>
-      </p:pic>
+              <a:t>Interest</a:t>
+            </a:r>
+          </a:p>
+        </p:txBody>
+      </p:sp>
+      <p:sp>
+        <p:nvSpPr>
+          <p:cNvPr id="3" name="Content Placeholder 2">
+            <a:extLst>
+              <a:ext uri="{FF2B5EF4-FFF2-40B4-BE49-F238E27FC236}">
+                <a16:creationId xmlns:a16="http://schemas.microsoft.com/office/drawing/2014/main" id="{C0E34547-063B-468C-B841-DB8C0206424E}"/>
+              </a:ext>
+            </a:extLst>
+          </p:cNvPr>
+          <p:cNvSpPr>
+            <a:spLocks noGrp="1"/>
+          </p:cNvSpPr>
+          <p:nvPr>
+            <p:ph idx="1"/>
+          </p:nvPr>
+        </p:nvSpPr>
+        <p:spPr/>
+        <p:txBody>
+          <a:bodyPr/>
+          <a:lstStyle/>
+          <a:p>
+            <a:pPr lvl="1"/>
+            <a:r>
+              <a:rPr/>
+              <a:t>Are Opportunity Youth caring for children?</a:t>
+            </a:r>
+          </a:p>
+          <a:p>
+            <a:pPr lvl="2"/>
+            <a:r>
+              <a:rPr/>
+              <a:t>At least one child</a:t>
+            </a:r>
+          </a:p>
+          <a:p>
+            <a:pPr lvl="2"/>
+            <a:r>
+              <a:rPr/>
+              <a:t>Number of children</a:t>
+            </a:r>
+          </a:p>
+          <a:p>
+            <a:pPr lvl="1"/>
+            <a:r>
+              <a:rPr/>
+              <a:t>What are the household income characteristics of Opportunity Youth?</a:t>
+            </a:r>
+          </a:p>
+          <a:p>
+            <a:pPr lvl="2"/>
+            <a:r>
+              <a:rPr/>
+              <a:t>Household income by household type</a:t>
+            </a:r>
+          </a:p>
+          <a:p>
+            <a:pPr lvl="2"/>
+            <a:r>
+              <a:rPr/>
+              <a:t>Total personal income</a:t>
+            </a:r>
+          </a:p>
+          <a:p>
+            <a:pPr lvl="1"/>
+            <a:r>
+              <a:rPr/>
+              <a:t>Mobility Status</a:t>
+            </a:r>
+          </a:p>
+          <a:p>
+            <a:pPr lvl="2"/>
+            <a:r>
+              <a:rPr/>
+              <a:t>Migration, mode of transportation, and average commute time</a:t>
+            </a:r>
+          </a:p>
+          <a:p>
+            <a:pPr lvl="1"/>
+            <a:r>
+              <a:rPr/>
+              <a:t>Pending</a:t>
+            </a:r>
+          </a:p>
+          <a:p>
+            <a:pPr lvl="2"/>
+            <a:r>
+              <a:rPr/>
+              <a:t>Food Stamps Recipients, Household Types, Number of Workers in Family, Same-Sex Households, Multi-generational Families</a:t>
+            </a:r>
+          </a:p>
+        </p:txBody>
+      </p:sp>
     </p:spTree>
   </p:cSld>
 </p:sld>
@@ -4574,7 +5234,7 @@
           <p:cNvPr id="2" name="Title 1">
             <a:extLst>
               <a:ext uri="{FF2B5EF4-FFF2-40B4-BE49-F238E27FC236}">
-                <a16:creationId xmlns:a16="http://schemas.microsoft.com/office/drawing/2014/main" id="{0D064A50-2A97-421C-813D-6449089693A0}"/>
+                <a16:creationId xmlns:a16="http://schemas.microsoft.com/office/drawing/2014/main" id="{1CAF8530-DA25-40F0-835B-ABF68B3EB818}"/>
               </a:ext>
             </a:extLst>
           </p:cNvPr>
@@ -4585,7 +5245,12 @@
             <p:ph type="title"/>
           </p:nvPr>
         </p:nvSpPr>
-        <p:spPr/>
+        <p:spPr>
+          <a:xfrm>
+            <a:off x="831850" y="1123072"/>
+            <a:ext cx="10515600" cy="2852737"/>
+          </a:xfrm>
+        </p:spPr>
         <p:txBody>
           <a:bodyPr/>
           <a:lstStyle/>
@@ -4595,65 +5260,11 @@
             </a:pPr>
             <a:r>
               <a:rPr/>
-              <a:t>Do</a:t>
-            </a:r>
-            <a:r>
-              <a:rPr/>
-              <a:t> </a:t>
-            </a:r>
-            <a:r>
-              <a:rPr/>
-              <a:t>they</a:t>
-            </a:r>
-            <a:r>
-              <a:rPr/>
-              <a:t> </a:t>
-            </a:r>
-            <a:r>
-              <a:rPr/>
-              <a:t>have</a:t>
-            </a:r>
-            <a:r>
-              <a:rPr/>
-              <a:t> </a:t>
-            </a:r>
-            <a:r>
-              <a:rPr/>
-              <a:t>children?</a:t>
-            </a:r>
-          </a:p>
-        </p:txBody>
-      </p:sp>
-      <p:pic>
-        <p:nvPicPr>
-          <p:cNvPr descr="household_structure_estimates_files/figure-pptx/unnamed-chunk-4-1.png" id="0" name="Picture 1"/>
-          <p:cNvPicPr>
-            <a:picLocks noGrp="1" noChangeAspect="1"/>
-          </p:cNvPicPr>
-          <p:nvPr/>
-        </p:nvPicPr>
-        <p:blipFill>
-          <a:blip r:embed="rId2"/>
-          <a:stretch>
-            <a:fillRect/>
-          </a:stretch>
-        </p:blipFill>
-        <p:spPr bwMode="auto">
-          <a:xfrm>
-            <a:off x="1752600" y="1816100"/>
-            <a:ext cx="8686800" cy="4343400"/>
-          </a:xfrm>
-          <a:prstGeom prst="rect">
-            <a:avLst/>
-          </a:prstGeom>
-          <a:noFill/>
-          <a:ln w="9525">
-            <a:noFill/>
-            <a:headEnd/>
-            <a:tailEnd/>
-          </a:ln>
-        </p:spPr>
-      </p:pic>
+              <a:t>Results</a:t>
+            </a:r>
+          </a:p>
+        </p:txBody>
+      </p:sp>
     </p:spTree>
   </p:cSld>
 </p:sld>
@@ -4702,6 +5313,14 @@
             </a:pPr>
             <a:r>
               <a:rPr/>
+              <a:t>Refresher:</a:t>
+            </a:r>
+            <a:r>
+              <a:rPr/>
+              <a:t> </a:t>
+            </a:r>
+            <a:r>
+              <a:rPr/>
               <a:t>Number</a:t>
             </a:r>
             <a:r>
@@ -4718,14 +5337,22 @@
             </a:r>
             <a:r>
               <a:rPr/>
-              <a:t>Children</a:t>
+              <a:t>Opportunity</a:t>
+            </a:r>
+            <a:r>
+              <a:rPr/>
+              <a:t> </a:t>
+            </a:r>
+            <a:r>
+              <a:rPr/>
+              <a:t>Youth</a:t>
             </a:r>
           </a:p>
         </p:txBody>
       </p:sp>
       <p:pic>
         <p:nvPicPr>
-          <p:cNvPr descr="household_structure_estimates_files/figure-pptx/unnamed-chunk-5-1.png" id="0" name="Picture 1"/>
+          <p:cNvPr descr="household_structure_estimates_files/figure-pptx/unnamed-chunk-3-1.png" id="0" name="Picture 1"/>
           <p:cNvPicPr>
             <a:picLocks noGrp="1" noChangeAspect="1"/>
           </p:cNvPicPr>
@@ -4801,7 +5428,7 @@
             </a:pPr>
             <a:r>
               <a:rPr/>
-              <a:t>Income</a:t>
+              <a:t>Heads</a:t>
             </a:r>
             <a:r>
               <a:rPr/>
@@ -4809,7 +5436,7 @@
             </a:r>
             <a:r>
               <a:rPr/>
-              <a:t>Characteristics:</a:t>
+              <a:t>of</a:t>
             </a:r>
             <a:r>
               <a:rPr/>
@@ -4818,21 +5445,13 @@
             <a:r>
               <a:rPr/>
               <a:t>Household</a:t>
-            </a:r>
-            <a:r>
-              <a:rPr/>
-              <a:t> </a:t>
-            </a:r>
-            <a:r>
-              <a:rPr/>
-              <a:t>Income</a:t>
             </a:r>
           </a:p>
         </p:txBody>
       </p:sp>
       <p:pic>
         <p:nvPicPr>
-          <p:cNvPr descr="household_structure_estimates_files/figure-pptx/unnamed-chunk-6-1.png" id="0" name="Picture 1"/>
+          <p:cNvPr descr="household_structure_estimates_files/figure-pptx/unnamed-chunk-4-1.png" id="0" name="Picture 1"/>
           <p:cNvPicPr>
             <a:picLocks noGrp="1" noChangeAspect="1"/>
           </p:cNvPicPr>
@@ -4908,7 +5527,7 @@
             </a:pPr>
             <a:r>
               <a:rPr/>
-              <a:t>Income</a:t>
+              <a:t>Do</a:t>
             </a:r>
             <a:r>
               <a:rPr/>
@@ -4916,7 +5535,7 @@
             </a:r>
             <a:r>
               <a:rPr/>
-              <a:t>Characteristics:</a:t>
+              <a:t>they</a:t>
             </a:r>
             <a:r>
               <a:rPr/>
@@ -4924,7 +5543,7 @@
             </a:r>
             <a:r>
               <a:rPr/>
-              <a:t>Total</a:t>
+              <a:t>have</a:t>
             </a:r>
             <a:r>
               <a:rPr/>
@@ -4932,22 +5551,14 @@
             </a:r>
             <a:r>
               <a:rPr/>
-              <a:t>Personal</a:t>
-            </a:r>
-            <a:r>
-              <a:rPr/>
-              <a:t> </a:t>
-            </a:r>
-            <a:r>
-              <a:rPr/>
-              <a:t>Income</a:t>
+              <a:t>children?</a:t>
             </a:r>
           </a:p>
         </p:txBody>
       </p:sp>
       <p:pic>
         <p:nvPicPr>
-          <p:cNvPr descr="household_structure_estimates_files/figure-pptx/unnamed-chunk-7-1.png" id="0" name="Picture 1"/>
+          <p:cNvPr descr="household_structure_estimates_files/figure-pptx/unnamed-chunk-5-1.png" id="0" name="Picture 1"/>
           <p:cNvPicPr>
             <a:picLocks noGrp="1" noChangeAspect="1"/>
           </p:cNvPicPr>
@@ -5023,7 +5634,7 @@
             </a:pPr>
             <a:r>
               <a:rPr/>
-              <a:t>Income</a:t>
+              <a:t>Number</a:t>
             </a:r>
             <a:r>
               <a:rPr/>
@@ -5031,7 +5642,7 @@
             </a:r>
             <a:r>
               <a:rPr/>
-              <a:t>Characteristics:</a:t>
+              <a:t>of</a:t>
             </a:r>
             <a:r>
               <a:rPr/>
@@ -5039,27 +5650,41 @@
             </a:r>
             <a:r>
               <a:rPr/>
-              <a:t>Food</a:t>
-            </a:r>
-            <a:r>
-              <a:rPr/>
-              <a:t> </a:t>
-            </a:r>
-            <a:r>
-              <a:rPr/>
-              <a:t>Stamps</a:t>
-            </a:r>
-            <a:r>
-              <a:rPr/>
-              <a:t> </a:t>
-            </a:r>
-            <a:r>
-              <a:rPr/>
-              <a:t>(Pending)</a:t>
-            </a:r>
-          </a:p>
-        </p:txBody>
-      </p:sp>
+              <a:t>Children</a:t>
+            </a:r>
+          </a:p>
+        </p:txBody>
+      </p:sp>
+      <p:pic>
+        <p:nvPicPr>
+          <p:cNvPr descr="household_structure_estimates_files/figure-pptx/unnamed-chunk-6-1.png" id="0" name="Picture 1"/>
+          <p:cNvPicPr>
+            <a:picLocks noGrp="1" noChangeAspect="1"/>
+          </p:cNvPicPr>
+          <p:nvPr/>
+        </p:nvPicPr>
+        <p:blipFill>
+          <a:blip r:embed="rId2"/>
+          <a:stretch>
+            <a:fillRect/>
+          </a:stretch>
+        </p:blipFill>
+        <p:spPr bwMode="auto">
+          <a:xfrm>
+            <a:off x="1752600" y="1816100"/>
+            <a:ext cx="8686800" cy="4343400"/>
+          </a:xfrm>
+          <a:prstGeom prst="rect">
+            <a:avLst/>
+          </a:prstGeom>
+          <a:noFill/>
+          <a:ln w="9525">
+            <a:noFill/>
+            <a:headEnd/>
+            <a:tailEnd/>
+          </a:ln>
+        </p:spPr>
+      </p:pic>
     </p:spTree>
   </p:cSld>
 </p:sld>
@@ -5108,19 +5733,57 @@
             </a:pPr>
             <a:r>
               <a:rPr/>
+              <a:t>Type</a:t>
+            </a:r>
+            <a:r>
+              <a:rPr/>
+              <a:t> </a:t>
+            </a:r>
+            <a:r>
+              <a:rPr/>
+              <a:t>of</a:t>
+            </a:r>
+            <a:r>
+              <a:rPr/>
+              <a:t> </a:t>
+            </a:r>
+            <a:r>
+              <a:rPr/>
               <a:t>Household</a:t>
             </a:r>
-            <a:r>
-              <a:rPr/>
-              <a:t> </a:t>
-            </a:r>
-            <a:r>
-              <a:rPr/>
-              <a:t>Type:(Pending)</a:t>
-            </a:r>
-          </a:p>
-        </p:txBody>
-      </p:sp>
+          </a:p>
+        </p:txBody>
+      </p:sp>
+      <p:pic>
+        <p:nvPicPr>
+          <p:cNvPr descr="household_structure_estimates_files/figure-pptx/unnamed-chunk-7-1.png" id="0" name="Picture 1"/>
+          <p:cNvPicPr>
+            <a:picLocks noGrp="1" noChangeAspect="1"/>
+          </p:cNvPicPr>
+          <p:nvPr/>
+        </p:nvPicPr>
+        <p:blipFill>
+          <a:blip r:embed="rId2"/>
+          <a:stretch>
+            <a:fillRect/>
+          </a:stretch>
+        </p:blipFill>
+        <p:spPr bwMode="auto">
+          <a:xfrm>
+            <a:off x="1752600" y="1816100"/>
+            <a:ext cx="8686800" cy="4343400"/>
+          </a:xfrm>
+          <a:prstGeom prst="rect">
+            <a:avLst/>
+          </a:prstGeom>
+          <a:noFill/>
+          <a:ln w="9525">
+            <a:noFill/>
+            <a:headEnd/>
+            <a:tailEnd/>
+          </a:ln>
+        </p:spPr>
+      </p:pic>
     </p:spTree>
   </p:cSld>
 </p:sld>

</xml_diff>

<commit_message>
updated household types to include connected youth only households for comparison and updated visualizations
</commit_message>
<xml_diff>
--- a/create_powerpoint/household_structure_estimates.pptx
+++ b/create_powerpoint/household_structure_estimates.pptx
@@ -29,6 +29,7 @@
     <p:sldId id="277" r:id="rId23"/>
     <p:sldId id="278" r:id="rId24"/>
     <p:sldId id="279" r:id="rId25"/>
+    <p:sldId id="280" r:id="rId26"/>
   </p:sldIdLst>
   <p:sldSz cx="12192000" cy="6858000"/>
   <p:notesSz cx="6858000" cy="9144000"/>
@@ -3673,7 +3674,7 @@
             </a:pPr>
             <a:r>
               <a:rPr/>
-              <a:t>Income</a:t>
+              <a:t>Type</a:t>
             </a:r>
             <a:r>
               <a:rPr/>
@@ -3681,7 +3682,7 @@
             </a:r>
             <a:r>
               <a:rPr/>
-              <a:t>Characteristics:</a:t>
+              <a:t>of</a:t>
             </a:r>
             <a:r>
               <a:rPr/>
@@ -3690,21 +3691,13 @@
             <a:r>
               <a:rPr/>
               <a:t>Household</a:t>
-            </a:r>
-            <a:r>
-              <a:rPr/>
-              <a:t> </a:t>
-            </a:r>
-            <a:r>
-              <a:rPr/>
-              <a:t>Income</a:t>
             </a:r>
           </a:p>
         </p:txBody>
       </p:sp>
       <p:pic>
         <p:nvPicPr>
-          <p:cNvPr descr="household_structure_estimates_files/figure-pptx/unnamed-chunk-8-1.png" id="0" name="Picture 1"/>
+          <p:cNvPr descr="household_structure_estimates_files/figure-pptx/unnamed-chunk-7-1.png" id="0" name="Picture 1"/>
           <p:cNvPicPr>
             <a:picLocks noGrp="1" noChangeAspect="1"/>
           </p:cNvPicPr>
@@ -3796,7 +3789,7 @@
             </a:r>
             <a:r>
               <a:rPr/>
-              <a:t>Total</a:t>
+              <a:t>Average</a:t>
             </a:r>
             <a:r>
               <a:rPr/>
@@ -3804,7 +3797,7 @@
             </a:r>
             <a:r>
               <a:rPr/>
-              <a:t>Personal</a:t>
+              <a:t>Household</a:t>
             </a:r>
             <a:r>
               <a:rPr/>
@@ -3819,7 +3812,7 @@
       </p:sp>
       <p:pic>
         <p:nvPicPr>
-          <p:cNvPr descr="household_structure_estimates_files/figure-pptx/unnamed-chunk-9-1.png" id="0" name="Picture 1"/>
+          <p:cNvPr descr="household_structure_estimates_files/figure-pptx/unnamed-chunk-8-1.png" id="0" name="Picture 1"/>
           <p:cNvPicPr>
             <a:picLocks noGrp="1" noChangeAspect="1"/>
           </p:cNvPicPr>
@@ -3895,7 +3888,7 @@
             </a:pPr>
             <a:r>
               <a:rPr/>
-              <a:t>Marital</a:t>
+              <a:t>Income</a:t>
             </a:r>
             <a:r>
               <a:rPr/>
@@ -3903,7 +3896,7 @@
             </a:r>
             <a:r>
               <a:rPr/>
-              <a:t>Status</a:t>
+              <a:t>Characteristics:</a:t>
             </a:r>
             <a:r>
               <a:rPr/>
@@ -3911,7 +3904,7 @@
             </a:r>
             <a:r>
               <a:rPr/>
-              <a:t>/</a:t>
+              <a:t>Total</a:t>
             </a:r>
             <a:r>
               <a:rPr/>
@@ -3919,14 +3912,30 @@
             </a:r>
             <a:r>
               <a:rPr/>
-              <a:t>Partnered</a:t>
+              <a:t>Average</a:t>
+            </a:r>
+            <a:r>
+              <a:rPr/>
+              <a:t> </a:t>
+            </a:r>
+            <a:r>
+              <a:rPr/>
+              <a:t>Personal</a:t>
+            </a:r>
+            <a:r>
+              <a:rPr/>
+              <a:t> </a:t>
+            </a:r>
+            <a:r>
+              <a:rPr/>
+              <a:t>Income</a:t>
             </a:r>
           </a:p>
         </p:txBody>
       </p:sp>
       <p:pic>
         <p:nvPicPr>
-          <p:cNvPr descr="household_structure_estimates_files/figure-pptx/unnamed-chunk-11-1.png" id="0" name="Picture 1"/>
+          <p:cNvPr descr="household_structure_estimates_files/figure-pptx/unnamed-chunk-9-1.png" id="0" name="Picture 1"/>
           <p:cNvPicPr>
             <a:picLocks noGrp="1" noChangeAspect="1"/>
           </p:cNvPicPr>
@@ -4002,14 +4011,22 @@
             </a:pPr>
             <a:r>
               <a:rPr/>
-              <a:t>Partnered</a:t>
+              <a:t>Marital</a:t>
+            </a:r>
+            <a:r>
+              <a:rPr/>
+              <a:t> </a:t>
+            </a:r>
+            <a:r>
+              <a:rPr/>
+              <a:t>Status</a:t>
             </a:r>
           </a:p>
         </p:txBody>
       </p:sp>
       <p:pic>
         <p:nvPicPr>
-          <p:cNvPr descr="household_structure_estimates_files/figure-pptx/unnamed-chunk-12-1.png" id="0" name="Picture 1"/>
+          <p:cNvPr descr="household_structure_estimates_files/figure-pptx/unnamed-chunk-11-1.png" id="0" name="Picture 1"/>
           <p:cNvPicPr>
             <a:picLocks noGrp="1" noChangeAspect="1"/>
           </p:cNvPicPr>
@@ -4085,22 +4102,14 @@
             </a:pPr>
             <a:r>
               <a:rPr/>
-              <a:t>Mobility:</a:t>
-            </a:r>
-            <a:r>
-              <a:rPr/>
-              <a:t> </a:t>
-            </a:r>
-            <a:r>
-              <a:rPr/>
-              <a:t>Migration</a:t>
+              <a:t>Partnered</a:t>
             </a:r>
           </a:p>
         </p:txBody>
       </p:sp>
       <p:pic>
         <p:nvPicPr>
-          <p:cNvPr descr="household_structure_estimates_files/figure-pptx/unnamed-chunk-13-1.png" id="0" name="Picture 1"/>
+          <p:cNvPr descr="household_structure_estimates_files/figure-pptx/unnamed-chunk-12-1.png" id="0" name="Picture 1"/>
           <p:cNvPicPr>
             <a:picLocks noGrp="1" noChangeAspect="1"/>
           </p:cNvPicPr>
@@ -4184,30 +4193,14 @@
             </a:r>
             <a:r>
               <a:rPr/>
-              <a:t>Mode</a:t>
-            </a:r>
-            <a:r>
-              <a:rPr/>
-              <a:t> </a:t>
-            </a:r>
-            <a:r>
-              <a:rPr/>
-              <a:t>of</a:t>
-            </a:r>
-            <a:r>
-              <a:rPr/>
-              <a:t> </a:t>
-            </a:r>
-            <a:r>
-              <a:rPr/>
-              <a:t>Transportation</a:t>
+              <a:t>Migration</a:t>
             </a:r>
           </a:p>
         </p:txBody>
       </p:sp>
       <p:pic>
         <p:nvPicPr>
-          <p:cNvPr descr="household_structure_estimates_files/figure-pptx/unnamed-chunk-14-1.png" id="0" name="Picture 1"/>
+          <p:cNvPr descr="household_structure_estimates_files/figure-pptx/unnamed-chunk-13-1.png" id="0" name="Picture 1"/>
           <p:cNvPicPr>
             <a:picLocks noGrp="1" noChangeAspect="1"/>
           </p:cNvPicPr>
@@ -4283,7 +4276,7 @@
             </a:pPr>
             <a:r>
               <a:rPr/>
-              <a:t>Migration:</a:t>
+              <a:t>Mobility:</a:t>
             </a:r>
             <a:r>
               <a:rPr/>
@@ -4291,7 +4284,7 @@
             </a:r>
             <a:r>
               <a:rPr/>
-              <a:t>Average</a:t>
+              <a:t>Mode</a:t>
             </a:r>
             <a:r>
               <a:rPr/>
@@ -4299,7 +4292,7 @@
             </a:r>
             <a:r>
               <a:rPr/>
-              <a:t>Commute</a:t>
+              <a:t>of</a:t>
             </a:r>
             <a:r>
               <a:rPr/>
@@ -4307,14 +4300,38 @@
             </a:r>
             <a:r>
               <a:rPr/>
-              <a:t>Time</a:t>
+              <a:t>Transportation</a:t>
+            </a:r>
+            <a:r>
+              <a:rPr/>
+              <a:t> </a:t>
+            </a:r>
+            <a:r>
+              <a:rPr/>
+              <a:t>for</a:t>
+            </a:r>
+            <a:r>
+              <a:rPr/>
+              <a:t> </a:t>
+            </a:r>
+            <a:r>
+              <a:rPr/>
+              <a:t>Connected</a:t>
+            </a:r>
+            <a:r>
+              <a:rPr/>
+              <a:t> </a:t>
+            </a:r>
+            <a:r>
+              <a:rPr/>
+              <a:t>Youth</a:t>
             </a:r>
           </a:p>
         </p:txBody>
       </p:sp>
       <p:pic>
         <p:nvPicPr>
-          <p:cNvPr descr="household_structure_estimates_files/figure-pptx/unnamed-chunk-15-1.png" id="0" name="Picture 1"/>
+          <p:cNvPr descr="household_structure_estimates_files/figure-pptx/unnamed-chunk-14-1.png" id="0" name="Picture 1"/>
           <p:cNvPicPr>
             <a:picLocks noGrp="1" noChangeAspect="1"/>
           </p:cNvPicPr>
@@ -4369,7 +4386,7 @@
           <p:cNvPr id="2" name="Title 1">
             <a:extLst>
               <a:ext uri="{FF2B5EF4-FFF2-40B4-BE49-F238E27FC236}">
-                <a16:creationId xmlns:a16="http://schemas.microsoft.com/office/drawing/2014/main" id="{1CAF8530-DA25-40F0-835B-ABF68B3EB818}"/>
+                <a16:creationId xmlns:a16="http://schemas.microsoft.com/office/drawing/2014/main" id="{0D064A50-2A97-421C-813D-6449089693A0}"/>
               </a:ext>
             </a:extLst>
           </p:cNvPr>
@@ -4380,34 +4397,99 @@
             <p:ph type="title"/>
           </p:nvPr>
         </p:nvSpPr>
-        <p:spPr>
+        <p:spPr/>
+        <p:txBody>
+          <a:bodyPr/>
+          <a:lstStyle/>
+          <a:p>
+            <a:pPr lvl="0" marL="0" indent="0">
+              <a:buNone/>
+            </a:pPr>
+            <a:r>
+              <a:rPr/>
+              <a:t>Migration:</a:t>
+            </a:r>
+            <a:r>
+              <a:rPr/>
+              <a:t> </a:t>
+            </a:r>
+            <a:r>
+              <a:rPr/>
+              <a:t>Average</a:t>
+            </a:r>
+            <a:r>
+              <a:rPr/>
+              <a:t> </a:t>
+            </a:r>
+            <a:r>
+              <a:rPr/>
+              <a:t>Commute</a:t>
+            </a:r>
+            <a:r>
+              <a:rPr/>
+              <a:t> </a:t>
+            </a:r>
+            <a:r>
+              <a:rPr/>
+              <a:t>Time</a:t>
+            </a:r>
+            <a:r>
+              <a:rPr/>
+              <a:t> </a:t>
+            </a:r>
+            <a:r>
+              <a:rPr/>
+              <a:t>for</a:t>
+            </a:r>
+            <a:r>
+              <a:rPr/>
+              <a:t> </a:t>
+            </a:r>
+            <a:r>
+              <a:rPr/>
+              <a:t>Connected</a:t>
+            </a:r>
+            <a:r>
+              <a:rPr/>
+              <a:t> </a:t>
+            </a:r>
+            <a:r>
+              <a:rPr/>
+              <a:t>Youth</a:t>
+            </a:r>
+          </a:p>
+        </p:txBody>
+      </p:sp>
+      <p:pic>
+        <p:nvPicPr>
+          <p:cNvPr descr="household_structure_estimates_files/figure-pptx/unnamed-chunk-15-1.png" id="0" name="Picture 1"/>
+          <p:cNvPicPr>
+            <a:picLocks noGrp="1" noChangeAspect="1"/>
+          </p:cNvPicPr>
+          <p:nvPr/>
+        </p:nvPicPr>
+        <p:blipFill>
+          <a:blip r:embed="rId2"/>
+          <a:stretch>
+            <a:fillRect/>
+          </a:stretch>
+        </p:blipFill>
+        <p:spPr bwMode="auto">
           <a:xfrm>
-            <a:off x="831850" y="1123072"/>
-            <a:ext cx="10515600" cy="2852737"/>
+            <a:off x="1752600" y="1816100"/>
+            <a:ext cx="8686800" cy="4343400"/>
           </a:xfrm>
+          <a:prstGeom prst="rect">
+            <a:avLst/>
+          </a:prstGeom>
+          <a:noFill/>
+          <a:ln w="9525">
+            <a:noFill/>
+            <a:headEnd/>
+            <a:tailEnd/>
+          </a:ln>
         </p:spPr>
-        <p:txBody>
-          <a:bodyPr/>
-          <a:lstStyle/>
-          <a:p>
-            <a:pPr lvl="0" marL="0" indent="0">
-              <a:buNone/>
-            </a:pPr>
-            <a:r>
-              <a:rPr/>
-              <a:t>Pending</a:t>
-            </a:r>
-            <a:r>
-              <a:rPr/>
-              <a:t> </a:t>
-            </a:r>
-            <a:r>
-              <a:rPr/>
-              <a:t>Analyses</a:t>
-            </a:r>
-          </a:p>
-        </p:txBody>
-      </p:sp>
+      </p:pic>
     </p:spTree>
   </p:cSld>
 </p:sld>
@@ -4435,7 +4517,7 @@
           <p:cNvPr id="2" name="Title 1">
             <a:extLst>
               <a:ext uri="{FF2B5EF4-FFF2-40B4-BE49-F238E27FC236}">
-                <a16:creationId xmlns:a16="http://schemas.microsoft.com/office/drawing/2014/main" id="{0D064A50-2A97-421C-813D-6449089693A0}"/>
+                <a16:creationId xmlns:a16="http://schemas.microsoft.com/office/drawing/2014/main" id="{1CAF8530-DA25-40F0-835B-ABF68B3EB818}"/>
               </a:ext>
             </a:extLst>
           </p:cNvPr>
@@ -4446,7 +4528,12 @@
             <p:ph type="title"/>
           </p:nvPr>
         </p:nvSpPr>
-        <p:spPr/>
+        <p:spPr>
+          <a:xfrm>
+            <a:off x="831850" y="1123072"/>
+            <a:ext cx="10515600" cy="2852737"/>
+          </a:xfrm>
+        </p:spPr>
         <p:txBody>
           <a:bodyPr/>
           <a:lstStyle/>
@@ -4456,7 +4543,7 @@
             </a:pPr>
             <a:r>
               <a:rPr/>
-              <a:t>Income</a:t>
+              <a:t>Pending</a:t>
             </a:r>
             <a:r>
               <a:rPr/>
@@ -4464,31 +4551,7 @@
             </a:r>
             <a:r>
               <a:rPr/>
-              <a:t>Characteristics:</a:t>
-            </a:r>
-            <a:r>
-              <a:rPr/>
-              <a:t> </a:t>
-            </a:r>
-            <a:r>
-              <a:rPr/>
-              <a:t>Food</a:t>
-            </a:r>
-            <a:r>
-              <a:rPr/>
-              <a:t> </a:t>
-            </a:r>
-            <a:r>
-              <a:rPr/>
-              <a:t>Stamps</a:t>
-            </a:r>
-            <a:r>
-              <a:rPr/>
-              <a:t> </a:t>
-            </a:r>
-            <a:r>
-              <a:rPr/>
-              <a:t>(Pending)</a:t>
+              <a:t>Analyses</a:t>
             </a:r>
           </a:p>
         </p:txBody>
@@ -4541,7 +4604,7 @@
             </a:pPr>
             <a:r>
               <a:rPr/>
-              <a:t>Household</a:t>
+              <a:t>Income</a:t>
             </a:r>
             <a:r>
               <a:rPr/>
@@ -4549,7 +4612,31 @@
             </a:r>
             <a:r>
               <a:rPr/>
-              <a:t>Type:(Pending)</a:t>
+              <a:t>Characteristics:</a:t>
+            </a:r>
+            <a:r>
+              <a:rPr/>
+              <a:t> </a:t>
+            </a:r>
+            <a:r>
+              <a:rPr/>
+              <a:t>Food</a:t>
+            </a:r>
+            <a:r>
+              <a:rPr/>
+              <a:t> </a:t>
+            </a:r>
+            <a:r>
+              <a:rPr/>
+              <a:t>Stamps</a:t>
+            </a:r>
+            <a:r>
+              <a:rPr/>
+              <a:t> </a:t>
+            </a:r>
+            <a:r>
+              <a:rPr/>
+              <a:t>(Pending)</a:t>
             </a:r>
           </a:p>
         </p:txBody>
@@ -4739,39 +4826,7 @@
             </a:r>
             <a:r>
               <a:rPr/>
-              <a:t>Characteristics:</a:t>
-            </a:r>
-            <a:r>
-              <a:rPr/>
-              <a:t> </a:t>
-            </a:r>
-            <a:r>
-              <a:rPr/>
-              <a:t>Workers</a:t>
-            </a:r>
-            <a:r>
-              <a:rPr/>
-              <a:t> </a:t>
-            </a:r>
-            <a:r>
-              <a:rPr/>
-              <a:t>in</a:t>
-            </a:r>
-            <a:r>
-              <a:rPr/>
-              <a:t> </a:t>
-            </a:r>
-            <a:r>
-              <a:rPr/>
-              <a:t>Family</a:t>
-            </a:r>
-            <a:r>
-              <a:rPr/>
-              <a:t> </a:t>
-            </a:r>
-            <a:r>
-              <a:rPr/>
-              <a:t>(Pending)</a:t>
+              <a:t>Type:(Pending)</a:t>
             </a:r>
           </a:p>
         </p:txBody>
@@ -4824,7 +4879,7 @@
             </a:pPr>
             <a:r>
               <a:rPr/>
-              <a:t>Same-sex</a:t>
+              <a:t>Household</a:t>
             </a:r>
             <a:r>
               <a:rPr/>
@@ -4832,7 +4887,31 @@
             </a:r>
             <a:r>
               <a:rPr/>
-              <a:t>households</a:t>
+              <a:t>Characteristics:</a:t>
+            </a:r>
+            <a:r>
+              <a:rPr/>
+              <a:t> </a:t>
+            </a:r>
+            <a:r>
+              <a:rPr/>
+              <a:t>Workers</a:t>
+            </a:r>
+            <a:r>
+              <a:rPr/>
+              <a:t> </a:t>
+            </a:r>
+            <a:r>
+              <a:rPr/>
+              <a:t>in</a:t>
+            </a:r>
+            <a:r>
+              <a:rPr/>
+              <a:t> </a:t>
+            </a:r>
+            <a:r>
+              <a:rPr/>
+              <a:t>Family</a:t>
             </a:r>
             <a:r>
               <a:rPr/>
@@ -4893,7 +4972,7 @@
             </a:pPr>
             <a:r>
               <a:rPr/>
-              <a:t>Multi-generational</a:t>
+              <a:t>Same-sex</a:t>
             </a:r>
             <a:r>
               <a:rPr/>
@@ -4901,7 +4980,7 @@
             </a:r>
             <a:r>
               <a:rPr/>
-              <a:t>Families</a:t>
+              <a:t>households</a:t>
             </a:r>
             <a:r>
               <a:rPr/>
@@ -4941,7 +5020,7 @@
           <p:cNvPr id="2" name="Title 1">
             <a:extLst>
               <a:ext uri="{FF2B5EF4-FFF2-40B4-BE49-F238E27FC236}">
-                <a16:creationId xmlns:a16="http://schemas.microsoft.com/office/drawing/2014/main" id="{1CAF8530-DA25-40F0-835B-ABF68B3EB818}"/>
+                <a16:creationId xmlns:a16="http://schemas.microsoft.com/office/drawing/2014/main" id="{0D064A50-2A97-421C-813D-6449089693A0}"/>
               </a:ext>
             </a:extLst>
           </p:cNvPr>
@@ -4952,12 +5031,7 @@
             <p:ph type="title"/>
           </p:nvPr>
         </p:nvSpPr>
-        <p:spPr>
-          <a:xfrm>
-            <a:off x="831850" y="1123072"/>
-            <a:ext cx="10515600" cy="2852737"/>
-          </a:xfrm>
-        </p:spPr>
+        <p:spPr/>
         <p:txBody>
           <a:bodyPr/>
           <a:lstStyle/>
@@ -4967,7 +5041,23 @@
             </a:pPr>
             <a:r>
               <a:rPr/>
-              <a:t>Questions?</a:t>
+              <a:t>Multi-generational</a:t>
+            </a:r>
+            <a:r>
+              <a:rPr/>
+              <a:t> </a:t>
+            </a:r>
+            <a:r>
+              <a:rPr/>
+              <a:t>Families</a:t>
+            </a:r>
+            <a:r>
+              <a:rPr/>
+              <a:t> </a:t>
+            </a:r>
+            <a:r>
+              <a:rPr/>
+              <a:t>(Pending)</a:t>
             </a:r>
           </a:p>
         </p:txBody>
@@ -5025,6 +5115,64 @@
             </a:pPr>
             <a:r>
               <a:rPr/>
+              <a:t>Questions?</a:t>
+            </a:r>
+          </a:p>
+        </p:txBody>
+      </p:sp>
+    </p:spTree>
+  </p:cSld>
+</p:sld>
+</file>
+
+<file path=ppt/slides/slide25.xml><?xml version="1.0" encoding="utf-8"?>
+<p:sld xmlns:a="http://schemas.openxmlformats.org/drawingml/2006/main" xmlns:r="http://schemas.openxmlformats.org/officeDocument/2006/relationships" xmlns:p="http://schemas.openxmlformats.org/presentationml/2006/main">
+  <p:cSld>
+    <p:spTree>
+      <p:nvGrpSpPr>
+        <p:cNvPr id="1" name=""/>
+        <p:cNvGrpSpPr/>
+        <p:nvPr/>
+      </p:nvGrpSpPr>
+      <p:grpSpPr>
+        <a:xfrm>
+          <a:off x="0" y="0"/>
+          <a:ext cx="0" cy="0"/>
+          <a:chOff x="0" y="0"/>
+          <a:chExt cx="0" cy="0"/>
+        </a:xfrm>
+      </p:grpSpPr>
+      <p:sp>
+        <p:nvSpPr>
+          <p:cNvPr id="2" name="Title 1">
+            <a:extLst>
+              <a:ext uri="{FF2B5EF4-FFF2-40B4-BE49-F238E27FC236}">
+                <a16:creationId xmlns:a16="http://schemas.microsoft.com/office/drawing/2014/main" id="{1CAF8530-DA25-40F0-835B-ABF68B3EB818}"/>
+              </a:ext>
+            </a:extLst>
+          </p:cNvPr>
+          <p:cNvSpPr>
+            <a:spLocks noGrp="1"/>
+          </p:cNvSpPr>
+          <p:nvPr>
+            <p:ph type="title"/>
+          </p:nvPr>
+        </p:nvSpPr>
+        <p:spPr>
+          <a:xfrm>
+            <a:off x="831850" y="1123072"/>
+            <a:ext cx="10515600" cy="2852737"/>
+          </a:xfrm>
+        </p:spPr>
+        <p:txBody>
+          <a:bodyPr/>
+          <a:lstStyle/>
+          <a:p>
+            <a:pPr lvl="0" marL="0" indent="0">
+              <a:buNone/>
+            </a:pPr>
+            <a:r>
+              <a:rPr/>
               <a:t>Thank</a:t>
             </a:r>
             <a:r>
@@ -5181,7 +5329,7 @@
             <a:pPr lvl="1"/>
             <a:r>
               <a:rPr/>
-              <a:t>Mobility Status</a:t>
+              <a:t>What are the mobility characteristics of Opportunity Youth?</a:t>
             </a:r>
           </a:p>
           <a:p>
@@ -5260,7 +5408,7 @@
             </a:pPr>
             <a:r>
               <a:rPr/>
-              <a:t>Results</a:t>
+              <a:t>Refresher</a:t>
             </a:r>
           </a:p>
         </p:txBody>
@@ -5311,14 +5459,6 @@
             <a:pPr lvl="0" marL="0" indent="0">
               <a:buNone/>
             </a:pPr>
-            <a:r>
-              <a:rPr/>
-              <a:t>Refresher:</a:t>
-            </a:r>
-            <a:r>
-              <a:rPr/>
-              <a:t> </a:t>
-            </a:r>
             <a:r>
               <a:rPr/>
               <a:t>Number</a:t>
@@ -5428,57 +5568,117 @@
             </a:pPr>
             <a:r>
               <a:rPr/>
-              <a:t>Heads</a:t>
-            </a:r>
-            <a:r>
-              <a:rPr/>
-              <a:t> </a:t>
-            </a:r>
-            <a:r>
-              <a:rPr/>
-              <a:t>of</a:t>
-            </a:r>
-            <a:r>
-              <a:rPr/>
-              <a:t> </a:t>
-            </a:r>
-            <a:r>
-              <a:rPr/>
-              <a:t>Household</a:t>
-            </a:r>
-          </a:p>
-        </p:txBody>
-      </p:sp>
-      <p:pic>
-        <p:nvPicPr>
-          <p:cNvPr descr="household_structure_estimates_files/figure-pptx/unnamed-chunk-4-1.png" id="0" name="Picture 1"/>
-          <p:cNvPicPr>
-            <a:picLocks noGrp="1" noChangeAspect="1"/>
-          </p:cNvPicPr>
-          <p:nvPr/>
-        </p:nvPicPr>
-        <p:blipFill>
-          <a:blip r:embed="rId2"/>
-          <a:stretch>
-            <a:fillRect/>
-          </a:stretch>
-        </p:blipFill>
-        <p:spPr bwMode="auto">
-          <a:xfrm>
-            <a:off x="1752600" y="1816100"/>
-            <a:ext cx="8686800" cy="4343400"/>
-          </a:xfrm>
-          <a:prstGeom prst="rect">
-            <a:avLst/>
-          </a:prstGeom>
-          <a:noFill/>
-          <a:ln w="9525">
-            <a:noFill/>
-            <a:headEnd/>
-            <a:tailEnd/>
-          </a:ln>
-        </p:spPr>
-      </p:pic>
+              <a:t>Definitions</a:t>
+            </a:r>
+          </a:p>
+        </p:txBody>
+      </p:sp>
+      <p:sp>
+        <p:nvSpPr>
+          <p:cNvPr id="3" name="Content Placeholder 2">
+            <a:extLst>
+              <a:ext uri="{FF2B5EF4-FFF2-40B4-BE49-F238E27FC236}">
+                <a16:creationId xmlns:a16="http://schemas.microsoft.com/office/drawing/2014/main" id="{C0E34547-063B-468C-B841-DB8C0206424E}"/>
+              </a:ext>
+            </a:extLst>
+          </p:cNvPr>
+          <p:cNvSpPr>
+            <a:spLocks noGrp="1"/>
+          </p:cNvSpPr>
+          <p:nvPr>
+            <p:ph idx="1"/>
+          </p:nvPr>
+        </p:nvSpPr>
+        <p:spPr/>
+        <p:txBody>
+          <a:bodyPr/>
+          <a:lstStyle/>
+          <a:p>
+            <a:pPr lvl="0" marL="0" indent="0">
+              <a:buNone/>
+            </a:pPr>
+            <a:r>
+              <a:rPr b="1"/>
+              <a:t>Person-Level:</a:t>
+            </a:r>
+          </a:p>
+          <a:p>
+            <a:pPr lvl="0" marL="0" indent="0">
+              <a:buNone/>
+            </a:pPr>
+            <a:r>
+              <a:rPr/>
+              <a:t>-</a:t>
+            </a:r>
+            <a:r>
+              <a:rPr i="1"/>
+              <a:t>Opportunity Youth:</a:t>
+            </a:r>
+            <a:r>
+              <a:rPr/>
+              <a:t> Individuals that are 16 to 24 years old who are simultaneously unemployed/ not in the labor force and not enrolled in school (disconnection) - </a:t>
+            </a:r>
+            <a:r>
+              <a:rPr i="1"/>
+              <a:t>Connected Youth:</a:t>
+            </a:r>
+            <a:r>
+              <a:rPr/>
+              <a:t> Individuals that are 16 to 24 years old who are either employed, enrolled in school, or both. - </a:t>
+            </a:r>
+            <a:r>
+              <a:rPr i="1"/>
+              <a:t>Everyone Else:</a:t>
+            </a:r>
+            <a:r>
+              <a:rPr/>
+              <a:t> Individuals outside of this age category who may be enrolled in school or employed</a:t>
+            </a:r>
+          </a:p>
+          <a:p>
+            <a:pPr lvl="0" marL="0" indent="0">
+              <a:buNone/>
+            </a:pPr>
+            <a:r>
+              <a:rPr b="1"/>
+              <a:t>Household-level:</a:t>
+            </a:r>
+          </a:p>
+          <a:p>
+            <a:pPr lvl="1"/>
+            <a:r>
+              <a:rPr i="1"/>
+              <a:t>OY Household:</a:t>
+            </a:r>
+            <a:r>
+              <a:rPr/>
+              <a:t> There is at least one ‘Opportunity Youth’ in the household but no ‘Connected Youth’ in the household. There may be ‘Everyone Else’ in the household.</a:t>
+            </a:r>
+          </a:p>
+          <a:p>
+            <a:pPr lvl="1"/>
+            <a:r>
+              <a:rPr i="1"/>
+              <a:t>OY &amp; CY Household:</a:t>
+            </a:r>
+            <a:r>
+              <a:rPr/>
+              <a:t> There are both ‘Opportunity Youth’ and ‘Connected Youth’ in the household and possibly ‘Everyone Else’.</a:t>
+            </a:r>
+          </a:p>
+          <a:p>
+            <a:pPr lvl="1"/>
+            <a:r>
+              <a:rPr i="1"/>
+              <a:t>CY Only Household:</a:t>
+            </a:r>
+            <a:r>
+              <a:rPr/>
+              <a:t> There are only ‘Connected Youth’ and no ‘Opportunity Youth’ or ‘Everyone Else’ in the household.</a:t>
+            </a:r>
+          </a:p>
+        </p:txBody>
+      </p:sp>
     </p:spTree>
   </p:cSld>
 </p:sld>
@@ -5527,7 +5727,7 @@
             </a:pPr>
             <a:r>
               <a:rPr/>
-              <a:t>Do</a:t>
+              <a:t>Person</a:t>
             </a:r>
             <a:r>
               <a:rPr/>
@@ -5535,7 +5735,7 @@
             </a:r>
             <a:r>
               <a:rPr/>
-              <a:t>they</a:t>
+              <a:t>of</a:t>
             </a:r>
             <a:r>
               <a:rPr/>
@@ -5543,22 +5743,14 @@
             </a:r>
             <a:r>
               <a:rPr/>
-              <a:t>have</a:t>
-            </a:r>
-            <a:r>
-              <a:rPr/>
-              <a:t> </a:t>
-            </a:r>
-            <a:r>
-              <a:rPr/>
-              <a:t>children?</a:t>
+              <a:t>Reference</a:t>
             </a:r>
           </a:p>
         </p:txBody>
       </p:sp>
       <p:pic>
         <p:nvPicPr>
-          <p:cNvPr descr="household_structure_estimates_files/figure-pptx/unnamed-chunk-5-1.png" id="0" name="Picture 1"/>
+          <p:cNvPr descr="household_structure_estimates_files/figure-pptx/unnamed-chunk-4-1.png" id="0" name="Picture 1"/>
           <p:cNvPicPr>
             <a:picLocks noGrp="1" noChangeAspect="1"/>
           </p:cNvPicPr>
@@ -5634,7 +5826,7 @@
             </a:pPr>
             <a:r>
               <a:rPr/>
-              <a:t>Number</a:t>
+              <a:t>Do</a:t>
             </a:r>
             <a:r>
               <a:rPr/>
@@ -5642,7 +5834,7 @@
             </a:r>
             <a:r>
               <a:rPr/>
-              <a:t>of</a:t>
+              <a:t>they</a:t>
             </a:r>
             <a:r>
               <a:rPr/>
@@ -5650,14 +5842,22 @@
             </a:r>
             <a:r>
               <a:rPr/>
-              <a:t>Children</a:t>
+              <a:t>have</a:t>
+            </a:r>
+            <a:r>
+              <a:rPr/>
+              <a:t> </a:t>
+            </a:r>
+            <a:r>
+              <a:rPr/>
+              <a:t>children?</a:t>
             </a:r>
           </a:p>
         </p:txBody>
       </p:sp>
       <p:pic>
         <p:nvPicPr>
-          <p:cNvPr descr="household_structure_estimates_files/figure-pptx/unnamed-chunk-6-1.png" id="0" name="Picture 1"/>
+          <p:cNvPr descr="household_structure_estimates_files/figure-pptx/unnamed-chunk-5-1.png" id="0" name="Picture 1"/>
           <p:cNvPicPr>
             <a:picLocks noGrp="1" noChangeAspect="1"/>
           </p:cNvPicPr>
@@ -5671,8 +5871,8 @@
         </p:blipFill>
         <p:spPr bwMode="auto">
           <a:xfrm>
-            <a:off x="1752600" y="1816100"/>
-            <a:ext cx="8686800" cy="4343400"/>
+            <a:off x="3200400" y="1816100"/>
+            <a:ext cx="5791200" cy="4343400"/>
           </a:xfrm>
           <a:prstGeom prst="rect">
             <a:avLst/>
@@ -5733,7 +5933,7 @@
             </a:pPr>
             <a:r>
               <a:rPr/>
-              <a:t>Type</a:t>
+              <a:t>Number</a:t>
             </a:r>
             <a:r>
               <a:rPr/>
@@ -5749,14 +5949,14 @@
             </a:r>
             <a:r>
               <a:rPr/>
-              <a:t>Household</a:t>
+              <a:t>Children</a:t>
             </a:r>
           </a:p>
         </p:txBody>
       </p:sp>
       <p:pic>
         <p:nvPicPr>
-          <p:cNvPr descr="household_structure_estimates_files/figure-pptx/unnamed-chunk-7-1.png" id="0" name="Picture 1"/>
+          <p:cNvPr descr="household_structure_estimates_files/figure-pptx/unnamed-chunk-6-1.png" id="0" name="Picture 1"/>
           <p:cNvPicPr>
             <a:picLocks noGrp="1" noChangeAspect="1"/>
           </p:cNvPicPr>

</xml_diff>

<commit_message>
final presentation 2 updates prior to QA
</commit_message>
<xml_diff>
--- a/create_powerpoint/household_structure_estimates.pptx
+++ b/create_powerpoint/household_structure_estimates.pptx
@@ -3676,7 +3676,7 @@
             </a:pPr>
             <a:r>
               <a:rPr/>
-              <a:t>Do</a:t>
+              <a:t>Presence</a:t>
             </a:r>
             <a:r>
               <a:rPr/>
@@ -3684,7 +3684,7 @@
             </a:r>
             <a:r>
               <a:rPr/>
-              <a:t>they</a:t>
+              <a:t>of</a:t>
             </a:r>
             <a:r>
               <a:rPr/>
@@ -3692,7 +3692,7 @@
             </a:r>
             <a:r>
               <a:rPr/>
-              <a:t>have</a:t>
+              <a:t>at</a:t>
             </a:r>
             <a:r>
               <a:rPr/>
@@ -3700,7 +3700,23 @@
             </a:r>
             <a:r>
               <a:rPr/>
-              <a:t>children?</a:t>
+              <a:t>least</a:t>
+            </a:r>
+            <a:r>
+              <a:rPr/>
+              <a:t> </a:t>
+            </a:r>
+            <a:r>
+              <a:rPr/>
+              <a:t>one</a:t>
+            </a:r>
+            <a:r>
+              <a:rPr/>
+              <a:t> </a:t>
+            </a:r>
+            <a:r>
+              <a:rPr/>
+              <a:t>child</a:t>
             </a:r>
           </a:p>
         </p:txBody>
@@ -3900,6 +3916,22 @@
               <a:rPr/>
               <a:t>Household</a:t>
             </a:r>
+            <a:r>
+              <a:rPr/>
+              <a:t> </a:t>
+            </a:r>
+            <a:r>
+              <a:rPr/>
+              <a:t>Population</a:t>
+            </a:r>
+            <a:r>
+              <a:rPr/>
+              <a:t> </a:t>
+            </a:r>
+            <a:r>
+              <a:rPr/>
+              <a:t>Sizes</a:t>
+            </a:r>
           </a:p>
         </p:txBody>
       </p:sp>
@@ -4312,6 +4344,14 @@
               <a:rPr/>
               <a:t>Partnered</a:t>
             </a:r>
+            <a:r>
+              <a:rPr/>
+              <a:t> </a:t>
+            </a:r>
+            <a:r>
+              <a:rPr/>
+              <a:t>Status</a:t>
+            </a:r>
           </a:p>
         </p:txBody>
       </p:sp>
@@ -4615,7 +4655,7 @@
             </a:pPr>
             <a:r>
               <a:rPr/>
-              <a:t>Migration:</a:t>
+              <a:t>Mobility:</a:t>
             </a:r>
             <a:r>
               <a:rPr/>
@@ -5946,7 +5986,7 @@
       </p:sp>
       <p:graphicFrame xmlns:a="http://schemas.openxmlformats.org/drawingml/2006/main" xmlns:r="http://schemas.openxmlformats.org/officeDocument/2006/relationships" xmlns:p="http://schemas.openxmlformats.org/presentationml/2006/main">
         <p:nvGraphicFramePr>
-          <p:cNvPr id="491556134" name=""/>
+          <p:cNvPr id="955095432" name=""/>
           <p:cNvGraphicFramePr>
             <a:graphicFrameLocks noGrp="true"/>
           </p:cNvGraphicFramePr>
@@ -5961,7 +6001,7 @@
             <a:tbl>
               <a:tblPr/>
               <a:tblGrid>
-                <a:gridCol w="1668005"/>
+                <a:gridCol w="1646859"/>
                 <a:gridCol w="1137582"/>
                 <a:gridCol w="1321688"/>
                 <a:gridCol w="998428"/>
@@ -6252,7 +6292,7 @@
                   </a:tcPr>
                 </a:tc>
               </a:tr>
-              <a:tr h="265313">
+              <a:tr h="293757">
                 <a:tc>
                   <a:txBody>
                     <a:bodyPr/>
@@ -6280,7 +6320,73 @@
                           <a:latin typeface="Arial"/>
                           <a:cs typeface="Arial"/>
                         </a:rPr>
-                        <a:t>Combined Household</a:t>
+                        <a:t>CY Only Household</a:t>
+                      </a:r>
+                    </a:p>
+                  </a:txBody>
+                  <a:tcPr anchor="ctr" marB="0" marT="0" marR="0" marL="0">
+                    <a:lnL w="0" cmpd="sng" algn="ctr" cap="flat">
+                      <a:solidFill>
+                        <a:srgbClr val="FFFFFF">
+                          <a:alpha val="0"/>
+                        </a:srgbClr>
+                      </a:solidFill>
+                      <a:prstDash val="solid"/>
+                    </a:lnL>
+                    <a:lnR w="0" cmpd="sng" algn="ctr" cap="flat">
+                      <a:solidFill>
+                        <a:srgbClr val="FFFFFF">
+                          <a:alpha val="0"/>
+                        </a:srgbClr>
+                      </a:solidFill>
+                      <a:prstDash val="solid"/>
+                    </a:lnR>
+                    <a:lnT w="0" cmpd="sng" algn="ctr" cap="flat">
+                      <a:solidFill>
+                        <a:srgbClr val="FFFFFF">
+                          <a:alpha val="0"/>
+                        </a:srgbClr>
+                      </a:solidFill>
+                      <a:prstDash val="solid"/>
+                    </a:lnT>
+                    <a:lnB w="0" cmpd="sng" algn="ctr" cap="flat">
+                      <a:solidFill>
+                        <a:srgbClr val="FFFFFF">
+                          <a:alpha val="0"/>
+                        </a:srgbClr>
+                      </a:solidFill>
+                      <a:prstDash val="solid"/>
+                    </a:lnB>
+                  </a:tcPr>
+                </a:tc>
+                <a:tc>
+                  <a:txBody>
+                    <a:bodyPr/>
+                    <a:lstStyle/>
+                    <a:p>
+                      <a:pPr algn="ctr" marL="63500" marR="63500">
+                        <a:lnSpc>
+                          <a:spcPct val="100000"/>
+                        </a:lnSpc>
+                        <a:spcBef>
+                          <a:spcPts val="200"/>
+                        </a:spcBef>
+                        <a:spcAft>
+                          <a:spcPts val="200"/>
+                        </a:spcAft>
+                        <a:buNone/>
+                      </a:pPr>
+                      <a:r>
+                        <a:rPr sz="1000">
+                          <a:solidFill>
+                            <a:srgbClr val="111111">
+                              <a:alpha val="100000"/>
+                            </a:srgbClr>
+                          </a:solidFill>
+                          <a:latin typeface="Arial"/>
+                          <a:cs typeface="Arial"/>
+                        </a:rPr>
+                        <a:t>Not Present</a:t>
                       </a:r>
                     </a:p>
                   </a:txBody>
@@ -6412,7 +6518,7 @@
                           <a:latin typeface="Arial"/>
                           <a:cs typeface="Arial"/>
                         </a:rPr>
-                        <a:t>Present</a:t>
+                        <a:t>Not Present</a:t>
                       </a:r>
                     </a:p>
                   </a:txBody>
@@ -6449,6 +6555,79 @@
                       </a:solidFill>
                       <a:prstDash val="solid"/>
                     </a:lnB>
+                  </a:tcPr>
+                </a:tc>
+              </a:tr>
+              <a:tr h="293757">
+                <a:tc>
+                  <a:txBody>
+                    <a:bodyPr/>
+                    <a:lstStyle/>
+                    <a:p>
+                      <a:pPr algn="l" marL="63500" marR="63500">
+                        <a:lnSpc>
+                          <a:spcPct val="100000"/>
+                        </a:lnSpc>
+                        <a:spcBef>
+                          <a:spcPts val="200"/>
+                        </a:spcBef>
+                        <a:spcAft>
+                          <a:spcPts val="200"/>
+                        </a:spcAft>
+                        <a:buNone/>
+                      </a:pPr>
+                      <a:r>
+                        <a:rPr sz="1000">
+                          <a:solidFill>
+                            <a:srgbClr val="111111">
+                              <a:alpha val="100000"/>
+                            </a:srgbClr>
+                          </a:solidFill>
+                          <a:latin typeface="Arial"/>
+                          <a:cs typeface="Arial"/>
+                        </a:rPr>
+                        <a:t>CY-EE Only Household</a:t>
+                      </a:r>
+                    </a:p>
+                  </a:txBody>
+                  <a:tcPr anchor="ctr" marB="0" marT="0" marR="0" marL="0">
+                    <a:lnL w="0" cmpd="sng" algn="ctr" cap="flat">
+                      <a:solidFill>
+                        <a:srgbClr val="FFFFFF">
+                          <a:alpha val="0"/>
+                        </a:srgbClr>
+                      </a:solidFill>
+                      <a:prstDash val="solid"/>
+                    </a:lnL>
+                    <a:lnR w="0" cmpd="sng" algn="ctr" cap="flat">
+                      <a:solidFill>
+                        <a:srgbClr val="FFFFFF">
+                          <a:alpha val="0"/>
+                        </a:srgbClr>
+                      </a:solidFill>
+                      <a:prstDash val="solid"/>
+                    </a:lnR>
+                    <a:lnT w="0" cmpd="sng" algn="ctr" cap="flat">
+                      <a:solidFill>
+                        <a:srgbClr val="FFFFFF">
+                          <a:alpha val="0"/>
+                        </a:srgbClr>
+                      </a:solidFill>
+                      <a:prstDash val="solid"/>
+                    </a:lnT>
+                    <a:lnB w="0" cmpd="sng" algn="ctr" cap="flat">
+                      <a:solidFill>
+                        <a:srgbClr val="FFFFFF">
+                          <a:alpha val="0"/>
+                        </a:srgbClr>
+                      </a:solidFill>
+                      <a:prstDash val="solid"/>
+                    </a:lnB>
+                    <a:solidFill>
+                      <a:srgbClr val="D6D6CE">
+                        <a:alpha val="100000"/>
+                      </a:srgbClr>
+                    </a:solidFill>
                   </a:tcPr>
                 </a:tc>
                 <a:tc>
@@ -6515,16 +6694,19 @@
                       </a:solidFill>
                       <a:prstDash val="solid"/>
                     </a:lnB>
+                    <a:solidFill>
+                      <a:srgbClr val="D6D6CE">
+                        <a:alpha val="100000"/>
+                      </a:srgbClr>
+                    </a:solidFill>
                   </a:tcPr>
                 </a:tc>
-              </a:tr>
-              <a:tr h="293757">
                 <a:tc>
                   <a:txBody>
                     <a:bodyPr/>
                     <a:lstStyle/>
                     <a:p>
-                      <a:pPr algn="l" marL="63500" marR="63500">
+                      <a:pPr algn="ctr" marL="63500" marR="63500">
                         <a:lnSpc>
                           <a:spcPct val="100000"/>
                         </a:lnSpc>
@@ -6546,7 +6728,7 @@
                           <a:latin typeface="Arial"/>
                           <a:cs typeface="Arial"/>
                         </a:rPr>
-                        <a:t>CY Only Household</a:t>
+                        <a:t>Present</a:t>
                       </a:r>
                     </a:p>
                   </a:txBody>
@@ -6661,148 +6843,6 @@
                     </a:solidFill>
                   </a:tcPr>
                 </a:tc>
-                <a:tc>
-                  <a:txBody>
-                    <a:bodyPr/>
-                    <a:lstStyle/>
-                    <a:p>
-                      <a:pPr algn="ctr" marL="63500" marR="63500">
-                        <a:lnSpc>
-                          <a:spcPct val="100000"/>
-                        </a:lnSpc>
-                        <a:spcBef>
-                          <a:spcPts val="200"/>
-                        </a:spcBef>
-                        <a:spcAft>
-                          <a:spcPts val="200"/>
-                        </a:spcAft>
-                        <a:buNone/>
-                      </a:pPr>
-                      <a:r>
-                        <a:rPr sz="1000">
-                          <a:solidFill>
-                            <a:srgbClr val="111111">
-                              <a:alpha val="100000"/>
-                            </a:srgbClr>
-                          </a:solidFill>
-                          <a:latin typeface="Arial"/>
-                          <a:cs typeface="Arial"/>
-                        </a:rPr>
-                        <a:t>Present</a:t>
-                      </a:r>
-                    </a:p>
-                  </a:txBody>
-                  <a:tcPr anchor="ctr" marB="0" marT="0" marR="0" marL="0">
-                    <a:lnL w="0" cmpd="sng" algn="ctr" cap="flat">
-                      <a:solidFill>
-                        <a:srgbClr val="FFFFFF">
-                          <a:alpha val="0"/>
-                        </a:srgbClr>
-                      </a:solidFill>
-                      <a:prstDash val="solid"/>
-                    </a:lnL>
-                    <a:lnR w="0" cmpd="sng" algn="ctr" cap="flat">
-                      <a:solidFill>
-                        <a:srgbClr val="FFFFFF">
-                          <a:alpha val="0"/>
-                        </a:srgbClr>
-                      </a:solidFill>
-                      <a:prstDash val="solid"/>
-                    </a:lnR>
-                    <a:lnT w="0" cmpd="sng" algn="ctr" cap="flat">
-                      <a:solidFill>
-                        <a:srgbClr val="FFFFFF">
-                          <a:alpha val="0"/>
-                        </a:srgbClr>
-                      </a:solidFill>
-                      <a:prstDash val="solid"/>
-                    </a:lnT>
-                    <a:lnB w="0" cmpd="sng" algn="ctr" cap="flat">
-                      <a:solidFill>
-                        <a:srgbClr val="FFFFFF">
-                          <a:alpha val="0"/>
-                        </a:srgbClr>
-                      </a:solidFill>
-                      <a:prstDash val="solid"/>
-                    </a:lnB>
-                    <a:solidFill>
-                      <a:srgbClr val="D6D6CE">
-                        <a:alpha val="100000"/>
-                      </a:srgbClr>
-                    </a:solidFill>
-                  </a:tcPr>
-                </a:tc>
-                <a:tc>
-                  <a:txBody>
-                    <a:bodyPr/>
-                    <a:lstStyle/>
-                    <a:p>
-                      <a:pPr algn="ctr" marL="63500" marR="63500">
-                        <a:lnSpc>
-                          <a:spcPct val="100000"/>
-                        </a:lnSpc>
-                        <a:spcBef>
-                          <a:spcPts val="200"/>
-                        </a:spcBef>
-                        <a:spcAft>
-                          <a:spcPts val="200"/>
-                        </a:spcAft>
-                        <a:buNone/>
-                      </a:pPr>
-                      <a:r>
-                        <a:rPr sz="1000">
-                          <a:solidFill>
-                            <a:srgbClr val="111111">
-                              <a:alpha val="100000"/>
-                            </a:srgbClr>
-                          </a:solidFill>
-                          <a:latin typeface="Arial"/>
-                          <a:cs typeface="Arial"/>
-                        </a:rPr>
-                        <a:t>Not Present</a:t>
-                      </a:r>
-                    </a:p>
-                  </a:txBody>
-                  <a:tcPr anchor="ctr" marB="0" marT="0" marR="0" marL="0">
-                    <a:lnL w="0" cmpd="sng" algn="ctr" cap="flat">
-                      <a:solidFill>
-                        <a:srgbClr val="FFFFFF">
-                          <a:alpha val="0"/>
-                        </a:srgbClr>
-                      </a:solidFill>
-                      <a:prstDash val="solid"/>
-                    </a:lnL>
-                    <a:lnR w="0" cmpd="sng" algn="ctr" cap="flat">
-                      <a:solidFill>
-                        <a:srgbClr val="FFFFFF">
-                          <a:alpha val="0"/>
-                        </a:srgbClr>
-                      </a:solidFill>
-                      <a:prstDash val="solid"/>
-                    </a:lnR>
-                    <a:lnT w="0" cmpd="sng" algn="ctr" cap="flat">
-                      <a:solidFill>
-                        <a:srgbClr val="FFFFFF">
-                          <a:alpha val="0"/>
-                        </a:srgbClr>
-                      </a:solidFill>
-                      <a:prstDash val="solid"/>
-                    </a:lnT>
-                    <a:lnB w="0" cmpd="sng" algn="ctr" cap="flat">
-                      <a:solidFill>
-                        <a:srgbClr val="FFFFFF">
-                          <a:alpha val="0"/>
-                        </a:srgbClr>
-                      </a:solidFill>
-                      <a:prstDash val="solid"/>
-                    </a:lnB>
-                    <a:solidFill>
-                      <a:srgbClr val="D6D6CE">
-                        <a:alpha val="100000"/>
-                      </a:srgbClr>
-                    </a:solidFill>
-                  </a:tcPr>
-                </a:tc>
               </a:tr>
               <a:tr h="293757">
                 <a:tc>
@@ -6832,7 +6872,7 @@
                           <a:latin typeface="Arial"/>
                           <a:cs typeface="Arial"/>
                         </a:rPr>
-                        <a:t>CY-EE Only Household</a:t>
+                        <a:t>EE Only Household</a:t>
                       </a:r>
                     </a:p>
                   </a:txBody>
@@ -6964,7 +7004,7 @@
                           <a:latin typeface="Arial"/>
                           <a:cs typeface="Arial"/>
                         </a:rPr>
-                        <a:t>Present</a:t>
+                        <a:t>Not Present</a:t>
                       </a:r>
                     </a:p>
                   </a:txBody>
@@ -7070,7 +7110,7 @@
                   </a:tcPr>
                 </a:tc>
               </a:tr>
-              <a:tr h="293757">
+              <a:tr h="265313">
                 <a:tc>
                   <a:txBody>
                     <a:bodyPr/>
@@ -7098,7 +7138,7 @@
                           <a:latin typeface="Arial"/>
                           <a:cs typeface="Arial"/>
                         </a:rPr>
-                        <a:t>EE Only Household</a:t>
+                        <a:t>OY Household</a:t>
                       </a:r>
                     </a:p>
                   </a:txBody>
@@ -7240,488 +7280,7 @@
                           <a:latin typeface="Arial"/>
                           <a:cs typeface="Arial"/>
                         </a:rPr>
-                        <a:t>Not Present</a:t>
-                      </a:r>
-                    </a:p>
-                  </a:txBody>
-                  <a:tcPr anchor="ctr" marB="0" marT="0" marR="0" marL="0">
-                    <a:lnL w="0" cmpd="sng" algn="ctr" cap="flat">
-                      <a:solidFill>
-                        <a:srgbClr val="FFFFFF">
-                          <a:alpha val="0"/>
-                        </a:srgbClr>
-                      </a:solidFill>
-                      <a:prstDash val="solid"/>
-                    </a:lnL>
-                    <a:lnR w="0" cmpd="sng" algn="ctr" cap="flat">
-                      <a:solidFill>
-                        <a:srgbClr val="FFFFFF">
-                          <a:alpha val="0"/>
-                        </a:srgbClr>
-                      </a:solidFill>
-                      <a:prstDash val="solid"/>
-                    </a:lnR>
-                    <a:lnT w="0" cmpd="sng" algn="ctr" cap="flat">
-                      <a:solidFill>
-                        <a:srgbClr val="FFFFFF">
-                          <a:alpha val="0"/>
-                        </a:srgbClr>
-                      </a:solidFill>
-                      <a:prstDash val="solid"/>
-                    </a:lnT>
-                    <a:lnB w="0" cmpd="sng" algn="ctr" cap="flat">
-                      <a:solidFill>
-                        <a:srgbClr val="FFFFFF">
-                          <a:alpha val="0"/>
-                        </a:srgbClr>
-                      </a:solidFill>
-                      <a:prstDash val="solid"/>
-                    </a:lnB>
-                    <a:solidFill>
-                      <a:srgbClr val="D6D6CE">
-                        <a:alpha val="100000"/>
-                      </a:srgbClr>
-                    </a:solidFill>
-                  </a:tcPr>
-                </a:tc>
-                <a:tc>
-                  <a:txBody>
-                    <a:bodyPr/>
-                    <a:lstStyle/>
-                    <a:p>
-                      <a:pPr algn="ctr" marL="63500" marR="63500">
-                        <a:lnSpc>
-                          <a:spcPct val="100000"/>
-                        </a:lnSpc>
-                        <a:spcBef>
-                          <a:spcPts val="200"/>
-                        </a:spcBef>
-                        <a:spcAft>
-                          <a:spcPts val="200"/>
-                        </a:spcAft>
-                        <a:buNone/>
-                      </a:pPr>
-                      <a:r>
-                        <a:rPr sz="1000">
-                          <a:solidFill>
-                            <a:srgbClr val="111111">
-                              <a:alpha val="100000"/>
-                            </a:srgbClr>
-                          </a:solidFill>
-                          <a:latin typeface="Arial"/>
-                          <a:cs typeface="Arial"/>
-                        </a:rPr>
-                        <a:t>Not Present</a:t>
-                      </a:r>
-                    </a:p>
-                  </a:txBody>
-                  <a:tcPr anchor="ctr" marB="0" marT="0" marR="0" marL="0">
-                    <a:lnL w="0" cmpd="sng" algn="ctr" cap="flat">
-                      <a:solidFill>
-                        <a:srgbClr val="FFFFFF">
-                          <a:alpha val="0"/>
-                        </a:srgbClr>
-                      </a:solidFill>
-                      <a:prstDash val="solid"/>
-                    </a:lnL>
-                    <a:lnR w="0" cmpd="sng" algn="ctr" cap="flat">
-                      <a:solidFill>
-                        <a:srgbClr val="FFFFFF">
-                          <a:alpha val="0"/>
-                        </a:srgbClr>
-                      </a:solidFill>
-                      <a:prstDash val="solid"/>
-                    </a:lnR>
-                    <a:lnT w="0" cmpd="sng" algn="ctr" cap="flat">
-                      <a:solidFill>
-                        <a:srgbClr val="FFFFFF">
-                          <a:alpha val="0"/>
-                        </a:srgbClr>
-                      </a:solidFill>
-                      <a:prstDash val="solid"/>
-                    </a:lnT>
-                    <a:lnB w="0" cmpd="sng" algn="ctr" cap="flat">
-                      <a:solidFill>
-                        <a:srgbClr val="FFFFFF">
-                          <a:alpha val="0"/>
-                        </a:srgbClr>
-                      </a:solidFill>
-                      <a:prstDash val="solid"/>
-                    </a:lnB>
-                    <a:solidFill>
-                      <a:srgbClr val="D6D6CE">
-                        <a:alpha val="100000"/>
-                      </a:srgbClr>
-                    </a:solidFill>
-                  </a:tcPr>
-                </a:tc>
-              </a:tr>
-              <a:tr h="293757">
-                <a:tc>
-                  <a:txBody>
-                    <a:bodyPr/>
-                    <a:lstStyle/>
-                    <a:p>
-                      <a:pPr algn="l" marL="63500" marR="63500">
-                        <a:lnSpc>
-                          <a:spcPct val="100000"/>
-                        </a:lnSpc>
-                        <a:spcBef>
-                          <a:spcPts val="200"/>
-                        </a:spcBef>
-                        <a:spcAft>
-                          <a:spcPts val="200"/>
-                        </a:spcAft>
-                        <a:buNone/>
-                      </a:pPr>
-                      <a:r>
-                        <a:rPr sz="1000">
-                          <a:solidFill>
-                            <a:srgbClr val="111111">
-                              <a:alpha val="100000"/>
-                            </a:srgbClr>
-                          </a:solidFill>
-                          <a:latin typeface="Arial"/>
-                          <a:cs typeface="Arial"/>
-                        </a:rPr>
-                        <a:t>OY Only Household</a:t>
-                      </a:r>
-                    </a:p>
-                  </a:txBody>
-                  <a:tcPr anchor="ctr" marB="0" marT="0" marR="0" marL="0">
-                    <a:lnL w="0" cmpd="sng" algn="ctr" cap="flat">
-                      <a:solidFill>
-                        <a:srgbClr val="FFFFFF">
-                          <a:alpha val="0"/>
-                        </a:srgbClr>
-                      </a:solidFill>
-                      <a:prstDash val="solid"/>
-                    </a:lnL>
-                    <a:lnR w="0" cmpd="sng" algn="ctr" cap="flat">
-                      <a:solidFill>
-                        <a:srgbClr val="FFFFFF">
-                          <a:alpha val="0"/>
-                        </a:srgbClr>
-                      </a:solidFill>
-                      <a:prstDash val="solid"/>
-                    </a:lnR>
-                    <a:lnT w="0" cmpd="sng" algn="ctr" cap="flat">
-                      <a:solidFill>
-                        <a:srgbClr val="FFFFFF">
-                          <a:alpha val="0"/>
-                        </a:srgbClr>
-                      </a:solidFill>
-                      <a:prstDash val="solid"/>
-                    </a:lnT>
-                    <a:lnB w="0" cmpd="sng" algn="ctr" cap="flat">
-                      <a:solidFill>
-                        <a:srgbClr val="FFFFFF">
-                          <a:alpha val="0"/>
-                        </a:srgbClr>
-                      </a:solidFill>
-                      <a:prstDash val="solid"/>
-                    </a:lnB>
-                  </a:tcPr>
-                </a:tc>
-                <a:tc>
-                  <a:txBody>
-                    <a:bodyPr/>
-                    <a:lstStyle/>
-                    <a:p>
-                      <a:pPr algn="ctr" marL="63500" marR="63500">
-                        <a:lnSpc>
-                          <a:spcPct val="100000"/>
-                        </a:lnSpc>
-                        <a:spcBef>
-                          <a:spcPts val="200"/>
-                        </a:spcBef>
-                        <a:spcAft>
-                          <a:spcPts val="200"/>
-                        </a:spcAft>
-                        <a:buNone/>
-                      </a:pPr>
-                      <a:r>
-                        <a:rPr sz="1000">
-                          <a:solidFill>
-                            <a:srgbClr val="111111">
-                              <a:alpha val="100000"/>
-                            </a:srgbClr>
-                          </a:solidFill>
-                          <a:latin typeface="Arial"/>
-                          <a:cs typeface="Arial"/>
-                        </a:rPr>
-                        <a:t>Not Present</a:t>
-                      </a:r>
-                    </a:p>
-                  </a:txBody>
-                  <a:tcPr anchor="ctr" marB="0" marT="0" marR="0" marL="0">
-                    <a:lnL w="0" cmpd="sng" algn="ctr" cap="flat">
-                      <a:solidFill>
-                        <a:srgbClr val="FFFFFF">
-                          <a:alpha val="0"/>
-                        </a:srgbClr>
-                      </a:solidFill>
-                      <a:prstDash val="solid"/>
-                    </a:lnL>
-                    <a:lnR w="0" cmpd="sng" algn="ctr" cap="flat">
-                      <a:solidFill>
-                        <a:srgbClr val="FFFFFF">
-                          <a:alpha val="0"/>
-                        </a:srgbClr>
-                      </a:solidFill>
-                      <a:prstDash val="solid"/>
-                    </a:lnR>
-                    <a:lnT w="0" cmpd="sng" algn="ctr" cap="flat">
-                      <a:solidFill>
-                        <a:srgbClr val="FFFFFF">
-                          <a:alpha val="0"/>
-                        </a:srgbClr>
-                      </a:solidFill>
-                      <a:prstDash val="solid"/>
-                    </a:lnT>
-                    <a:lnB w="0" cmpd="sng" algn="ctr" cap="flat">
-                      <a:solidFill>
-                        <a:srgbClr val="FFFFFF">
-                          <a:alpha val="0"/>
-                        </a:srgbClr>
-                      </a:solidFill>
-                      <a:prstDash val="solid"/>
-                    </a:lnB>
-                  </a:tcPr>
-                </a:tc>
-                <a:tc>
-                  <a:txBody>
-                    <a:bodyPr/>
-                    <a:lstStyle/>
-                    <a:p>
-                      <a:pPr algn="ctr" marL="63500" marR="63500">
-                        <a:lnSpc>
-                          <a:spcPct val="100000"/>
-                        </a:lnSpc>
-                        <a:spcBef>
-                          <a:spcPts val="200"/>
-                        </a:spcBef>
-                        <a:spcAft>
-                          <a:spcPts val="200"/>
-                        </a:spcAft>
-                        <a:buNone/>
-                      </a:pPr>
-                      <a:r>
-                        <a:rPr sz="1000">
-                          <a:solidFill>
-                            <a:srgbClr val="111111">
-                              <a:alpha val="100000"/>
-                            </a:srgbClr>
-                          </a:solidFill>
-                          <a:latin typeface="Arial"/>
-                          <a:cs typeface="Arial"/>
-                        </a:rPr>
-                        <a:t>Not Present</a:t>
-                      </a:r>
-                    </a:p>
-                  </a:txBody>
-                  <a:tcPr anchor="ctr" marB="0" marT="0" marR="0" marL="0">
-                    <a:lnL w="0" cmpd="sng" algn="ctr" cap="flat">
-                      <a:solidFill>
-                        <a:srgbClr val="FFFFFF">
-                          <a:alpha val="0"/>
-                        </a:srgbClr>
-                      </a:solidFill>
-                      <a:prstDash val="solid"/>
-                    </a:lnL>
-                    <a:lnR w="0" cmpd="sng" algn="ctr" cap="flat">
-                      <a:solidFill>
-                        <a:srgbClr val="FFFFFF">
-                          <a:alpha val="0"/>
-                        </a:srgbClr>
-                      </a:solidFill>
-                      <a:prstDash val="solid"/>
-                    </a:lnR>
-                    <a:lnT w="0" cmpd="sng" algn="ctr" cap="flat">
-                      <a:solidFill>
-                        <a:srgbClr val="FFFFFF">
-                          <a:alpha val="0"/>
-                        </a:srgbClr>
-                      </a:solidFill>
-                      <a:prstDash val="solid"/>
-                    </a:lnT>
-                    <a:lnB w="0" cmpd="sng" algn="ctr" cap="flat">
-                      <a:solidFill>
-                        <a:srgbClr val="FFFFFF">
-                          <a:alpha val="0"/>
-                        </a:srgbClr>
-                      </a:solidFill>
-                      <a:prstDash val="solid"/>
-                    </a:lnB>
-                  </a:tcPr>
-                </a:tc>
-                <a:tc>
-                  <a:txBody>
-                    <a:bodyPr/>
-                    <a:lstStyle/>
-                    <a:p>
-                      <a:pPr algn="ctr" marL="63500" marR="63500">
-                        <a:lnSpc>
-                          <a:spcPct val="100000"/>
-                        </a:lnSpc>
-                        <a:spcBef>
-                          <a:spcPts val="200"/>
-                        </a:spcBef>
-                        <a:spcAft>
-                          <a:spcPts val="200"/>
-                        </a:spcAft>
-                        <a:buNone/>
-                      </a:pPr>
-                      <a:r>
-                        <a:rPr sz="1000">
-                          <a:solidFill>
-                            <a:srgbClr val="111111">
-                              <a:alpha val="100000"/>
-                            </a:srgbClr>
-                          </a:solidFill>
-                          <a:latin typeface="Arial"/>
-                          <a:cs typeface="Arial"/>
-                        </a:rPr>
                         <a:t>Present</a:t>
-                      </a:r>
-                    </a:p>
-                  </a:txBody>
-                  <a:tcPr anchor="ctr" marB="0" marT="0" marR="0" marL="0">
-                    <a:lnL w="0" cmpd="sng" algn="ctr" cap="flat">
-                      <a:solidFill>
-                        <a:srgbClr val="FFFFFF">
-                          <a:alpha val="0"/>
-                        </a:srgbClr>
-                      </a:solidFill>
-                      <a:prstDash val="solid"/>
-                    </a:lnL>
-                    <a:lnR w="0" cmpd="sng" algn="ctr" cap="flat">
-                      <a:solidFill>
-                        <a:srgbClr val="FFFFFF">
-                          <a:alpha val="0"/>
-                        </a:srgbClr>
-                      </a:solidFill>
-                      <a:prstDash val="solid"/>
-                    </a:lnR>
-                    <a:lnT w="0" cmpd="sng" algn="ctr" cap="flat">
-                      <a:solidFill>
-                        <a:srgbClr val="FFFFFF">
-                          <a:alpha val="0"/>
-                        </a:srgbClr>
-                      </a:solidFill>
-                      <a:prstDash val="solid"/>
-                    </a:lnT>
-                    <a:lnB w="0" cmpd="sng" algn="ctr" cap="flat">
-                      <a:solidFill>
-                        <a:srgbClr val="FFFFFF">
-                          <a:alpha val="0"/>
-                        </a:srgbClr>
-                      </a:solidFill>
-                      <a:prstDash val="solid"/>
-                    </a:lnB>
-                  </a:tcPr>
-                </a:tc>
-              </a:tr>
-              <a:tr h="293757">
-                <a:tc>
-                  <a:txBody>
-                    <a:bodyPr/>
-                    <a:lstStyle/>
-                    <a:p>
-                      <a:pPr algn="l" marL="63500" marR="63500">
-                        <a:lnSpc>
-                          <a:spcPct val="100000"/>
-                        </a:lnSpc>
-                        <a:spcBef>
-                          <a:spcPts val="200"/>
-                        </a:spcBef>
-                        <a:spcAft>
-                          <a:spcPts val="200"/>
-                        </a:spcAft>
-                        <a:buNone/>
-                      </a:pPr>
-                      <a:r>
-                        <a:rPr sz="1000">
-                          <a:solidFill>
-                            <a:srgbClr val="111111">
-                              <a:alpha val="100000"/>
-                            </a:srgbClr>
-                          </a:solidFill>
-                          <a:latin typeface="Arial"/>
-                          <a:cs typeface="Arial"/>
-                        </a:rPr>
-                        <a:t>OY-CY Only Household</a:t>
-                      </a:r>
-                    </a:p>
-                  </a:txBody>
-                  <a:tcPr anchor="ctr" marB="0" marT="0" marR="0" marL="0">
-                    <a:lnL w="0" cmpd="sng" algn="ctr" cap="flat">
-                      <a:solidFill>
-                        <a:srgbClr val="FFFFFF">
-                          <a:alpha val="0"/>
-                        </a:srgbClr>
-                      </a:solidFill>
-                      <a:prstDash val="solid"/>
-                    </a:lnL>
-                    <a:lnR w="0" cmpd="sng" algn="ctr" cap="flat">
-                      <a:solidFill>
-                        <a:srgbClr val="FFFFFF">
-                          <a:alpha val="0"/>
-                        </a:srgbClr>
-                      </a:solidFill>
-                      <a:prstDash val="solid"/>
-                    </a:lnR>
-                    <a:lnT w="0" cmpd="sng" algn="ctr" cap="flat">
-                      <a:solidFill>
-                        <a:srgbClr val="FFFFFF">
-                          <a:alpha val="0"/>
-                        </a:srgbClr>
-                      </a:solidFill>
-                      <a:prstDash val="solid"/>
-                    </a:lnT>
-                    <a:lnB w="0" cmpd="sng" algn="ctr" cap="flat">
-                      <a:solidFill>
-                        <a:srgbClr val="FFFFFF">
-                          <a:alpha val="0"/>
-                        </a:srgbClr>
-                      </a:solidFill>
-                      <a:prstDash val="solid"/>
-                    </a:lnB>
-                    <a:solidFill>
-                      <a:srgbClr val="D6D6CE">
-                        <a:alpha val="100000"/>
-                      </a:srgbClr>
-                    </a:solidFill>
-                  </a:tcPr>
-                </a:tc>
-                <a:tc>
-                  <a:txBody>
-                    <a:bodyPr/>
-                    <a:lstStyle/>
-                    <a:p>
-                      <a:pPr algn="ctr" marL="63500" marR="63500">
-                        <a:lnSpc>
-                          <a:spcPct val="100000"/>
-                        </a:lnSpc>
-                        <a:spcBef>
-                          <a:spcPts val="200"/>
-                        </a:spcBef>
-                        <a:spcAft>
-                          <a:spcPts val="200"/>
-                        </a:spcAft>
-                        <a:buNone/>
-                      </a:pPr>
-                      <a:r>
-                        <a:rPr sz="1000">
-                          <a:solidFill>
-                            <a:srgbClr val="111111">
-                              <a:alpha val="100000"/>
-                            </a:srgbClr>
-                          </a:solidFill>
-                          <a:latin typeface="Arial"/>
-                          <a:cs typeface="Arial"/>
-                        </a:rPr>
-                        <a:t>Not Present</a:t>
                       </a:r>
                     </a:p>
                   </a:txBody>
@@ -7836,343 +7395,6 @@
                     </a:solidFill>
                   </a:tcPr>
                 </a:tc>
-                <a:tc>
-                  <a:txBody>
-                    <a:bodyPr/>
-                    <a:lstStyle/>
-                    <a:p>
-                      <a:pPr algn="ctr" marL="63500" marR="63500">
-                        <a:lnSpc>
-                          <a:spcPct val="100000"/>
-                        </a:lnSpc>
-                        <a:spcBef>
-                          <a:spcPts val="200"/>
-                        </a:spcBef>
-                        <a:spcAft>
-                          <a:spcPts val="200"/>
-                        </a:spcAft>
-                        <a:buNone/>
-                      </a:pPr>
-                      <a:r>
-                        <a:rPr sz="1000">
-                          <a:solidFill>
-                            <a:srgbClr val="111111">
-                              <a:alpha val="100000"/>
-                            </a:srgbClr>
-                          </a:solidFill>
-                          <a:latin typeface="Arial"/>
-                          <a:cs typeface="Arial"/>
-                        </a:rPr>
-                        <a:t>Present</a:t>
-                      </a:r>
-                    </a:p>
-                  </a:txBody>
-                  <a:tcPr anchor="ctr" marB="0" marT="0" marR="0" marL="0">
-                    <a:lnL w="0" cmpd="sng" algn="ctr" cap="flat">
-                      <a:solidFill>
-                        <a:srgbClr val="FFFFFF">
-                          <a:alpha val="0"/>
-                        </a:srgbClr>
-                      </a:solidFill>
-                      <a:prstDash val="solid"/>
-                    </a:lnL>
-                    <a:lnR w="0" cmpd="sng" algn="ctr" cap="flat">
-                      <a:solidFill>
-                        <a:srgbClr val="FFFFFF">
-                          <a:alpha val="0"/>
-                        </a:srgbClr>
-                      </a:solidFill>
-                      <a:prstDash val="solid"/>
-                    </a:lnR>
-                    <a:lnT w="0" cmpd="sng" algn="ctr" cap="flat">
-                      <a:solidFill>
-                        <a:srgbClr val="FFFFFF">
-                          <a:alpha val="0"/>
-                        </a:srgbClr>
-                      </a:solidFill>
-                      <a:prstDash val="solid"/>
-                    </a:lnT>
-                    <a:lnB w="0" cmpd="sng" algn="ctr" cap="flat">
-                      <a:solidFill>
-                        <a:srgbClr val="FFFFFF">
-                          <a:alpha val="0"/>
-                        </a:srgbClr>
-                      </a:solidFill>
-                      <a:prstDash val="solid"/>
-                    </a:lnB>
-                    <a:solidFill>
-                      <a:srgbClr val="D6D6CE">
-                        <a:alpha val="100000"/>
-                      </a:srgbClr>
-                    </a:solidFill>
-                  </a:tcPr>
-                </a:tc>
-              </a:tr>
-              <a:tr h="293757">
-                <a:tc>
-                  <a:txBody>
-                    <a:bodyPr/>
-                    <a:lstStyle/>
-                    <a:p>
-                      <a:pPr algn="l" marL="63500" marR="63500">
-                        <a:lnSpc>
-                          <a:spcPct val="100000"/>
-                        </a:lnSpc>
-                        <a:spcBef>
-                          <a:spcPts val="200"/>
-                        </a:spcBef>
-                        <a:spcAft>
-                          <a:spcPts val="200"/>
-                        </a:spcAft>
-                        <a:buNone/>
-                      </a:pPr>
-                      <a:r>
-                        <a:rPr sz="1000">
-                          <a:solidFill>
-                            <a:srgbClr val="111111">
-                              <a:alpha val="100000"/>
-                            </a:srgbClr>
-                          </a:solidFill>
-                          <a:latin typeface="Arial"/>
-                          <a:cs typeface="Arial"/>
-                        </a:rPr>
-                        <a:t>OY-EE Only Household</a:t>
-                      </a:r>
-                    </a:p>
-                  </a:txBody>
-                  <a:tcPr anchor="ctr" marB="0" marT="0" marR="0" marL="0">
-                    <a:lnL w="0" cmpd="sng" algn="ctr" cap="flat">
-                      <a:solidFill>
-                        <a:srgbClr val="FFFFFF">
-                          <a:alpha val="0"/>
-                        </a:srgbClr>
-                      </a:solidFill>
-                      <a:prstDash val="solid"/>
-                    </a:lnL>
-                    <a:lnR w="0" cmpd="sng" algn="ctr" cap="flat">
-                      <a:solidFill>
-                        <a:srgbClr val="FFFFFF">
-                          <a:alpha val="0"/>
-                        </a:srgbClr>
-                      </a:solidFill>
-                      <a:prstDash val="solid"/>
-                    </a:lnR>
-                    <a:lnT w="0" cmpd="sng" algn="ctr" cap="flat">
-                      <a:solidFill>
-                        <a:srgbClr val="FFFFFF">
-                          <a:alpha val="0"/>
-                        </a:srgbClr>
-                      </a:solidFill>
-                      <a:prstDash val="solid"/>
-                    </a:lnT>
-                    <a:lnB w="0" cmpd="sng" algn="ctr" cap="flat">
-                      <a:solidFill>
-                        <a:srgbClr val="FFFFFF">
-                          <a:alpha val="0"/>
-                        </a:srgbClr>
-                      </a:solidFill>
-                      <a:prstDash val="solid"/>
-                    </a:lnB>
-                  </a:tcPr>
-                </a:tc>
-                <a:tc>
-                  <a:txBody>
-                    <a:bodyPr/>
-                    <a:lstStyle/>
-                    <a:p>
-                      <a:pPr algn="ctr" marL="63500" marR="63500">
-                        <a:lnSpc>
-                          <a:spcPct val="100000"/>
-                        </a:lnSpc>
-                        <a:spcBef>
-                          <a:spcPts val="200"/>
-                        </a:spcBef>
-                        <a:spcAft>
-                          <a:spcPts val="200"/>
-                        </a:spcAft>
-                        <a:buNone/>
-                      </a:pPr>
-                      <a:r>
-                        <a:rPr sz="1000">
-                          <a:solidFill>
-                            <a:srgbClr val="111111">
-                              <a:alpha val="100000"/>
-                            </a:srgbClr>
-                          </a:solidFill>
-                          <a:latin typeface="Arial"/>
-                          <a:cs typeface="Arial"/>
-                        </a:rPr>
-                        <a:t>Present</a:t>
-                      </a:r>
-                    </a:p>
-                  </a:txBody>
-                  <a:tcPr anchor="ctr" marB="0" marT="0" marR="0" marL="0">
-                    <a:lnL w="0" cmpd="sng" algn="ctr" cap="flat">
-                      <a:solidFill>
-                        <a:srgbClr val="FFFFFF">
-                          <a:alpha val="0"/>
-                        </a:srgbClr>
-                      </a:solidFill>
-                      <a:prstDash val="solid"/>
-                    </a:lnL>
-                    <a:lnR w="0" cmpd="sng" algn="ctr" cap="flat">
-                      <a:solidFill>
-                        <a:srgbClr val="FFFFFF">
-                          <a:alpha val="0"/>
-                        </a:srgbClr>
-                      </a:solidFill>
-                      <a:prstDash val="solid"/>
-                    </a:lnR>
-                    <a:lnT w="0" cmpd="sng" algn="ctr" cap="flat">
-                      <a:solidFill>
-                        <a:srgbClr val="FFFFFF">
-                          <a:alpha val="0"/>
-                        </a:srgbClr>
-                      </a:solidFill>
-                      <a:prstDash val="solid"/>
-                    </a:lnT>
-                    <a:lnB w="0" cmpd="sng" algn="ctr" cap="flat">
-                      <a:solidFill>
-                        <a:srgbClr val="FFFFFF">
-                          <a:alpha val="0"/>
-                        </a:srgbClr>
-                      </a:solidFill>
-                      <a:prstDash val="solid"/>
-                    </a:lnB>
-                  </a:tcPr>
-                </a:tc>
-                <a:tc>
-                  <a:txBody>
-                    <a:bodyPr/>
-                    <a:lstStyle/>
-                    <a:p>
-                      <a:pPr algn="ctr" marL="63500" marR="63500">
-                        <a:lnSpc>
-                          <a:spcPct val="100000"/>
-                        </a:lnSpc>
-                        <a:spcBef>
-                          <a:spcPts val="200"/>
-                        </a:spcBef>
-                        <a:spcAft>
-                          <a:spcPts val="200"/>
-                        </a:spcAft>
-                        <a:buNone/>
-                      </a:pPr>
-                      <a:r>
-                        <a:rPr sz="1000">
-                          <a:solidFill>
-                            <a:srgbClr val="111111">
-                              <a:alpha val="100000"/>
-                            </a:srgbClr>
-                          </a:solidFill>
-                          <a:latin typeface="Arial"/>
-                          <a:cs typeface="Arial"/>
-                        </a:rPr>
-                        <a:t>Not Present</a:t>
-                      </a:r>
-                    </a:p>
-                  </a:txBody>
-                  <a:tcPr anchor="ctr" marB="0" marT="0" marR="0" marL="0">
-                    <a:lnL w="0" cmpd="sng" algn="ctr" cap="flat">
-                      <a:solidFill>
-                        <a:srgbClr val="FFFFFF">
-                          <a:alpha val="0"/>
-                        </a:srgbClr>
-                      </a:solidFill>
-                      <a:prstDash val="solid"/>
-                    </a:lnL>
-                    <a:lnR w="0" cmpd="sng" algn="ctr" cap="flat">
-                      <a:solidFill>
-                        <a:srgbClr val="FFFFFF">
-                          <a:alpha val="0"/>
-                        </a:srgbClr>
-                      </a:solidFill>
-                      <a:prstDash val="solid"/>
-                    </a:lnR>
-                    <a:lnT w="0" cmpd="sng" algn="ctr" cap="flat">
-                      <a:solidFill>
-                        <a:srgbClr val="FFFFFF">
-                          <a:alpha val="0"/>
-                        </a:srgbClr>
-                      </a:solidFill>
-                      <a:prstDash val="solid"/>
-                    </a:lnT>
-                    <a:lnB w="0" cmpd="sng" algn="ctr" cap="flat">
-                      <a:solidFill>
-                        <a:srgbClr val="FFFFFF">
-                          <a:alpha val="0"/>
-                        </a:srgbClr>
-                      </a:solidFill>
-                      <a:prstDash val="solid"/>
-                    </a:lnB>
-                  </a:tcPr>
-                </a:tc>
-                <a:tc>
-                  <a:txBody>
-                    <a:bodyPr/>
-                    <a:lstStyle/>
-                    <a:p>
-                      <a:pPr algn="ctr" marL="63500" marR="63500">
-                        <a:lnSpc>
-                          <a:spcPct val="100000"/>
-                        </a:lnSpc>
-                        <a:spcBef>
-                          <a:spcPts val="200"/>
-                        </a:spcBef>
-                        <a:spcAft>
-                          <a:spcPts val="200"/>
-                        </a:spcAft>
-                        <a:buNone/>
-                      </a:pPr>
-                      <a:r>
-                        <a:rPr sz="1000">
-                          <a:solidFill>
-                            <a:srgbClr val="111111">
-                              <a:alpha val="100000"/>
-                            </a:srgbClr>
-                          </a:solidFill>
-                          <a:latin typeface="Arial"/>
-                          <a:cs typeface="Arial"/>
-                        </a:rPr>
-                        <a:t>Present</a:t>
-                      </a:r>
-                    </a:p>
-                  </a:txBody>
-                  <a:tcPr anchor="ctr" marB="0" marT="0" marR="0" marL="0">
-                    <a:lnL w="0" cmpd="sng" algn="ctr" cap="flat">
-                      <a:solidFill>
-                        <a:srgbClr val="FFFFFF">
-                          <a:alpha val="0"/>
-                        </a:srgbClr>
-                      </a:solidFill>
-                      <a:prstDash val="solid"/>
-                    </a:lnL>
-                    <a:lnR w="0" cmpd="sng" algn="ctr" cap="flat">
-                      <a:solidFill>
-                        <a:srgbClr val="FFFFFF">
-                          <a:alpha val="0"/>
-                        </a:srgbClr>
-                      </a:solidFill>
-                      <a:prstDash val="solid"/>
-                    </a:lnR>
-                    <a:lnT w="0" cmpd="sng" algn="ctr" cap="flat">
-                      <a:solidFill>
-                        <a:srgbClr val="FFFFFF">
-                          <a:alpha val="0"/>
-                        </a:srgbClr>
-                      </a:solidFill>
-                      <a:prstDash val="solid"/>
-                    </a:lnT>
-                    <a:lnB w="0" cmpd="sng" algn="ctr" cap="flat">
-                      <a:solidFill>
-                        <a:srgbClr val="FFFFFF">
-                          <a:alpha val="0"/>
-                        </a:srgbClr>
-                      </a:solidFill>
-                      <a:prstDash val="solid"/>
-                    </a:lnB>
-                  </a:tcPr>
-                </a:tc>
               </a:tr>
             </a:tbl>
           </a:graphicData>
@@ -8284,7 +7506,7 @@
             </a:pPr>
             <a:r>
               <a:rPr/>
-              <a:t>Who</a:t>
+              <a:t>Identify</a:t>
             </a:r>
             <a:r>
               <a:rPr/>
@@ -8292,7 +7514,7 @@
             </a:r>
             <a:r>
               <a:rPr/>
-              <a:t>identifies</a:t>
+              <a:t>as</a:t>
             </a:r>
             <a:r>
               <a:rPr/>
@@ -8300,7 +7522,7 @@
             </a:r>
             <a:r>
               <a:rPr/>
-              <a:t>as</a:t>
+              <a:t>Reference</a:t>
             </a:r>
             <a:r>
               <a:rPr/>
@@ -8308,47 +7530,7 @@
             </a:r>
             <a:r>
               <a:rPr/>
-              <a:t>‘</a:t>
-            </a:r>
-            <a:r>
-              <a:rPr/>
-              <a:t>Reference</a:t>
-            </a:r>
-            <a:r>
-              <a:rPr/>
-              <a:t>’</a:t>
-            </a:r>
-            <a:r>
-              <a:rPr/>
-              <a:t> </a:t>
-            </a:r>
-            <a:r>
-              <a:rPr/>
               <a:t>Person</a:t>
-            </a:r>
-            <a:r>
-              <a:rPr/>
-              <a:t> </a:t>
-            </a:r>
-            <a:r>
-              <a:rPr/>
-              <a:t>on</a:t>
-            </a:r>
-            <a:r>
-              <a:rPr/>
-              <a:t> </a:t>
-            </a:r>
-            <a:r>
-              <a:rPr/>
-              <a:t>the</a:t>
-            </a:r>
-            <a:r>
-              <a:rPr/>
-              <a:t> </a:t>
-            </a:r>
-            <a:r>
-              <a:rPr/>
-              <a:t>ACS?</a:t>
             </a:r>
           </a:p>
         </p:txBody>

</xml_diff>

<commit_message>
lots of updates to visuals and collapsing of values in certain variables
</commit_message>
<xml_diff>
--- a/create_powerpoint/household_structure_estimates.pptx
+++ b/create_powerpoint/household_structure_estimates.pptx
@@ -31,9 +31,6 @@
     <p:sldId id="279" r:id="rId25"/>
     <p:sldId id="280" r:id="rId26"/>
     <p:sldId id="281" r:id="rId27"/>
-    <p:sldId id="282" r:id="rId28"/>
-    <p:sldId id="283" r:id="rId29"/>
-    <p:sldId id="284" r:id="rId30"/>
   </p:sldIdLst>
   <p:sldSz cx="12192000" cy="6858000"/>
   <p:notesSz cx="6858000" cy="9144000"/>
@@ -3617,7 +3614,7 @@
             </a:r>
             <a:r>
               <a:rPr/>
-              <a:t>18,</a:t>
+              <a:t>19,</a:t>
             </a:r>
             <a:r>
               <a:rPr/>
@@ -3636,169 +3633,6 @@
 </file>
 
 <file path=ppt/slides/slide10.xml><?xml version="1.0" encoding="utf-8"?>
-<p:sld xmlns:a="http://schemas.openxmlformats.org/drawingml/2006/main" xmlns:r="http://schemas.openxmlformats.org/officeDocument/2006/relationships" xmlns:p="http://schemas.openxmlformats.org/presentationml/2006/main">
-  <p:cSld>
-    <p:spTree>
-      <p:nvGrpSpPr>
-        <p:cNvPr id="1" name=""/>
-        <p:cNvGrpSpPr/>
-        <p:nvPr/>
-      </p:nvGrpSpPr>
-      <p:grpSpPr>
-        <a:xfrm>
-          <a:off x="0" y="0"/>
-          <a:ext cx="0" cy="0"/>
-          <a:chOff x="0" y="0"/>
-          <a:chExt cx="0" cy="0"/>
-        </a:xfrm>
-      </p:grpSpPr>
-      <p:sp>
-        <p:nvSpPr>
-          <p:cNvPr id="2" name="Title 1">
-            <a:extLst>
-              <a:ext uri="{FF2B5EF4-FFF2-40B4-BE49-F238E27FC236}">
-                <a16:creationId xmlns:a16="http://schemas.microsoft.com/office/drawing/2014/main" id="{0D064A50-2A97-421C-813D-6449089693A0}"/>
-              </a:ext>
-            </a:extLst>
-          </p:cNvPr>
-          <p:cNvSpPr>
-            <a:spLocks noGrp="1"/>
-          </p:cNvSpPr>
-          <p:nvPr>
-            <p:ph type="title"/>
-          </p:nvPr>
-        </p:nvSpPr>
-        <p:spPr/>
-        <p:txBody>
-          <a:bodyPr/>
-          <a:lstStyle/>
-          <a:p>
-            <a:pPr lvl="0" marL="0" indent="0">
-              <a:buNone/>
-            </a:pPr>
-            <a:r>
-              <a:rPr/>
-              <a:t>Opportunity</a:t>
-            </a:r>
-            <a:r>
-              <a:rPr/>
-              <a:t> </a:t>
-            </a:r>
-            <a:r>
-              <a:rPr/>
-              <a:t>Youth</a:t>
-            </a:r>
-            <a:r>
-              <a:rPr/>
-              <a:t> </a:t>
-            </a:r>
-            <a:r>
-              <a:rPr/>
-              <a:t>households</a:t>
-            </a:r>
-            <a:r>
-              <a:rPr/>
-              <a:t> </a:t>
-            </a:r>
-            <a:r>
-              <a:rPr/>
-              <a:t>are</a:t>
-            </a:r>
-            <a:r>
-              <a:rPr/>
-              <a:t> </a:t>
-            </a:r>
-            <a:r>
-              <a:rPr/>
-              <a:t>more</a:t>
-            </a:r>
-            <a:r>
-              <a:rPr/>
-              <a:t> </a:t>
-            </a:r>
-            <a:r>
-              <a:rPr/>
-              <a:t>likely</a:t>
-            </a:r>
-            <a:r>
-              <a:rPr/>
-              <a:t> </a:t>
-            </a:r>
-            <a:r>
-              <a:rPr/>
-              <a:t>to</a:t>
-            </a:r>
-            <a:r>
-              <a:rPr/>
-              <a:t> </a:t>
-            </a:r>
-            <a:r>
-              <a:rPr/>
-              <a:t>contain</a:t>
-            </a:r>
-            <a:r>
-              <a:rPr/>
-              <a:t> </a:t>
-            </a:r>
-            <a:r>
-              <a:rPr/>
-              <a:t>‘</a:t>
-            </a:r>
-            <a:r>
-              <a:rPr/>
-              <a:t>Everyone</a:t>
-            </a:r>
-            <a:r>
-              <a:rPr/>
-              <a:t> </a:t>
-            </a:r>
-            <a:r>
-              <a:rPr/>
-              <a:t>Else</a:t>
-            </a:r>
-            <a:r>
-              <a:rPr/>
-              <a:t>’</a:t>
-            </a:r>
-          </a:p>
-        </p:txBody>
-      </p:sp>
-      <p:pic>
-        <p:nvPicPr>
-          <p:cNvPr descr="household_structure_estimates_files/figure-pptx/unnamed-chunk-5-1.png" id="0" name="Picture 1"/>
-          <p:cNvPicPr>
-            <a:picLocks noGrp="1" noChangeAspect="1"/>
-          </p:cNvPicPr>
-          <p:nvPr/>
-        </p:nvPicPr>
-        <p:blipFill>
-          <a:blip r:embed="rId2"/>
-          <a:stretch>
-            <a:fillRect/>
-          </a:stretch>
-        </p:blipFill>
-        <p:spPr bwMode="auto">
-          <a:xfrm>
-            <a:off x="2616200" y="1816100"/>
-            <a:ext cx="6946900" cy="4343400"/>
-          </a:xfrm>
-          <a:prstGeom prst="rect">
-            <a:avLst/>
-          </a:prstGeom>
-          <a:noFill/>
-          <a:ln w="9525">
-            <a:noFill/>
-            <a:headEnd/>
-            <a:tailEnd/>
-          </a:ln>
-        </p:spPr>
-      </p:pic>
-    </p:spTree>
-  </p:cSld>
-</p:sld>
-</file>
-
-<file path=ppt/slides/slide11.xml><?xml version="1.0" encoding="utf-8"?>
 <p:sld xmlns:a="http://schemas.openxmlformats.org/drawingml/2006/main" xmlns:r="http://schemas.openxmlformats.org/officeDocument/2006/relationships" xmlns:p="http://schemas.openxmlformats.org/presentationml/2006/main">
   <p:cSld>
     <p:spTree>
@@ -3945,6 +3779,161 @@
 </p:sld>
 </file>
 
+<file path=ppt/slides/slide11.xml><?xml version="1.0" encoding="utf-8"?>
+<p:sld xmlns:a="http://schemas.openxmlformats.org/drawingml/2006/main" xmlns:r="http://schemas.openxmlformats.org/officeDocument/2006/relationships" xmlns:p="http://schemas.openxmlformats.org/presentationml/2006/main">
+  <p:cSld>
+    <p:spTree>
+      <p:nvGrpSpPr>
+        <p:cNvPr id="1" name=""/>
+        <p:cNvGrpSpPr/>
+        <p:nvPr/>
+      </p:nvGrpSpPr>
+      <p:grpSpPr>
+        <a:xfrm>
+          <a:off x="0" y="0"/>
+          <a:ext cx="0" cy="0"/>
+          <a:chOff x="0" y="0"/>
+          <a:chExt cx="0" cy="0"/>
+        </a:xfrm>
+      </p:grpSpPr>
+      <p:sp>
+        <p:nvSpPr>
+          <p:cNvPr id="2" name="Title 1">
+            <a:extLst>
+              <a:ext uri="{FF2B5EF4-FFF2-40B4-BE49-F238E27FC236}">
+                <a16:creationId xmlns:a16="http://schemas.microsoft.com/office/drawing/2014/main" id="{0D064A50-2A97-421C-813D-6449089693A0}"/>
+              </a:ext>
+            </a:extLst>
+          </p:cNvPr>
+          <p:cNvSpPr>
+            <a:spLocks noGrp="1"/>
+          </p:cNvSpPr>
+          <p:nvPr>
+            <p:ph type="title"/>
+          </p:nvPr>
+        </p:nvSpPr>
+        <p:spPr/>
+        <p:txBody>
+          <a:bodyPr/>
+          <a:lstStyle/>
+          <a:p>
+            <a:pPr lvl="0" marL="0" indent="0">
+              <a:buNone/>
+            </a:pPr>
+            <a:r>
+              <a:rPr/>
+              <a:t>Both</a:t>
+            </a:r>
+            <a:r>
+              <a:rPr/>
+              <a:t> </a:t>
+            </a:r>
+            <a:r>
+              <a:rPr/>
+              <a:t>Connected</a:t>
+            </a:r>
+            <a:r>
+              <a:rPr/>
+              <a:t> </a:t>
+            </a:r>
+            <a:r>
+              <a:rPr/>
+              <a:t>Youth</a:t>
+            </a:r>
+            <a:r>
+              <a:rPr/>
+              <a:t> </a:t>
+            </a:r>
+            <a:r>
+              <a:rPr/>
+              <a:t>and</a:t>
+            </a:r>
+            <a:r>
+              <a:rPr/>
+              <a:t> </a:t>
+            </a:r>
+            <a:r>
+              <a:rPr/>
+              <a:t>Opportunity</a:t>
+            </a:r>
+            <a:r>
+              <a:rPr/>
+              <a:t> </a:t>
+            </a:r>
+            <a:r>
+              <a:rPr/>
+              <a:t>Youth</a:t>
+            </a:r>
+            <a:r>
+              <a:rPr/>
+              <a:t> </a:t>
+            </a:r>
+            <a:r>
+              <a:rPr/>
+              <a:t>live</a:t>
+            </a:r>
+            <a:r>
+              <a:rPr/>
+              <a:t> </a:t>
+            </a:r>
+            <a:r>
+              <a:rPr/>
+              <a:t>in</a:t>
+            </a:r>
+            <a:r>
+              <a:rPr/>
+              <a:t> </a:t>
+            </a:r>
+            <a:r>
+              <a:rPr/>
+              <a:t>larger</a:t>
+            </a:r>
+            <a:r>
+              <a:rPr/>
+              <a:t> </a:t>
+            </a:r>
+            <a:r>
+              <a:rPr/>
+              <a:t>households</a:t>
+            </a:r>
+          </a:p>
+        </p:txBody>
+      </p:sp>
+      <p:pic>
+        <p:nvPicPr>
+          <p:cNvPr descr="household_structure_estimates_files/figure-pptx/unnamed-chunk-8-1.png" id="0" name="Picture 1"/>
+          <p:cNvPicPr>
+            <a:picLocks noGrp="1" noChangeAspect="1"/>
+          </p:cNvPicPr>
+          <p:nvPr/>
+        </p:nvPicPr>
+        <p:blipFill>
+          <a:blip r:embed="rId2"/>
+          <a:stretch>
+            <a:fillRect/>
+          </a:stretch>
+        </p:blipFill>
+        <p:spPr bwMode="auto">
+          <a:xfrm>
+            <a:off x="2616200" y="1816100"/>
+            <a:ext cx="6946900" cy="4343400"/>
+          </a:xfrm>
+          <a:prstGeom prst="rect">
+            <a:avLst/>
+          </a:prstGeom>
+          <a:noFill/>
+          <a:ln w="9525">
+            <a:noFill/>
+            <a:headEnd/>
+            <a:tailEnd/>
+          </a:ln>
+        </p:spPr>
+      </p:pic>
+    </p:spTree>
+  </p:cSld>
+</p:sld>
+</file>
+
 <file path=ppt/slides/slide12.xml><?xml version="1.0" encoding="utf-8"?>
 <p:sld xmlns:a="http://schemas.openxmlformats.org/drawingml/2006/main" xmlns:r="http://schemas.openxmlformats.org/officeDocument/2006/relationships" xmlns:p="http://schemas.openxmlformats.org/presentationml/2006/main">
   <p:cSld>
@@ -3988,7 +3977,55 @@
             </a:pPr>
             <a:r>
               <a:rPr/>
-              <a:t>Both</a:t>
+              <a:t>Opportunity</a:t>
+            </a:r>
+            <a:r>
+              <a:rPr/>
+              <a:t> </a:t>
+            </a:r>
+            <a:r>
+              <a:rPr/>
+              <a:t>Youth</a:t>
+            </a:r>
+            <a:r>
+              <a:rPr/>
+              <a:t> </a:t>
+            </a:r>
+            <a:r>
+              <a:rPr/>
+              <a:t>are</a:t>
+            </a:r>
+            <a:r>
+              <a:rPr/>
+              <a:t> </a:t>
+            </a:r>
+            <a:r>
+              <a:rPr/>
+              <a:t>half</a:t>
+            </a:r>
+            <a:r>
+              <a:rPr/>
+              <a:t> </a:t>
+            </a:r>
+            <a:r>
+              <a:rPr/>
+              <a:t>as</a:t>
+            </a:r>
+            <a:r>
+              <a:rPr/>
+              <a:t> </a:t>
+            </a:r>
+            <a:r>
+              <a:rPr/>
+              <a:t>likely</a:t>
+            </a:r>
+            <a:r>
+              <a:rPr/>
+              <a:t> </a:t>
+            </a:r>
+            <a:r>
+              <a:rPr/>
+              <a:t>as</a:t>
             </a:r>
             <a:r>
               <a:rPr/>
@@ -4012,62 +4049,46 @@
             </a:r>
             <a:r>
               <a:rPr/>
-              <a:t>and</a:t>
-            </a:r>
-            <a:r>
-              <a:rPr/>
-              <a:t> </a:t>
-            </a:r>
-            <a:r>
-              <a:rPr/>
-              <a:t>Opportunity</a:t>
-            </a:r>
-            <a:r>
-              <a:rPr/>
-              <a:t> </a:t>
-            </a:r>
-            <a:r>
-              <a:rPr/>
-              <a:t>Youth</a:t>
-            </a:r>
-            <a:r>
-              <a:rPr/>
-              <a:t> </a:t>
-            </a:r>
-            <a:r>
-              <a:rPr/>
-              <a:t>live</a:t>
-            </a:r>
-            <a:r>
-              <a:rPr/>
-              <a:t> </a:t>
-            </a:r>
-            <a:r>
-              <a:rPr/>
-              <a:t>in</a:t>
-            </a:r>
-            <a:r>
-              <a:rPr/>
-              <a:t> </a:t>
-            </a:r>
-            <a:r>
-              <a:rPr/>
-              <a:t>larger</a:t>
-            </a:r>
-            <a:r>
-              <a:rPr/>
-              <a:t> </a:t>
-            </a:r>
-            <a:r>
-              <a:rPr/>
-              <a:t>households</a:t>
+              <a:t>to</a:t>
+            </a:r>
+            <a:r>
+              <a:rPr/>
+              <a:t> </a:t>
+            </a:r>
+            <a:r>
+              <a:rPr/>
+              <a:t>be</a:t>
+            </a:r>
+            <a:r>
+              <a:rPr/>
+              <a:t> </a:t>
+            </a:r>
+            <a:r>
+              <a:rPr/>
+              <a:t>the</a:t>
+            </a:r>
+            <a:r>
+              <a:rPr/>
+              <a:t> </a:t>
+            </a:r>
+            <a:r>
+              <a:rPr/>
+              <a:t>reference</a:t>
+            </a:r>
+            <a:r>
+              <a:rPr/>
+              <a:t> </a:t>
+            </a:r>
+            <a:r>
+              <a:rPr/>
+              <a:t>person</a:t>
             </a:r>
           </a:p>
         </p:txBody>
       </p:sp>
       <p:pic>
         <p:nvPicPr>
-          <p:cNvPr descr="household_structure_estimates_files/figure-pptx/unnamed-chunk-8-1.png" id="0" name="Picture 1"/>
+          <p:cNvPr descr="household_structure_estimates_files/figure-pptx/unnamed-chunk-9-1.png" id="0" name="Picture 1"/>
           <p:cNvPicPr>
             <a:picLocks noGrp="1" noChangeAspect="1"/>
           </p:cNvPicPr>
@@ -4151,6 +4172,22 @@
             </a:r>
             <a:r>
               <a:rPr/>
+              <a:t>and</a:t>
+            </a:r>
+            <a:r>
+              <a:rPr/>
+              <a:t> </a:t>
+            </a:r>
+            <a:r>
+              <a:rPr/>
+              <a:t>Connected</a:t>
+            </a:r>
+            <a:r>
+              <a:rPr/>
+              <a:t> </a:t>
+            </a:r>
+            <a:r>
+              <a:rPr/>
               <a:t>Youth</a:t>
             </a:r>
             <a:r>
@@ -4167,47 +4204,15 @@
             </a:r>
             <a:r>
               <a:rPr/>
-              <a:t>half</a:t>
-            </a:r>
-            <a:r>
-              <a:rPr/>
-              <a:t> </a:t>
-            </a:r>
-            <a:r>
-              <a:rPr/>
-              <a:t>as</a:t>
-            </a:r>
-            <a:r>
-              <a:rPr/>
-              <a:t> </a:t>
-            </a:r>
-            <a:r>
-              <a:rPr/>
-              <a:t>likely</a:t>
-            </a:r>
-            <a:r>
-              <a:rPr/>
-              <a:t> </a:t>
-            </a:r>
-            <a:r>
-              <a:rPr/>
-              <a:t>as</a:t>
-            </a:r>
-            <a:r>
-              <a:rPr/>
-              <a:t> </a:t>
-            </a:r>
-            <a:r>
-              <a:rPr/>
-              <a:t>Connected</a:t>
-            </a:r>
-            <a:r>
-              <a:rPr/>
-              <a:t> </a:t>
-            </a:r>
-            <a:r>
-              <a:rPr/>
-              <a:t>Youth</a:t>
+              <a:t>both</a:t>
+            </a:r>
+            <a:r>
+              <a:rPr/>
+              <a:t> </a:t>
+            </a:r>
+            <a:r>
+              <a:rPr/>
+              <a:t>unlikely</a:t>
             </a:r>
             <a:r>
               <a:rPr/>
@@ -4231,30 +4236,14 @@
             </a:r>
             <a:r>
               <a:rPr/>
-              <a:t>the</a:t>
-            </a:r>
-            <a:r>
-              <a:rPr/>
-              <a:t> </a:t>
-            </a:r>
-            <a:r>
-              <a:rPr/>
-              <a:t>reference</a:t>
-            </a:r>
-            <a:r>
-              <a:rPr/>
-              <a:t> </a:t>
-            </a:r>
-            <a:r>
-              <a:rPr/>
-              <a:t>person</a:t>
+              <a:t>married</a:t>
             </a:r>
           </a:p>
         </p:txBody>
       </p:sp>
       <p:pic>
         <p:nvPicPr>
-          <p:cNvPr descr="household_structure_estimates_files/figure-pptx/unnamed-chunk-9-1.png" id="0" name="Picture 1"/>
+          <p:cNvPr descr="household_structure_estimates_files/figure-pptx/unnamed-chunk-10-1.png" id="0" name="Picture 1"/>
           <p:cNvPicPr>
             <a:picLocks noGrp="1" noChangeAspect="1"/>
           </p:cNvPicPr>
@@ -4268,8 +4257,8 @@
         </p:blipFill>
         <p:spPr bwMode="auto">
           <a:xfrm>
-            <a:off x="2616200" y="1816100"/>
-            <a:ext cx="6946900" cy="4343400"/>
+            <a:off x="1752600" y="1816100"/>
+            <a:ext cx="8686800" cy="4343400"/>
           </a:xfrm>
           <a:prstGeom prst="rect">
             <a:avLst/>
@@ -4354,23 +4343,7 @@
             </a:r>
             <a:r>
               <a:rPr/>
-              <a:t>three</a:t>
-            </a:r>
-            <a:r>
-              <a:rPr/>
-              <a:t> </a:t>
-            </a:r>
-            <a:r>
-              <a:rPr/>
-              <a:t>times</a:t>
-            </a:r>
-            <a:r>
-              <a:rPr/>
-              <a:t> </a:t>
-            </a:r>
-            <a:r>
-              <a:rPr/>
-              <a:t>as</a:t>
+              <a:t>more</a:t>
             </a:r>
             <a:r>
               <a:rPr/>
@@ -4394,6 +4367,38 @@
             </a:r>
             <a:r>
               <a:rPr/>
+              <a:t>than</a:t>
+            </a:r>
+            <a:r>
+              <a:rPr/>
+              <a:t> </a:t>
+            </a:r>
+            <a:r>
+              <a:rPr/>
+              <a:t>Connected</a:t>
+            </a:r>
+            <a:r>
+              <a:rPr/>
+              <a:t> </a:t>
+            </a:r>
+            <a:r>
+              <a:rPr/>
+              <a:t>Youth</a:t>
+            </a:r>
+            <a:r>
+              <a:rPr/>
+              <a:t> </a:t>
+            </a:r>
+            <a:r>
+              <a:rPr/>
+              <a:t>to</a:t>
+            </a:r>
+            <a:r>
+              <a:rPr/>
+              <a:t> </a:t>
+            </a:r>
+            <a:r>
+              <a:rPr/>
               <a:t>have</a:t>
             </a:r>
             <a:r>
@@ -4402,38 +4407,70 @@
             </a:r>
             <a:r>
               <a:rPr/>
-              <a:t>at</a:t>
-            </a:r>
-            <a:r>
-              <a:rPr/>
-              <a:t> </a:t>
-            </a:r>
-            <a:r>
-              <a:rPr/>
-              <a:t>least</a:t>
-            </a:r>
-            <a:r>
-              <a:rPr/>
-              <a:t> </a:t>
-            </a:r>
-            <a:r>
-              <a:rPr/>
-              <a:t>one</a:t>
-            </a:r>
-            <a:r>
-              <a:rPr/>
-              <a:t> </a:t>
-            </a:r>
-            <a:r>
-              <a:rPr/>
-              <a:t>child</a:t>
+              <a:t>lived</a:t>
+            </a:r>
+            <a:r>
+              <a:rPr/>
+              <a:t> </a:t>
+            </a:r>
+            <a:r>
+              <a:rPr/>
+              <a:t>in</a:t>
+            </a:r>
+            <a:r>
+              <a:rPr/>
+              <a:t> </a:t>
+            </a:r>
+            <a:r>
+              <a:rPr/>
+              <a:t>the</a:t>
+            </a:r>
+            <a:r>
+              <a:rPr/>
+              <a:t> </a:t>
+            </a:r>
+            <a:r>
+              <a:rPr/>
+              <a:t>same</a:t>
+            </a:r>
+            <a:r>
+              <a:rPr/>
+              <a:t> </a:t>
+            </a:r>
+            <a:r>
+              <a:rPr/>
+              <a:t>house</a:t>
+            </a:r>
+            <a:r>
+              <a:rPr/>
+              <a:t> </a:t>
+            </a:r>
+            <a:r>
+              <a:rPr/>
+              <a:t>the</a:t>
+            </a:r>
+            <a:r>
+              <a:rPr/>
+              <a:t> </a:t>
+            </a:r>
+            <a:r>
+              <a:rPr/>
+              <a:t>prior</a:t>
+            </a:r>
+            <a:r>
+              <a:rPr/>
+              <a:t> </a:t>
+            </a:r>
+            <a:r>
+              <a:rPr/>
+              <a:t>year</a:t>
             </a:r>
           </a:p>
         </p:txBody>
       </p:sp>
       <p:pic>
         <p:nvPicPr>
-          <p:cNvPr descr="household_structure_estimates_files/figure-pptx/unnamed-chunk-10-1.png" id="0" name="Picture 1"/>
+          <p:cNvPr descr="household_structure_estimates_files/figure-pptx/unnamed-chunk-12-1.png" id="0" name="Picture 1"/>
           <p:cNvPicPr>
             <a:picLocks noGrp="1" noChangeAspect="1"/>
           </p:cNvPicPr>
@@ -4447,8 +4484,8 @@
         </p:blipFill>
         <p:spPr bwMode="auto">
           <a:xfrm>
-            <a:off x="3200400" y="1816100"/>
-            <a:ext cx="5791200" cy="4343400"/>
+            <a:off x="2616200" y="1816100"/>
+            <a:ext cx="6946900" cy="4343400"/>
           </a:xfrm>
           <a:prstGeom prst="rect">
             <a:avLst/>
@@ -4533,7 +4570,23 @@
             </a:r>
             <a:r>
               <a:rPr/>
-              <a:t>more</a:t>
+              <a:t>three</a:t>
+            </a:r>
+            <a:r>
+              <a:rPr/>
+              <a:t> </a:t>
+            </a:r>
+            <a:r>
+              <a:rPr/>
+              <a:t>times</a:t>
+            </a:r>
+            <a:r>
+              <a:rPr/>
+              <a:t> </a:t>
+            </a:r>
+            <a:r>
+              <a:rPr/>
+              <a:t>as</a:t>
             </a:r>
             <a:r>
               <a:rPr/>
@@ -4565,22 +4618,38 @@
             </a:r>
             <a:r>
               <a:rPr/>
-              <a:t>multiple</a:t>
-            </a:r>
-            <a:r>
-              <a:rPr/>
-              <a:t> </a:t>
-            </a:r>
-            <a:r>
-              <a:rPr/>
-              <a:t>children</a:t>
+              <a:t>at</a:t>
+            </a:r>
+            <a:r>
+              <a:rPr/>
+              <a:t> </a:t>
+            </a:r>
+            <a:r>
+              <a:rPr/>
+              <a:t>least</a:t>
+            </a:r>
+            <a:r>
+              <a:rPr/>
+              <a:t> </a:t>
+            </a:r>
+            <a:r>
+              <a:rPr/>
+              <a:t>one</a:t>
+            </a:r>
+            <a:r>
+              <a:rPr/>
+              <a:t> </a:t>
+            </a:r>
+            <a:r>
+              <a:rPr/>
+              <a:t>child</a:t>
             </a:r>
           </a:p>
         </p:txBody>
       </p:sp>
       <p:pic>
         <p:nvPicPr>
-          <p:cNvPr descr="household_structure_estimates_files/figure-pptx/unnamed-chunk-11-1.png" id="0" name="Picture 1"/>
+          <p:cNvPr descr="household_structure_estimates_files/figure-pptx/unnamed-chunk-13-1.png" id="0" name="Picture 1"/>
           <p:cNvPicPr>
             <a:picLocks noGrp="1" noChangeAspect="1"/>
           </p:cNvPicPr>
@@ -4594,8 +4663,8 @@
         </p:blipFill>
         <p:spPr bwMode="auto">
           <a:xfrm>
-            <a:off x="2616200" y="1816100"/>
-            <a:ext cx="6946900" cy="4343400"/>
+            <a:off x="3200400" y="1816100"/>
+            <a:ext cx="5791200" cy="4343400"/>
           </a:xfrm>
           <a:prstGeom prst="rect">
             <a:avLst/>
@@ -4656,126 +4725,78 @@
             </a:pPr>
             <a:r>
               <a:rPr/>
-              <a:t>The</a:t>
-            </a:r>
-            <a:r>
-              <a:rPr/>
-              <a:t> </a:t>
-            </a:r>
-            <a:r>
-              <a:rPr/>
-              <a:t>median</a:t>
-            </a:r>
-            <a:r>
-              <a:rPr/>
-              <a:t> </a:t>
-            </a:r>
-            <a:r>
-              <a:rPr/>
-              <a:t>income</a:t>
-            </a:r>
-            <a:r>
-              <a:rPr/>
-              <a:t> </a:t>
-            </a:r>
-            <a:r>
-              <a:rPr/>
-              <a:t>of</a:t>
-            </a:r>
-            <a:r>
-              <a:rPr/>
-              <a:t> </a:t>
-            </a:r>
-            <a:r>
-              <a:rPr/>
-              <a:t>OY</a:t>
-            </a:r>
-            <a:r>
-              <a:rPr/>
-              <a:t> </a:t>
-            </a:r>
-            <a:r>
-              <a:rPr/>
-              <a:t>Only</a:t>
-            </a:r>
-            <a:r>
-              <a:rPr/>
-              <a:t> </a:t>
-            </a:r>
-            <a:r>
-              <a:rPr/>
-              <a:t>Households</a:t>
-            </a:r>
-            <a:r>
-              <a:rPr/>
-              <a:t> </a:t>
-            </a:r>
-            <a:r>
-              <a:rPr/>
-              <a:t>is</a:t>
-            </a:r>
-            <a:r>
-              <a:rPr/>
-              <a:t> </a:t>
-            </a:r>
-            <a:r>
-              <a:rPr/>
-              <a:t>less</a:t>
-            </a:r>
-            <a:r>
-              <a:rPr/>
-              <a:t> </a:t>
-            </a:r>
-            <a:r>
-              <a:rPr/>
-              <a:t>than</a:t>
-            </a:r>
-            <a:r>
-              <a:rPr/>
-              <a:t> </a:t>
-            </a:r>
-            <a:r>
-              <a:rPr/>
-              <a:t>half</a:t>
-            </a:r>
-            <a:r>
-              <a:rPr/>
-              <a:t> </a:t>
-            </a:r>
-            <a:r>
-              <a:rPr/>
-              <a:t>that</a:t>
-            </a:r>
-            <a:r>
-              <a:rPr/>
-              <a:t> </a:t>
-            </a:r>
-            <a:r>
-              <a:rPr/>
-              <a:t>of</a:t>
-            </a:r>
-            <a:r>
-              <a:rPr/>
-              <a:t> </a:t>
-            </a:r>
-            <a:r>
-              <a:rPr/>
-              <a:t>other</a:t>
-            </a:r>
-            <a:r>
-              <a:rPr/>
-              <a:t> </a:t>
-            </a:r>
-            <a:r>
-              <a:rPr/>
-              <a:t>households</a:t>
+              <a:t>Opportunity</a:t>
+            </a:r>
+            <a:r>
+              <a:rPr/>
+              <a:t> </a:t>
+            </a:r>
+            <a:r>
+              <a:rPr/>
+              <a:t>Youth</a:t>
+            </a:r>
+            <a:r>
+              <a:rPr/>
+              <a:t> </a:t>
+            </a:r>
+            <a:r>
+              <a:rPr/>
+              <a:t>are</a:t>
+            </a:r>
+            <a:r>
+              <a:rPr/>
+              <a:t> </a:t>
+            </a:r>
+            <a:r>
+              <a:rPr/>
+              <a:t>more</a:t>
+            </a:r>
+            <a:r>
+              <a:rPr/>
+              <a:t> </a:t>
+            </a:r>
+            <a:r>
+              <a:rPr/>
+              <a:t>likely</a:t>
+            </a:r>
+            <a:r>
+              <a:rPr/>
+              <a:t> </a:t>
+            </a:r>
+            <a:r>
+              <a:rPr/>
+              <a:t>to</a:t>
+            </a:r>
+            <a:r>
+              <a:rPr/>
+              <a:t> </a:t>
+            </a:r>
+            <a:r>
+              <a:rPr/>
+              <a:t>have</a:t>
+            </a:r>
+            <a:r>
+              <a:rPr/>
+              <a:t> </a:t>
+            </a:r>
+            <a:r>
+              <a:rPr/>
+              <a:t>multiple</a:t>
+            </a:r>
+            <a:r>
+              <a:rPr/>
+              <a:t> </a:t>
+            </a:r>
+            <a:r>
+              <a:rPr/>
+              <a:t>children</a:t>
             </a:r>
           </a:p>
         </p:txBody>
       </p:sp>
       <p:pic>
         <p:nvPicPr>
-          <p:cNvPr descr="household_structure_estimates_files/figure-pptx/unnamed-chunk-12-1.png" id="0" name="Picture 1"/>
+          <p:cNvPr descr="household_structure_estimates_files/figure-pptx/unnamed-chunk-14-1.png" id="0" name="Picture 1"/>
           <p:cNvPicPr>
             <a:picLocks noGrp="1" noChangeAspect="1"/>
           </p:cNvPicPr>
@@ -4789,8 +4810,8 @@
         </p:blipFill>
         <p:spPr bwMode="auto">
           <a:xfrm>
-            <a:off x="3200400" y="1816100"/>
-            <a:ext cx="5791200" cy="4343400"/>
+            <a:off x="2616200" y="1816100"/>
+            <a:ext cx="6946900" cy="4343400"/>
           </a:xfrm>
           <a:prstGeom prst="rect">
             <a:avLst/>
@@ -4851,15 +4872,31 @@
             </a:pPr>
             <a:r>
               <a:rPr/>
-              <a:t>Median</a:t>
-            </a:r>
-            <a:r>
-              <a:rPr/>
-              <a:t> </a:t>
-            </a:r>
-            <a:r>
-              <a:rPr/>
-              <a:t>Income</a:t>
+              <a:t>The</a:t>
+            </a:r>
+            <a:r>
+              <a:rPr/>
+              <a:t> </a:t>
+            </a:r>
+            <a:r>
+              <a:rPr/>
+              <a:t>median</a:t>
+            </a:r>
+            <a:r>
+              <a:rPr/>
+              <a:t> </a:t>
+            </a:r>
+            <a:r>
+              <a:rPr/>
+              <a:t>income</a:t>
+            </a:r>
+            <a:r>
+              <a:rPr/>
+              <a:t> </a:t>
+            </a:r>
+            <a:r>
+              <a:rPr/>
+              <a:t>of</a:t>
             </a:r>
             <a:r>
               <a:rPr/>
@@ -4875,38 +4912,86 @@
             </a:r>
             <a:r>
               <a:rPr/>
-              <a:t>Reference</a:t>
-            </a:r>
-            <a:r>
-              <a:rPr/>
-              <a:t> </a:t>
-            </a:r>
-            <a:r>
-              <a:rPr/>
-              <a:t>Person</a:t>
-            </a:r>
-            <a:r>
-              <a:rPr/>
-              <a:t> </a:t>
-            </a:r>
-            <a:r>
-              <a:rPr/>
-              <a:t>by</a:t>
-            </a:r>
-            <a:r>
-              <a:rPr/>
-              <a:t> </a:t>
-            </a:r>
-            <a:r>
-              <a:rPr/>
-              <a:t>PUMA</a:t>
+              <a:t>Only</a:t>
+            </a:r>
+            <a:r>
+              <a:rPr/>
+              <a:t> </a:t>
+            </a:r>
+            <a:r>
+              <a:rPr/>
+              <a:t>Households</a:t>
+            </a:r>
+            <a:r>
+              <a:rPr/>
+              <a:t> </a:t>
+            </a:r>
+            <a:r>
+              <a:rPr/>
+              <a:t>is</a:t>
+            </a:r>
+            <a:r>
+              <a:rPr/>
+              <a:t> </a:t>
+            </a:r>
+            <a:r>
+              <a:rPr/>
+              <a:t>less</a:t>
+            </a:r>
+            <a:r>
+              <a:rPr/>
+              <a:t> </a:t>
+            </a:r>
+            <a:r>
+              <a:rPr/>
+              <a:t>than</a:t>
+            </a:r>
+            <a:r>
+              <a:rPr/>
+              <a:t> </a:t>
+            </a:r>
+            <a:r>
+              <a:rPr/>
+              <a:t>half</a:t>
+            </a:r>
+            <a:r>
+              <a:rPr/>
+              <a:t> </a:t>
+            </a:r>
+            <a:r>
+              <a:rPr/>
+              <a:t>that</a:t>
+            </a:r>
+            <a:r>
+              <a:rPr/>
+              <a:t> </a:t>
+            </a:r>
+            <a:r>
+              <a:rPr/>
+              <a:t>of</a:t>
+            </a:r>
+            <a:r>
+              <a:rPr/>
+              <a:t> </a:t>
+            </a:r>
+            <a:r>
+              <a:rPr/>
+              <a:t>other</a:t>
+            </a:r>
+            <a:r>
+              <a:rPr/>
+              <a:t> </a:t>
+            </a:r>
+            <a:r>
+              <a:rPr/>
+              <a:t>households</a:t>
             </a:r>
           </a:p>
         </p:txBody>
       </p:sp>
       <p:pic>
         <p:nvPicPr>
-          <p:cNvPr descr="household_structure_estimates_files/figure-pptx/unnamed-chunk-13-1.png" id="0" name="Picture 1"/>
+          <p:cNvPr descr="household_structure_estimates_files/figure-pptx/unnamed-chunk-15-1.png" id="0" name="Picture 1"/>
           <p:cNvPicPr>
             <a:picLocks noGrp="1" noChangeAspect="1"/>
           </p:cNvPicPr>
@@ -4920,8 +5005,8 @@
         </p:blipFill>
         <p:spPr bwMode="auto">
           <a:xfrm>
-            <a:off x="2616200" y="1816100"/>
-            <a:ext cx="6946900" cy="4343400"/>
+            <a:off x="3200400" y="1816100"/>
+            <a:ext cx="5791200" cy="4343400"/>
           </a:xfrm>
           <a:prstGeom prst="rect">
             <a:avLst/>
@@ -4982,102 +5067,62 @@
             </a:pPr>
             <a:r>
               <a:rPr/>
-              <a:t>Opportunity</a:t>
-            </a:r>
-            <a:r>
-              <a:rPr/>
-              <a:t> </a:t>
-            </a:r>
-            <a:r>
-              <a:rPr/>
-              <a:t>Youth</a:t>
-            </a:r>
-            <a:r>
-              <a:rPr/>
-              <a:t> </a:t>
-            </a:r>
-            <a:r>
-              <a:rPr/>
-              <a:t>have</a:t>
-            </a:r>
-            <a:r>
-              <a:rPr/>
-              <a:t> </a:t>
-            </a:r>
-            <a:r>
-              <a:rPr/>
-              <a:t>1/4th</a:t>
-            </a:r>
-            <a:r>
-              <a:rPr/>
-              <a:t> </a:t>
-            </a:r>
-            <a:r>
-              <a:rPr/>
-              <a:t>the</a:t>
-            </a:r>
-            <a:r>
-              <a:rPr/>
-              <a:t> </a:t>
-            </a:r>
-            <a:r>
-              <a:rPr/>
-              <a:t>total</a:t>
-            </a:r>
-            <a:r>
-              <a:rPr/>
-              <a:t> </a:t>
-            </a:r>
-            <a:r>
-              <a:rPr/>
-              <a:t>average</a:t>
-            </a:r>
-            <a:r>
-              <a:rPr/>
-              <a:t> </a:t>
-            </a:r>
-            <a:r>
-              <a:rPr/>
-              <a:t>personal</a:t>
-            </a:r>
-            <a:r>
-              <a:rPr/>
-              <a:t> </a:t>
-            </a:r>
-            <a:r>
-              <a:rPr/>
-              <a:t>income</a:t>
-            </a:r>
-            <a:r>
-              <a:rPr/>
-              <a:t> </a:t>
-            </a:r>
-            <a:r>
-              <a:rPr/>
-              <a:t>of</a:t>
-            </a:r>
-            <a:r>
-              <a:rPr/>
-              <a:t> </a:t>
-            </a:r>
-            <a:r>
-              <a:rPr/>
-              <a:t>Connected</a:t>
-            </a:r>
-            <a:r>
-              <a:rPr/>
-              <a:t> </a:t>
-            </a:r>
-            <a:r>
-              <a:rPr/>
-              <a:t>Youth</a:t>
+              <a:t>Median</a:t>
+            </a:r>
+            <a:r>
+              <a:rPr/>
+              <a:t> </a:t>
+            </a:r>
+            <a:r>
+              <a:rPr/>
+              <a:t>Income</a:t>
+            </a:r>
+            <a:r>
+              <a:rPr/>
+              <a:t> </a:t>
+            </a:r>
+            <a:r>
+              <a:rPr/>
+              <a:t>YY</a:t>
+            </a:r>
+            <a:r>
+              <a:rPr/>
+              <a:t> </a:t>
+            </a:r>
+            <a:r>
+              <a:rPr/>
+              <a:t>Reference</a:t>
+            </a:r>
+            <a:r>
+              <a:rPr/>
+              <a:t> </a:t>
+            </a:r>
+            <a:r>
+              <a:rPr/>
+              <a:t>Person</a:t>
+            </a:r>
+            <a:r>
+              <a:rPr/>
+              <a:t> </a:t>
+            </a:r>
+            <a:r>
+              <a:rPr/>
+              <a:t>by</a:t>
+            </a:r>
+            <a:r>
+              <a:rPr/>
+              <a:t> </a:t>
+            </a:r>
+            <a:r>
+              <a:rPr/>
+              <a:t>PUMA</a:t>
             </a:r>
           </a:p>
         </p:txBody>
       </p:sp>
       <p:pic>
         <p:nvPicPr>
-          <p:cNvPr descr="household_structure_estimates_files/figure-pptx/unnamed-chunk-14-1.png" id="0" name="Picture 1"/>
+          <p:cNvPr descr="household_structure_estimates_files/figure-pptx/unnamed-chunk-16-1.png" id="0" name="Picture 1"/>
           <p:cNvPicPr>
             <a:picLocks noGrp="1" noChangeAspect="1"/>
           </p:cNvPicPr>
@@ -5153,6 +5198,78 @@
             </a:pPr>
             <a:r>
               <a:rPr/>
+              <a:t>Connected</a:t>
+            </a:r>
+            <a:r>
+              <a:rPr/>
+              <a:t> </a:t>
+            </a:r>
+            <a:r>
+              <a:rPr/>
+              <a:t>Youth</a:t>
+            </a:r>
+            <a:r>
+              <a:rPr/>
+              <a:t> </a:t>
+            </a:r>
+            <a:r>
+              <a:rPr/>
+              <a:t>earn</a:t>
+            </a:r>
+            <a:r>
+              <a:rPr/>
+              <a:t> </a:t>
+            </a:r>
+            <a:r>
+              <a:rPr/>
+              <a:t>nearly</a:t>
+            </a:r>
+            <a:r>
+              <a:rPr/>
+              <a:t> </a:t>
+            </a:r>
+            <a:r>
+              <a:rPr/>
+              <a:t>four</a:t>
+            </a:r>
+            <a:r>
+              <a:rPr/>
+              <a:t> </a:t>
+            </a:r>
+            <a:r>
+              <a:rPr/>
+              <a:t>times</a:t>
+            </a:r>
+            <a:r>
+              <a:rPr/>
+              <a:t> </a:t>
+            </a:r>
+            <a:r>
+              <a:rPr/>
+              <a:t>the</a:t>
+            </a:r>
+            <a:r>
+              <a:rPr/>
+              <a:t> </a:t>
+            </a:r>
+            <a:r>
+              <a:rPr/>
+              <a:t>amount</a:t>
+            </a:r>
+            <a:r>
+              <a:rPr/>
+              <a:t> </a:t>
+            </a:r>
+            <a:r>
+              <a:rPr/>
+              <a:t>of</a:t>
+            </a:r>
+            <a:r>
+              <a:rPr/>
+              <a:t> </a:t>
+            </a:r>
+            <a:r>
+              <a:rPr/>
               <a:t>Opportunity</a:t>
             </a:r>
             <a:r>
@@ -5162,69 +5279,13 @@
             <a:r>
               <a:rPr/>
               <a:t>Youth</a:t>
-            </a:r>
-            <a:r>
-              <a:rPr/>
-              <a:t> </a:t>
-            </a:r>
-            <a:r>
-              <a:rPr/>
-              <a:t>are</a:t>
-            </a:r>
-            <a:r>
-              <a:rPr/>
-              <a:t> </a:t>
-            </a:r>
-            <a:r>
-              <a:rPr/>
-              <a:t>unlikely</a:t>
-            </a:r>
-            <a:r>
-              <a:rPr/>
-              <a:t> </a:t>
-            </a:r>
-            <a:r>
-              <a:rPr/>
-              <a:t>to</a:t>
-            </a:r>
-            <a:r>
-              <a:rPr/>
-              <a:t> </a:t>
-            </a:r>
-            <a:r>
-              <a:rPr/>
-              <a:t>be</a:t>
-            </a:r>
-            <a:r>
-              <a:rPr/>
-              <a:t> </a:t>
-            </a:r>
-            <a:r>
-              <a:rPr/>
-              <a:t>in</a:t>
-            </a:r>
-            <a:r>
-              <a:rPr/>
-              <a:t> </a:t>
-            </a:r>
-            <a:r>
-              <a:rPr/>
-              <a:t>a</a:t>
-            </a:r>
-            <a:r>
-              <a:rPr/>
-              <a:t> </a:t>
-            </a:r>
-            <a:r>
-              <a:rPr/>
-              <a:t>relationship</a:t>
             </a:r>
           </a:p>
         </p:txBody>
       </p:sp>
       <p:pic>
         <p:nvPicPr>
-          <p:cNvPr descr="household_structure_estimates_files/figure-pptx/unnamed-chunk-16-1.png" id="0" name="Picture 1"/>
+          <p:cNvPr descr="household_structure_estimates_files/figure-pptx/unnamed-chunk-17-1.png" id="0" name="Picture 1"/>
           <p:cNvPicPr>
             <a:picLocks noGrp="1" noChangeAspect="1"/>
           </p:cNvPicPr>
@@ -5238,8 +5299,8 @@
         </p:blipFill>
         <p:spPr bwMode="auto">
           <a:xfrm>
-            <a:off x="1752600" y="1816100"/>
-            <a:ext cx="8686800" cy="4343400"/>
+            <a:off x="2616200" y="1816100"/>
+            <a:ext cx="6946900" cy="4343400"/>
           </a:xfrm>
           <a:prstGeom prst="rect">
             <a:avLst/>
@@ -5403,9 +5464,120 @@
           <a:chExt cx="0" cy="0"/>
         </a:xfrm>
       </p:grpSpPr>
+      <p:sp>
+        <p:nvSpPr>
+          <p:cNvPr id="2" name="Title 1">
+            <a:extLst>
+              <a:ext uri="{FF2B5EF4-FFF2-40B4-BE49-F238E27FC236}">
+                <a16:creationId xmlns:a16="http://schemas.microsoft.com/office/drawing/2014/main" id="{0D064A50-2A97-421C-813D-6449089693A0}"/>
+              </a:ext>
+            </a:extLst>
+          </p:cNvPr>
+          <p:cNvSpPr>
+            <a:spLocks noGrp="1"/>
+          </p:cNvSpPr>
+          <p:nvPr>
+            <p:ph type="title"/>
+          </p:nvPr>
+        </p:nvSpPr>
+        <p:spPr/>
+        <p:txBody>
+          <a:bodyPr/>
+          <a:lstStyle/>
+          <a:p>
+            <a:pPr lvl="0" marL="0" indent="0">
+              <a:buNone/>
+            </a:pPr>
+            <a:r>
+              <a:rPr/>
+              <a:t>Most</a:t>
+            </a:r>
+            <a:r>
+              <a:rPr/>
+              <a:t> </a:t>
+            </a:r>
+            <a:r>
+              <a:rPr/>
+              <a:t>Connected</a:t>
+            </a:r>
+            <a:r>
+              <a:rPr/>
+              <a:t> </a:t>
+            </a:r>
+            <a:r>
+              <a:rPr/>
+              <a:t>Youth</a:t>
+            </a:r>
+            <a:r>
+              <a:rPr/>
+              <a:t> </a:t>
+            </a:r>
+            <a:r>
+              <a:rPr/>
+              <a:t>travel</a:t>
+            </a:r>
+            <a:r>
+              <a:rPr/>
+              <a:t> </a:t>
+            </a:r>
+            <a:r>
+              <a:rPr/>
+              <a:t>by</a:t>
+            </a:r>
+            <a:r>
+              <a:rPr/>
+              <a:t> </a:t>
+            </a:r>
+            <a:r>
+              <a:rPr/>
+              <a:t>car,</a:t>
+            </a:r>
+            <a:r>
+              <a:rPr/>
+              <a:t> </a:t>
+            </a:r>
+            <a:r>
+              <a:rPr/>
+              <a:t>truck,</a:t>
+            </a:r>
+            <a:r>
+              <a:rPr/>
+              <a:t> </a:t>
+            </a:r>
+            <a:r>
+              <a:rPr/>
+              <a:t>van</a:t>
+            </a:r>
+            <a:r>
+              <a:rPr/>
+              <a:t> </a:t>
+            </a:r>
+            <a:r>
+              <a:rPr/>
+              <a:t>or</a:t>
+            </a:r>
+            <a:r>
+              <a:rPr/>
+              <a:t> </a:t>
+            </a:r>
+            <a:r>
+              <a:rPr/>
+              <a:t>public</a:t>
+            </a:r>
+            <a:r>
+              <a:rPr/>
+              <a:t> </a:t>
+            </a:r>
+            <a:r>
+              <a:rPr/>
+              <a:t>transportation</a:t>
+            </a:r>
+          </a:p>
+        </p:txBody>
+      </p:sp>
       <p:pic>
         <p:nvPicPr>
-          <p:cNvPr descr="household_structure_estimates_files/figure-pptx/unnamed-chunk-17-1.png" id="0" name="Picture 1"/>
+          <p:cNvPr descr="household_structure_estimates_files/figure-pptx/unnamed-chunk-19-1.png" id="0" name="Picture 1"/>
           <p:cNvPicPr>
             <a:picLocks noGrp="1" noChangeAspect="1"/>
           </p:cNvPicPr>
@@ -5481,7 +5653,15 @@
             </a:pPr>
             <a:r>
               <a:rPr/>
-              <a:t>Opportunity</a:t>
+              <a:t>Most</a:t>
+            </a:r>
+            <a:r>
+              <a:rPr/>
+              <a:t> </a:t>
+            </a:r>
+            <a:r>
+              <a:rPr/>
+              <a:t>Connected</a:t>
             </a:r>
             <a:r>
               <a:rPr/>
@@ -5505,15 +5685,39 @@
             </a:r>
             <a:r>
               <a:rPr/>
-              <a:t>more</a:t>
-            </a:r>
-            <a:r>
-              <a:rPr/>
-              <a:t> </a:t>
-            </a:r>
-            <a:r>
-              <a:rPr/>
-              <a:t>likely</a:t>
+              <a:t>commute</a:t>
+            </a:r>
+            <a:r>
+              <a:rPr/>
+              <a:t> </a:t>
+            </a:r>
+            <a:r>
+              <a:rPr/>
+              <a:t>twenty</a:t>
+            </a:r>
+            <a:r>
+              <a:rPr/>
+              <a:t> </a:t>
+            </a:r>
+            <a:r>
+              <a:rPr/>
+              <a:t>minutes</a:t>
+            </a:r>
+            <a:r>
+              <a:rPr/>
+              <a:t> </a:t>
+            </a:r>
+            <a:r>
+              <a:rPr/>
+              <a:t>or</a:t>
+            </a:r>
+            <a:r>
+              <a:rPr/>
+              <a:t> </a:t>
+            </a:r>
+            <a:r>
+              <a:rPr/>
+              <a:t>less</a:t>
             </a:r>
             <a:r>
               <a:rPr/>
@@ -5529,78 +5733,22 @@
             </a:r>
             <a:r>
               <a:rPr/>
-              <a:t>have</a:t>
-            </a:r>
-            <a:r>
-              <a:rPr/>
-              <a:t> </a:t>
-            </a:r>
-            <a:r>
-              <a:rPr/>
-              <a:t>lived</a:t>
-            </a:r>
-            <a:r>
-              <a:rPr/>
-              <a:t> </a:t>
-            </a:r>
-            <a:r>
-              <a:rPr/>
-              <a:t>in</a:t>
-            </a:r>
-            <a:r>
-              <a:rPr/>
-              <a:t> </a:t>
-            </a:r>
-            <a:r>
-              <a:rPr/>
-              <a:t>the</a:t>
-            </a:r>
-            <a:r>
-              <a:rPr/>
-              <a:t> </a:t>
-            </a:r>
-            <a:r>
-              <a:rPr/>
-              <a:t>same</a:t>
-            </a:r>
-            <a:r>
-              <a:rPr/>
-              <a:t> </a:t>
-            </a:r>
-            <a:r>
-              <a:rPr/>
-              <a:t>house</a:t>
-            </a:r>
-            <a:r>
-              <a:rPr/>
-              <a:t> </a:t>
-            </a:r>
-            <a:r>
-              <a:rPr/>
-              <a:t>the</a:t>
-            </a:r>
-            <a:r>
-              <a:rPr/>
-              <a:t> </a:t>
-            </a:r>
-            <a:r>
-              <a:rPr/>
-              <a:t>prior</a:t>
-            </a:r>
-            <a:r>
-              <a:rPr/>
-              <a:t> </a:t>
-            </a:r>
-            <a:r>
-              <a:rPr/>
-              <a:t>year</a:t>
+              <a:t>their</a:t>
+            </a:r>
+            <a:r>
+              <a:rPr/>
+              <a:t> </a:t>
+            </a:r>
+            <a:r>
+              <a:rPr/>
+              <a:t>employer</a:t>
             </a:r>
           </a:p>
         </p:txBody>
       </p:sp>
       <p:pic>
         <p:nvPicPr>
-          <p:cNvPr descr="household_structure_estimates_files/figure-pptx/unnamed-chunk-18-1.png" id="0" name="Picture 1"/>
+          <p:cNvPr descr="household_structure_estimates_files/figure-pptx/unnamed-chunk-20-1.png" id="0" name="Picture 1"/>
           <p:cNvPicPr>
             <a:picLocks noGrp="1" noChangeAspect="1"/>
           </p:cNvPicPr>
@@ -5676,62 +5824,118 @@
             </a:pPr>
             <a:r>
               <a:rPr/>
-              <a:t>Mobility:</a:t>
-            </a:r>
-            <a:r>
-              <a:rPr/>
-              <a:t> </a:t>
-            </a:r>
-            <a:r>
-              <a:rPr/>
-              <a:t>Mode</a:t>
-            </a:r>
-            <a:r>
-              <a:rPr/>
-              <a:t> </a:t>
-            </a:r>
-            <a:r>
-              <a:rPr/>
-              <a:t>of</a:t>
-            </a:r>
-            <a:r>
-              <a:rPr/>
-              <a:t> </a:t>
-            </a:r>
-            <a:r>
-              <a:rPr/>
-              <a:t>Transportation</a:t>
-            </a:r>
-            <a:r>
-              <a:rPr/>
-              <a:t> </a:t>
-            </a:r>
-            <a:r>
-              <a:rPr/>
-              <a:t>for</a:t>
-            </a:r>
-            <a:r>
-              <a:rPr/>
-              <a:t> </a:t>
-            </a:r>
-            <a:r>
-              <a:rPr/>
-              <a:t>Connected</a:t>
-            </a:r>
-            <a:r>
-              <a:rPr/>
-              <a:t> </a:t>
-            </a:r>
-            <a:r>
-              <a:rPr/>
-              <a:t>Youth</a:t>
+              <a:t>Households</a:t>
+            </a:r>
+            <a:r>
+              <a:rPr/>
+              <a:t> </a:t>
+            </a:r>
+            <a:r>
+              <a:rPr/>
+              <a:t>w/OY</a:t>
+            </a:r>
+            <a:r>
+              <a:rPr/>
+              <a:t> </a:t>
+            </a:r>
+            <a:r>
+              <a:rPr/>
+              <a:t>are</a:t>
+            </a:r>
+            <a:r>
+              <a:rPr/>
+              <a:t> </a:t>
+            </a:r>
+            <a:r>
+              <a:rPr/>
+              <a:t>almost</a:t>
+            </a:r>
+            <a:r>
+              <a:rPr/>
+              <a:t> </a:t>
+            </a:r>
+            <a:r>
+              <a:rPr/>
+              <a:t>twice</a:t>
+            </a:r>
+            <a:r>
+              <a:rPr/>
+              <a:t> </a:t>
+            </a:r>
+            <a:r>
+              <a:rPr/>
+              <a:t>as</a:t>
+            </a:r>
+            <a:r>
+              <a:rPr/>
+              <a:t> </a:t>
+            </a:r>
+            <a:r>
+              <a:rPr/>
+              <a:t>likely</a:t>
+            </a:r>
+            <a:r>
+              <a:rPr/>
+              <a:t> </a:t>
+            </a:r>
+            <a:r>
+              <a:rPr/>
+              <a:t>to</a:t>
+            </a:r>
+            <a:r>
+              <a:rPr/>
+              <a:t> </a:t>
+            </a:r>
+            <a:r>
+              <a:rPr/>
+              <a:t>receive</a:t>
+            </a:r>
+            <a:r>
+              <a:rPr/>
+              <a:t> </a:t>
+            </a:r>
+            <a:r>
+              <a:rPr/>
+              <a:t>foodstamps</a:t>
+            </a:r>
+            <a:r>
+              <a:rPr/>
+              <a:t> </a:t>
+            </a:r>
+            <a:r>
+              <a:rPr/>
+              <a:t>than</a:t>
+            </a:r>
+            <a:r>
+              <a:rPr/>
+              <a:t> </a:t>
+            </a:r>
+            <a:r>
+              <a:rPr/>
+              <a:t>all</a:t>
+            </a:r>
+            <a:r>
+              <a:rPr/>
+              <a:t> </a:t>
+            </a:r>
+            <a:r>
+              <a:rPr/>
+              <a:t>other</a:t>
+            </a:r>
+            <a:r>
+              <a:rPr/>
+              <a:t> </a:t>
+            </a:r>
+            <a:r>
+              <a:rPr/>
+              <a:t>households</a:t>
             </a:r>
           </a:p>
         </p:txBody>
       </p:sp>
       <p:pic>
         <p:nvPicPr>
-          <p:cNvPr descr="household_structure_estimates_files/figure-pptx/unnamed-chunk-19-1.png" id="0" name="Picture 1"/>
+          <p:cNvPr descr="household_structure_estimates_files/figure-pptx/unnamed-chunk-21-1.png" id="0" name="Picture 1"/>
           <p:cNvPicPr>
             <a:picLocks noGrp="1" noChangeAspect="1"/>
           </p:cNvPicPr>
@@ -5807,63 +6011,71 @@
             </a:pPr>
             <a:r>
               <a:rPr/>
-              <a:t>Most</a:t>
-            </a:r>
-            <a:r>
-              <a:rPr/>
-              <a:t> </a:t>
-            </a:r>
-            <a:r>
-              <a:rPr/>
-              <a:t>Connected</a:t>
-            </a:r>
-            <a:r>
-              <a:rPr/>
-              <a:t> </a:t>
-            </a:r>
-            <a:r>
-              <a:rPr/>
-              <a:t>Youth</a:t>
-            </a:r>
-            <a:r>
-              <a:rPr/>
-              <a:t> </a:t>
-            </a:r>
-            <a:r>
-              <a:rPr/>
-              <a:t>commute</a:t>
-            </a:r>
-            <a:r>
-              <a:rPr/>
-              <a:t> </a:t>
-            </a:r>
-            <a:r>
-              <a:rPr/>
-              <a:t>less</a:t>
-            </a:r>
-            <a:r>
-              <a:rPr/>
-              <a:t> </a:t>
-            </a:r>
-            <a:r>
-              <a:rPr/>
-              <a:t>than</a:t>
-            </a:r>
-            <a:r>
-              <a:rPr/>
-              <a:t> </a:t>
-            </a:r>
-            <a:r>
-              <a:rPr/>
-              <a:t>ten</a:t>
-            </a:r>
-            <a:r>
-              <a:rPr/>
-              <a:t> </a:t>
-            </a:r>
-            <a:r>
-              <a:rPr/>
-              <a:t>minutes</a:t>
+              <a:t>Almost</a:t>
+            </a:r>
+            <a:r>
+              <a:rPr/>
+              <a:t> </a:t>
+            </a:r>
+            <a:r>
+              <a:rPr/>
+              <a:t>1</a:t>
+            </a:r>
+            <a:r>
+              <a:rPr/>
+              <a:t> </a:t>
+            </a:r>
+            <a:r>
+              <a:rPr/>
+              <a:t>in</a:t>
+            </a:r>
+            <a:r>
+              <a:rPr/>
+              <a:t> </a:t>
+            </a:r>
+            <a:r>
+              <a:rPr/>
+              <a:t>4</a:t>
+            </a:r>
+            <a:r>
+              <a:rPr/>
+              <a:t> </a:t>
+            </a:r>
+            <a:r>
+              <a:rPr/>
+              <a:t>households</a:t>
+            </a:r>
+            <a:r>
+              <a:rPr/>
+              <a:t> </a:t>
+            </a:r>
+            <a:r>
+              <a:rPr/>
+              <a:t>with</a:t>
+            </a:r>
+            <a:r>
+              <a:rPr/>
+              <a:t> </a:t>
+            </a:r>
+            <a:r>
+              <a:rPr/>
+              <a:t>OY</a:t>
+            </a:r>
+            <a:r>
+              <a:rPr/>
+              <a:t> </a:t>
+            </a:r>
+            <a:r>
+              <a:rPr/>
+              <a:t>lack</a:t>
+            </a:r>
+            <a:r>
+              <a:rPr/>
+              <a:t> </a:t>
+            </a:r>
+            <a:r>
+              <a:rPr/>
+              <a:t>access</a:t>
             </a:r>
             <a:r>
               <a:rPr/>
@@ -5879,14 +6091,22 @@
             </a:r>
             <a:r>
               <a:rPr/>
-              <a:t>work</a:t>
+              <a:t>broadband</a:t>
+            </a:r>
+            <a:r>
+              <a:rPr/>
+              <a:t> </a:t>
+            </a:r>
+            <a:r>
+              <a:rPr/>
+              <a:t>internet</a:t>
             </a:r>
           </a:p>
         </p:txBody>
       </p:sp>
       <p:pic>
         <p:nvPicPr>
-          <p:cNvPr descr="household_structure_estimates_files/figure-pptx/unnamed-chunk-20-1.png" id="0" name="Picture 1"/>
+          <p:cNvPr descr="household_structure_estimates_files/figure-pptx/unnamed-chunk-23-1.png" id="0" name="Picture 1"/>
           <p:cNvPicPr>
             <a:picLocks noGrp="1" noChangeAspect="1"/>
           </p:cNvPicPr>
@@ -5962,6 +6182,62 @@
             </a:pPr>
             <a:r>
               <a:rPr/>
+              <a:t>More</a:t>
+            </a:r>
+            <a:r>
+              <a:rPr/>
+              <a:t> </a:t>
+            </a:r>
+            <a:r>
+              <a:rPr/>
+              <a:t>than</a:t>
+            </a:r>
+            <a:r>
+              <a:rPr/>
+              <a:t> </a:t>
+            </a:r>
+            <a:r>
+              <a:rPr/>
+              <a:t>1</a:t>
+            </a:r>
+            <a:r>
+              <a:rPr/>
+              <a:t> </a:t>
+            </a:r>
+            <a:r>
+              <a:rPr/>
+              <a:t>in</a:t>
+            </a:r>
+            <a:r>
+              <a:rPr/>
+              <a:t> </a:t>
+            </a:r>
+            <a:r>
+              <a:rPr/>
+              <a:t>3</a:t>
+            </a:r>
+            <a:r>
+              <a:rPr/>
+              <a:t> </a:t>
+            </a:r>
+            <a:r>
+              <a:rPr/>
+              <a:t>households</a:t>
+            </a:r>
+            <a:r>
+              <a:rPr/>
+              <a:t> </a:t>
+            </a:r>
+            <a:r>
+              <a:rPr/>
+              <a:t>with</a:t>
+            </a:r>
+            <a:r>
+              <a:rPr/>
+              <a:t> </a:t>
+            </a:r>
+            <a:r>
+              <a:rPr/>
               <a:t>OY</a:t>
             </a:r>
             <a:r>
@@ -5970,47 +6246,31 @@
             </a:r>
             <a:r>
               <a:rPr/>
-              <a:t>Only</a:t>
-            </a:r>
-            <a:r>
-              <a:rPr/>
-              <a:t> </a:t>
-            </a:r>
-            <a:r>
-              <a:rPr/>
-              <a:t>Households</a:t>
-            </a:r>
-            <a:r>
-              <a:rPr/>
-              <a:t> </a:t>
-            </a:r>
-            <a:r>
-              <a:rPr/>
-              <a:t>are</a:t>
-            </a:r>
-            <a:r>
-              <a:rPr/>
-              <a:t> </a:t>
-            </a:r>
-            <a:r>
-              <a:rPr/>
-              <a:t>twice</a:t>
-            </a:r>
-            <a:r>
-              <a:rPr/>
-              <a:t> </a:t>
-            </a:r>
-            <a:r>
-              <a:rPr/>
-              <a:t>as</a:t>
-            </a:r>
-            <a:r>
-              <a:rPr/>
-              <a:t> </a:t>
-            </a:r>
-            <a:r>
-              <a:rPr/>
-              <a:t>likely</a:t>
+              <a:t>do</a:t>
+            </a:r>
+            <a:r>
+              <a:rPr/>
+              <a:t> </a:t>
+            </a:r>
+            <a:r>
+              <a:rPr/>
+              <a:t>hot</a:t>
+            </a:r>
+            <a:r>
+              <a:rPr/>
+              <a:t> </a:t>
+            </a:r>
+            <a:r>
+              <a:rPr/>
+              <a:t>have</a:t>
+            </a:r>
+            <a:r>
+              <a:rPr/>
+              <a:t> </a:t>
+            </a:r>
+            <a:r>
+              <a:rPr/>
+              <a:t>access</a:t>
             </a:r>
             <a:r>
               <a:rPr/>
@@ -6026,22 +6286,22 @@
             </a:r>
             <a:r>
               <a:rPr/>
-              <a:t>receive</a:t>
-            </a:r>
-            <a:r>
-              <a:rPr/>
-              <a:t> </a:t>
-            </a:r>
-            <a:r>
-              <a:rPr/>
-              <a:t>foodstamps</a:t>
+              <a:t>a</a:t>
+            </a:r>
+            <a:r>
+              <a:rPr/>
+              <a:t> </a:t>
+            </a:r>
+            <a:r>
+              <a:rPr/>
+              <a:t>laptop</a:t>
             </a:r>
           </a:p>
         </p:txBody>
       </p:sp>
       <p:pic>
         <p:nvPicPr>
-          <p:cNvPr descr="household_structure_estimates_files/figure-pptx/unnamed-chunk-21-1.png" id="0" name="Picture 1"/>
+          <p:cNvPr descr="household_structure_estimates_files/figure-pptx/unnamed-chunk-24-1.png" id="0" name="Picture 1"/>
           <p:cNvPicPr>
             <a:picLocks noGrp="1" noChangeAspect="1"/>
           </p:cNvPicPr>
@@ -6096,7 +6356,7 @@
           <p:cNvPr id="2" name="Title 1">
             <a:extLst>
               <a:ext uri="{FF2B5EF4-FFF2-40B4-BE49-F238E27FC236}">
-                <a16:creationId xmlns:a16="http://schemas.microsoft.com/office/drawing/2014/main" id="{0D064A50-2A97-421C-813D-6449089693A0}"/>
+                <a16:creationId xmlns:a16="http://schemas.microsoft.com/office/drawing/2014/main" id="{1CAF8530-DA25-40F0-835B-ABF68B3EB818}"/>
               </a:ext>
             </a:extLst>
           </p:cNvPr>
@@ -6107,7 +6367,12 @@
             <p:ph type="title"/>
           </p:nvPr>
         </p:nvSpPr>
-        <p:spPr/>
+        <p:spPr>
+          <a:xfrm>
+            <a:off x="831850" y="1123072"/>
+            <a:ext cx="10515600" cy="2852737"/>
+          </a:xfrm>
+        </p:spPr>
         <p:txBody>
           <a:bodyPr/>
           <a:lstStyle/>
@@ -6117,49 +6382,11 @@
             </a:pPr>
             <a:r>
               <a:rPr/>
-              <a:t>Household</a:t>
-            </a:r>
-            <a:r>
-              <a:rPr/>
-              <a:t> </a:t>
-            </a:r>
-            <a:r>
-              <a:rPr/>
-              <a:t>Type</a:t>
-            </a:r>
-          </a:p>
-        </p:txBody>
-      </p:sp>
-      <p:pic>
-        <p:nvPicPr>
-          <p:cNvPr descr="household_structure_estimates_files/figure-pptx/unnamed-chunk-22-1.png" id="0" name="Picture 1"/>
-          <p:cNvPicPr>
-            <a:picLocks noGrp="1" noChangeAspect="1"/>
-          </p:cNvPicPr>
-          <p:nvPr/>
-        </p:nvPicPr>
-        <p:blipFill>
-          <a:blip r:embed="rId2"/>
-          <a:stretch>
-            <a:fillRect/>
-          </a:stretch>
-        </p:blipFill>
-        <p:spPr bwMode="auto">
-          <a:xfrm>
-            <a:off x="2616200" y="1816100"/>
-            <a:ext cx="6946900" cy="4343400"/>
-          </a:xfrm>
-          <a:prstGeom prst="rect">
-            <a:avLst/>
-          </a:prstGeom>
-          <a:noFill/>
-          <a:ln w="9525">
-            <a:noFill/>
-            <a:headEnd/>
-            <a:tailEnd/>
-          </a:ln>
-        </p:spPr>
-      </p:pic>
+              <a:t>Questions?</a:t>
+            </a:r>
+          </a:p>
+        </p:txBody>
+      </p:sp>
     </p:spTree>
   </p:cSld>
 </p:sld>
@@ -6187,390 +6414,6 @@
           <p:cNvPr id="2" name="Title 1">
             <a:extLst>
               <a:ext uri="{FF2B5EF4-FFF2-40B4-BE49-F238E27FC236}">
-                <a16:creationId xmlns:a16="http://schemas.microsoft.com/office/drawing/2014/main" id="{0D064A50-2A97-421C-813D-6449089693A0}"/>
-              </a:ext>
-            </a:extLst>
-          </p:cNvPr>
-          <p:cNvSpPr>
-            <a:spLocks noGrp="1"/>
-          </p:cNvSpPr>
-          <p:nvPr>
-            <p:ph type="title"/>
-          </p:nvPr>
-        </p:nvSpPr>
-        <p:spPr/>
-        <p:txBody>
-          <a:bodyPr/>
-          <a:lstStyle/>
-          <a:p>
-            <a:pPr lvl="0" marL="0" indent="0">
-              <a:buNone/>
-            </a:pPr>
-            <a:r>
-              <a:rPr/>
-              <a:t>OY</a:t>
-            </a:r>
-            <a:r>
-              <a:rPr/>
-              <a:t> </a:t>
-            </a:r>
-            <a:r>
-              <a:rPr/>
-              <a:t>Only</a:t>
-            </a:r>
-            <a:r>
-              <a:rPr/>
-              <a:t> </a:t>
-            </a:r>
-            <a:r>
-              <a:rPr/>
-              <a:t>Households</a:t>
-            </a:r>
-            <a:r>
-              <a:rPr/>
-              <a:t> </a:t>
-            </a:r>
-            <a:r>
-              <a:rPr/>
-              <a:t>are</a:t>
-            </a:r>
-            <a:r>
-              <a:rPr/>
-              <a:t> </a:t>
-            </a:r>
-            <a:r>
-              <a:rPr/>
-              <a:t>less</a:t>
-            </a:r>
-            <a:r>
-              <a:rPr/>
-              <a:t> </a:t>
-            </a:r>
-            <a:r>
-              <a:rPr/>
-              <a:t>likely</a:t>
-            </a:r>
-            <a:r>
-              <a:rPr/>
-              <a:t> </a:t>
-            </a:r>
-            <a:r>
-              <a:rPr/>
-              <a:t>to</a:t>
-            </a:r>
-            <a:r>
-              <a:rPr/>
-              <a:t> </a:t>
-            </a:r>
-            <a:r>
-              <a:rPr/>
-              <a:t>have</a:t>
-            </a:r>
-            <a:r>
-              <a:rPr/>
-              <a:t> </a:t>
-            </a:r>
-            <a:r>
-              <a:rPr/>
-              <a:t>access</a:t>
-            </a:r>
-            <a:r>
-              <a:rPr/>
-              <a:t> </a:t>
-            </a:r>
-            <a:r>
-              <a:rPr/>
-              <a:t>to</a:t>
-            </a:r>
-            <a:r>
-              <a:rPr/>
-              <a:t> </a:t>
-            </a:r>
-            <a:r>
-              <a:rPr/>
-              <a:t>broadband</a:t>
-            </a:r>
-            <a:r>
-              <a:rPr/>
-              <a:t> </a:t>
-            </a:r>
-            <a:r>
-              <a:rPr/>
-              <a:t>internet</a:t>
-            </a:r>
-          </a:p>
-        </p:txBody>
-      </p:sp>
-      <p:pic>
-        <p:nvPicPr>
-          <p:cNvPr descr="household_structure_estimates_files/figure-pptx/unnamed-chunk-23-1.png" id="0" name="Picture 1"/>
-          <p:cNvPicPr>
-            <a:picLocks noGrp="1" noChangeAspect="1"/>
-          </p:cNvPicPr>
-          <p:nvPr/>
-        </p:nvPicPr>
-        <p:blipFill>
-          <a:blip r:embed="rId2"/>
-          <a:stretch>
-            <a:fillRect/>
-          </a:stretch>
-        </p:blipFill>
-        <p:spPr bwMode="auto">
-          <a:xfrm>
-            <a:off x="2616200" y="1816100"/>
-            <a:ext cx="6946900" cy="4343400"/>
-          </a:xfrm>
-          <a:prstGeom prst="rect">
-            <a:avLst/>
-          </a:prstGeom>
-          <a:noFill/>
-          <a:ln w="9525">
-            <a:noFill/>
-            <a:headEnd/>
-            <a:tailEnd/>
-          </a:ln>
-        </p:spPr>
-      </p:pic>
-    </p:spTree>
-  </p:cSld>
-</p:sld>
-</file>
-
-<file path=ppt/slides/slide27.xml><?xml version="1.0" encoding="utf-8"?>
-<p:sld xmlns:a="http://schemas.openxmlformats.org/drawingml/2006/main" xmlns:r="http://schemas.openxmlformats.org/officeDocument/2006/relationships" xmlns:p="http://schemas.openxmlformats.org/presentationml/2006/main">
-  <p:cSld>
-    <p:spTree>
-      <p:nvGrpSpPr>
-        <p:cNvPr id="1" name=""/>
-        <p:cNvGrpSpPr/>
-        <p:nvPr/>
-      </p:nvGrpSpPr>
-      <p:grpSpPr>
-        <a:xfrm>
-          <a:off x="0" y="0"/>
-          <a:ext cx="0" cy="0"/>
-          <a:chOff x="0" y="0"/>
-          <a:chExt cx="0" cy="0"/>
-        </a:xfrm>
-      </p:grpSpPr>
-      <p:sp>
-        <p:nvSpPr>
-          <p:cNvPr id="2" name="Title 1">
-            <a:extLst>
-              <a:ext uri="{FF2B5EF4-FFF2-40B4-BE49-F238E27FC236}">
-                <a16:creationId xmlns:a16="http://schemas.microsoft.com/office/drawing/2014/main" id="{0D064A50-2A97-421C-813D-6449089693A0}"/>
-              </a:ext>
-            </a:extLst>
-          </p:cNvPr>
-          <p:cNvSpPr>
-            <a:spLocks noGrp="1"/>
-          </p:cNvSpPr>
-          <p:nvPr>
-            <p:ph type="title"/>
-          </p:nvPr>
-        </p:nvSpPr>
-        <p:spPr/>
-        <p:txBody>
-          <a:bodyPr/>
-          <a:lstStyle/>
-          <a:p>
-            <a:pPr lvl="0" marL="0" indent="0">
-              <a:buNone/>
-            </a:pPr>
-            <a:r>
-              <a:rPr/>
-              <a:t>OY</a:t>
-            </a:r>
-            <a:r>
-              <a:rPr/>
-              <a:t> </a:t>
-            </a:r>
-            <a:r>
-              <a:rPr/>
-              <a:t>Only</a:t>
-            </a:r>
-            <a:r>
-              <a:rPr/>
-              <a:t> </a:t>
-            </a:r>
-            <a:r>
-              <a:rPr/>
-              <a:t>Households</a:t>
-            </a:r>
-            <a:r>
-              <a:rPr/>
-              <a:t> </a:t>
-            </a:r>
-            <a:r>
-              <a:rPr/>
-              <a:t>are</a:t>
-            </a:r>
-            <a:r>
-              <a:rPr/>
-              <a:t> </a:t>
-            </a:r>
-            <a:r>
-              <a:rPr/>
-              <a:t>less</a:t>
-            </a:r>
-            <a:r>
-              <a:rPr/>
-              <a:t> </a:t>
-            </a:r>
-            <a:r>
-              <a:rPr/>
-              <a:t>likely</a:t>
-            </a:r>
-            <a:r>
-              <a:rPr/>
-              <a:t> </a:t>
-            </a:r>
-            <a:r>
-              <a:rPr/>
-              <a:t>to</a:t>
-            </a:r>
-            <a:r>
-              <a:rPr/>
-              <a:t> </a:t>
-            </a:r>
-            <a:r>
-              <a:rPr/>
-              <a:t>have</a:t>
-            </a:r>
-            <a:r>
-              <a:rPr/>
-              <a:t> </a:t>
-            </a:r>
-            <a:r>
-              <a:rPr/>
-              <a:t>laptop</a:t>
-            </a:r>
-            <a:r>
-              <a:rPr/>
-              <a:t> </a:t>
-            </a:r>
-            <a:r>
-              <a:rPr/>
-              <a:t>access</a:t>
-            </a:r>
-          </a:p>
-        </p:txBody>
-      </p:sp>
-      <p:pic>
-        <p:nvPicPr>
-          <p:cNvPr descr="household_structure_estimates_files/figure-pptx/unnamed-chunk-24-1.png" id="0" name="Picture 1"/>
-          <p:cNvPicPr>
-            <a:picLocks noGrp="1" noChangeAspect="1"/>
-          </p:cNvPicPr>
-          <p:nvPr/>
-        </p:nvPicPr>
-        <p:blipFill>
-          <a:blip r:embed="rId2"/>
-          <a:stretch>
-            <a:fillRect/>
-          </a:stretch>
-        </p:blipFill>
-        <p:spPr bwMode="auto">
-          <a:xfrm>
-            <a:off x="2616200" y="1816100"/>
-            <a:ext cx="6946900" cy="4343400"/>
-          </a:xfrm>
-          <a:prstGeom prst="rect">
-            <a:avLst/>
-          </a:prstGeom>
-          <a:noFill/>
-          <a:ln w="9525">
-            <a:noFill/>
-            <a:headEnd/>
-            <a:tailEnd/>
-          </a:ln>
-        </p:spPr>
-      </p:pic>
-    </p:spTree>
-  </p:cSld>
-</p:sld>
-</file>
-
-<file path=ppt/slides/slide28.xml><?xml version="1.0" encoding="utf-8"?>
-<p:sld xmlns:a="http://schemas.openxmlformats.org/drawingml/2006/main" xmlns:r="http://schemas.openxmlformats.org/officeDocument/2006/relationships" xmlns:p="http://schemas.openxmlformats.org/presentationml/2006/main">
-  <p:cSld>
-    <p:spTree>
-      <p:nvGrpSpPr>
-        <p:cNvPr id="1" name=""/>
-        <p:cNvGrpSpPr/>
-        <p:nvPr/>
-      </p:nvGrpSpPr>
-      <p:grpSpPr>
-        <a:xfrm>
-          <a:off x="0" y="0"/>
-          <a:ext cx="0" cy="0"/>
-          <a:chOff x="0" y="0"/>
-          <a:chExt cx="0" cy="0"/>
-        </a:xfrm>
-      </p:grpSpPr>
-      <p:sp>
-        <p:nvSpPr>
-          <p:cNvPr id="2" name="Title 1">
-            <a:extLst>
-              <a:ext uri="{FF2B5EF4-FFF2-40B4-BE49-F238E27FC236}">
-                <a16:creationId xmlns:a16="http://schemas.microsoft.com/office/drawing/2014/main" id="{1CAF8530-DA25-40F0-835B-ABF68B3EB818}"/>
-              </a:ext>
-            </a:extLst>
-          </p:cNvPr>
-          <p:cNvSpPr>
-            <a:spLocks noGrp="1"/>
-          </p:cNvSpPr>
-          <p:nvPr>
-            <p:ph type="title"/>
-          </p:nvPr>
-        </p:nvSpPr>
-        <p:spPr>
-          <a:xfrm>
-            <a:off x="831850" y="1123072"/>
-            <a:ext cx="10515600" cy="2852737"/>
-          </a:xfrm>
-        </p:spPr>
-        <p:txBody>
-          <a:bodyPr/>
-          <a:lstStyle/>
-          <a:p>
-            <a:pPr lvl="0" marL="0" indent="0">
-              <a:buNone/>
-            </a:pPr>
-            <a:r>
-              <a:rPr/>
-              <a:t>Questions?</a:t>
-            </a:r>
-          </a:p>
-        </p:txBody>
-      </p:sp>
-    </p:spTree>
-  </p:cSld>
-</p:sld>
-</file>
-
-<file path=ppt/slides/slide29.xml><?xml version="1.0" encoding="utf-8"?>
-<p:sld xmlns:a="http://schemas.openxmlformats.org/drawingml/2006/main" xmlns:r="http://schemas.openxmlformats.org/officeDocument/2006/relationships" xmlns:p="http://schemas.openxmlformats.org/presentationml/2006/main">
-  <p:cSld>
-    <p:spTree>
-      <p:nvGrpSpPr>
-        <p:cNvPr id="1" name=""/>
-        <p:cNvGrpSpPr/>
-        <p:nvPr/>
-      </p:nvGrpSpPr>
-      <p:grpSpPr>
-        <a:xfrm>
-          <a:off x="0" y="0"/>
-          <a:ext cx="0" cy="0"/>
-          <a:chOff x="0" y="0"/>
-          <a:chExt cx="0" cy="0"/>
-        </a:xfrm>
-      </p:grpSpPr>
-      <p:sp>
-        <p:nvSpPr>
-          <p:cNvPr id="2" name="Title 1">
-            <a:extLst>
-              <a:ext uri="{FF2B5EF4-FFF2-40B4-BE49-F238E27FC236}">
                 <a16:creationId xmlns:a16="http://schemas.microsoft.com/office/drawing/2014/main" id="{1CAF8530-DA25-40F0-835B-ABF68B3EB818}"/>
               </a:ext>
             </a:extLst>
@@ -7133,7 +6976,7 @@
             </a:r>
             <a:r>
               <a:rPr/>
-              <a:t> Individuals outside of this age category who may be enrolled in school or employed</a:t>
+              <a:t> Individuals outside of this age category, regardless of employment or school enrollment status</a:t>
             </a:r>
           </a:p>
         </p:txBody>
@@ -7430,7 +7273,7 @@
       </p:sp>
       <p:graphicFrame xmlns:a="http://schemas.openxmlformats.org/drawingml/2006/main" xmlns:r="http://schemas.openxmlformats.org/officeDocument/2006/relationships" xmlns:p="http://schemas.openxmlformats.org/presentationml/2006/main">
         <p:nvGraphicFramePr>
-          <p:cNvPr id="367121093" name=""/>
+          <p:cNvPr id="630330236" name=""/>
           <p:cNvGraphicFramePr>
             <a:graphicFrameLocks noGrp="true"/>
           </p:cNvGraphicFramePr>
@@ -7445,7 +7288,7 @@
             <a:tbl>
               <a:tblPr/>
               <a:tblGrid>
-                <a:gridCol w="1697748"/>
+                <a:gridCol w="1758117"/>
                 <a:gridCol w="1201022"/>
                 <a:gridCol w="1394405"/>
                 <a:gridCol w="1011868"/>
@@ -7896,7 +7739,7 @@
                           <a:latin typeface="Arial"/>
                           <a:cs typeface="Arial"/>
                         </a:rPr>
-                        <a:t>Present</a:t>
+                        <a:t>Not Present</a:t>
                       </a:r>
                     </a:p>
                   </a:txBody>
@@ -7962,7 +7805,7 @@
                           <a:latin typeface="Arial"/>
                           <a:cs typeface="Arial"/>
                         </a:rPr>
-                        <a:t>Present</a:t>
+                        <a:t>Not Present</a:t>
                       </a:r>
                     </a:p>
                   </a:txBody>
@@ -8030,7 +7873,7 @@
                           <a:latin typeface="Arial"/>
                           <a:cs typeface="Arial"/>
                         </a:rPr>
-                        <a:t>Household w/Only CY</a:t>
+                        <a:t>Households w/Only CY</a:t>
                       </a:r>
                     </a:p>
                   </a:txBody>
@@ -8288,7 +8131,7 @@
                   </a:tcPr>
                 </a:tc>
               </a:tr>
-              <a:tr h="328238">
+              <a:tr h="312140">
                 <a:tc>
                   <a:txBody>
                     <a:bodyPr/>
@@ -8316,7 +8159,7 @@
                           <a:latin typeface="Arial"/>
                           <a:cs typeface="Arial"/>
                         </a:rPr>
-                        <a:t>Household w/Only OY</a:t>
+                        <a:t>Households w/OY</a:t>
                       </a:r>
                     </a:p>
                   </a:txBody>
@@ -8448,7 +8291,7 @@
                           <a:latin typeface="Arial"/>
                           <a:cs typeface="Arial"/>
                         </a:rPr>
-                        <a:t>Not Present</a:t>
+                        <a:t>Present</a:t>
                       </a:r>
                     </a:p>
                   </a:txBody>

</xml_diff>